<commit_message>
update pptx to the current odp file
</commit_message>
<xml_diff>
--- a/CNN.pptx
+++ b/CNN.pptx
@@ -25,6 +25,8 @@
     <p:sldId id="270" r:id="rId18"/>
     <p:sldId id="271" r:id="rId19"/>
     <p:sldId id="272" r:id="rId20"/>
+    <p:sldId id="273" r:id="rId21"/>
+    <p:sldId id="274" r:id="rId22"/>
   </p:sldIdLst>
   <p:sldSz cx="10080625" cy="5670550"/>
   <p:notesSz cx="7772400" cy="10058400"/>
@@ -355,7 +357,7 @@
             <a:pPr indent="0" algn="r">
               <a:buNone/>
             </a:pPr>
-            <a:fld id="{A55E3325-D62F-4A96-9810-AFE8F2C91335}" type="slidenum">
+            <a:fld id="{62BE3A67-271C-4438-8660-5C8A41BB8055}" type="slidenum">
               <a:rPr b="0" lang="en-US" sz="1400" spc="-1" strike="noStrike">
                 <a:solidFill>
                   <a:srgbClr val="000000"/>
@@ -398,7 +400,7 @@
       </p:grpSpPr>
       <p:sp>
         <p:nvSpPr>
-          <p:cNvPr id="113" name="PlaceHolder 1"/>
+          <p:cNvPr id="120" name="PlaceHolder 1"/>
           <p:cNvSpPr>
             <a:spLocks noGrp="1"/>
           </p:cNvSpPr>
@@ -421,7 +423,7 @@
       </p:sp>
       <p:sp>
         <p:nvSpPr>
-          <p:cNvPr id="114" name="PlaceHolder 2"/>
+          <p:cNvPr id="121" name="PlaceHolder 2"/>
           <p:cNvSpPr>
             <a:spLocks noGrp="1"/>
           </p:cNvSpPr>
@@ -554,7 +556,7 @@
       </p:grpSpPr>
       <p:sp>
         <p:nvSpPr>
-          <p:cNvPr id="107" name="PlaceHolder 1"/>
+          <p:cNvPr id="114" name="PlaceHolder 1"/>
           <p:cNvSpPr>
             <a:spLocks noGrp="1"/>
           </p:cNvSpPr>
@@ -577,7 +579,7 @@
       </p:sp>
       <p:sp>
         <p:nvSpPr>
-          <p:cNvPr id="108" name="PlaceHolder 2"/>
+          <p:cNvPr id="115" name="PlaceHolder 2"/>
           <p:cNvSpPr>
             <a:spLocks noGrp="1"/>
           </p:cNvSpPr>
@@ -702,7 +704,7 @@
       </p:grpSpPr>
       <p:sp>
         <p:nvSpPr>
-          <p:cNvPr id="109" name="PlaceHolder 1"/>
+          <p:cNvPr id="116" name="PlaceHolder 1"/>
           <p:cNvSpPr>
             <a:spLocks noGrp="1"/>
           </p:cNvSpPr>
@@ -725,7 +727,7 @@
       </p:sp>
       <p:sp>
         <p:nvSpPr>
-          <p:cNvPr id="110" name="PlaceHolder 2"/>
+          <p:cNvPr id="117" name="PlaceHolder 2"/>
           <p:cNvSpPr>
             <a:spLocks noGrp="1"/>
           </p:cNvSpPr>
@@ -941,7 +943,7 @@
       </p:grpSpPr>
       <p:sp>
         <p:nvSpPr>
-          <p:cNvPr id="111" name="PlaceHolder 1"/>
+          <p:cNvPr id="118" name="PlaceHolder 1"/>
           <p:cNvSpPr>
             <a:spLocks noGrp="1"/>
           </p:cNvSpPr>
@@ -964,7 +966,7 @@
       </p:sp>
       <p:sp>
         <p:nvSpPr>
-          <p:cNvPr id="112" name="PlaceHolder 2"/>
+          <p:cNvPr id="119" name="PlaceHolder 2"/>
           <p:cNvSpPr>
             <a:spLocks noGrp="1"/>
           </p:cNvSpPr>
@@ -1107,7 +1109,7 @@
         <p:txBody>
           <a:bodyPr/>
           <a:p>
-            <a:fld id="{769A90F7-35A4-442C-87E8-618BB93A9FED}" type="slidenum">
+            <a:fld id="{C4B90D89-7902-4047-A37F-17C7FF51A0B8}" type="slidenum">
               <a:t>&lt;#&gt;</a:t>
             </a:fld>
           </a:p>
@@ -1316,7 +1318,7 @@
         <p:txBody>
           <a:bodyPr/>
           <a:p>
-            <a:fld id="{B7298245-FE5F-461A-8B90-59E91338B4E3}" type="slidenum">
+            <a:fld id="{7252F51C-3A82-4AF1-98EE-FF54AC7234B5}" type="slidenum">
               <a:t>&lt;#&gt;</a:t>
             </a:fld>
           </a:p>
@@ -1611,7 +1613,7 @@
         <p:txBody>
           <a:bodyPr/>
           <a:p>
-            <a:fld id="{FB167C41-DF5E-4460-B6B0-BE914888DCBB}" type="slidenum">
+            <a:fld id="{DF66BA93-AFCA-4E78-9B51-E9140757D688}" type="slidenum">
               <a:t>&lt;#&gt;</a:t>
             </a:fld>
           </a:p>
@@ -1992,7 +1994,7 @@
         <p:txBody>
           <a:bodyPr/>
           <a:p>
-            <a:fld id="{4C4CE105-8745-4E0E-BA80-04FB127D10F4}" type="slidenum">
+            <a:fld id="{6B77DBE9-F270-45E2-A67D-D2233AB4FBC4}" type="slidenum">
               <a:t>&lt;#&gt;</a:t>
             </a:fld>
           </a:p>
@@ -2155,7 +2157,7 @@
         <p:txBody>
           <a:bodyPr/>
           <a:p>
-            <a:fld id="{10FB2EA6-4B1D-4A6B-AD46-B7EAC5393AD7}" type="slidenum">
+            <a:fld id="{0A962805-C592-4BDC-9678-B39AAC73813F}" type="slidenum">
               <a:t>&lt;#&gt;</a:t>
             </a:fld>
           </a:p>
@@ -2321,7 +2323,7 @@
         <p:txBody>
           <a:bodyPr/>
           <a:p>
-            <a:fld id="{183E9B97-6745-4EA3-9B72-EC0F8BCDDE1F}" type="slidenum">
+            <a:fld id="{67FF3F8A-2C1F-4DD0-8DBF-DFF43F2DD151}" type="slidenum">
               <a:t>&lt;#&gt;</a:t>
             </a:fld>
           </a:p>
@@ -2530,7 +2532,7 @@
         <p:txBody>
           <a:bodyPr/>
           <a:p>
-            <a:fld id="{3C5E64A1-A21C-4A65-8678-2BDDD3348CC1}" type="slidenum">
+            <a:fld id="{85E0287F-9CF0-477C-8A58-2EFA2F3D1F54}" type="slidenum">
               <a:t>&lt;#&gt;</a:t>
             </a:fld>
           </a:p>
@@ -2653,7 +2655,7 @@
         <p:txBody>
           <a:bodyPr/>
           <a:p>
-            <a:fld id="{CF810873-BA72-4CB8-8FF1-A7957120D1B9}" type="slidenum">
+            <a:fld id="{FE9615BB-FA62-44E1-BE0A-FE72A8D9660B}" type="slidenum">
               <a:t>&lt;#&gt;</a:t>
             </a:fld>
           </a:p>
@@ -2774,7 +2776,7 @@
         <p:txBody>
           <a:bodyPr/>
           <a:p>
-            <a:fld id="{07652E9F-14E5-4C69-9017-6EDE487939A6}" type="slidenum">
+            <a:fld id="{DEC431D8-EF34-4DBE-BB91-25C2CE566C7F}" type="slidenum">
               <a:t>&lt;#&gt;</a:t>
             </a:fld>
           </a:p>
@@ -3026,7 +3028,7 @@
         <p:txBody>
           <a:bodyPr/>
           <a:p>
-            <a:fld id="{3CE1DFD1-AC8A-455D-BA2F-D5039F6F416E}" type="slidenum">
+            <a:fld id="{C08033D2-02D5-4694-8921-D1876D7CF16B}" type="slidenum">
               <a:t>&lt;#&gt;</a:t>
             </a:fld>
           </a:p>
@@ -3278,7 +3280,7 @@
         <p:txBody>
           <a:bodyPr/>
           <a:p>
-            <a:fld id="{452AC1E5-0C1F-4959-ACA3-7564F4604345}" type="slidenum">
+            <a:fld id="{CA4E9F52-B0DD-472A-8F00-CE9375EB14ED}" type="slidenum">
               <a:t>&lt;#&gt;</a:t>
             </a:fld>
           </a:p>
@@ -3530,7 +3532,7 @@
         <p:txBody>
           <a:bodyPr/>
           <a:p>
-            <a:fld id="{CE53CB95-18ED-4991-918B-CA6AF037756F}" type="slidenum">
+            <a:fld id="{DBF6A764-CD77-489A-9899-7FD9FC72EA94}" type="slidenum">
               <a:t>&lt;#&gt;</a:t>
             </a:fld>
           </a:p>
@@ -4015,7 +4017,7 @@
             <a:pPr indent="0" algn="r">
               <a:buNone/>
             </a:pPr>
-            <a:fld id="{416E546E-CFD3-458C-8B52-3EF362E2E4FD}" type="slidenum">
+            <a:fld id="{9184E723-51CC-40BE-9BB2-E7D1D8223D2F}" type="slidenum">
               <a:rPr b="0" lang="en-US" sz="1400" spc="-1" strike="noStrike">
                 <a:solidFill>
                   <a:srgbClr val="000000"/>
@@ -7036,232 +7038,7 @@
                 </a:solidFill>
                 <a:latin typeface="Arial"/>
               </a:rPr>
-              <a:t>C</a:t>
-            </a:r>
-            <a:r>
-              <a:rPr b="0" lang="en-US" sz="4400" spc="-1" strike="noStrike">
-                <a:solidFill>
-                  <a:srgbClr val="000000"/>
-                </a:solidFill>
-                <a:latin typeface="Arial"/>
-              </a:rPr>
-              <a:t>a</a:t>
-            </a:r>
-            <a:r>
-              <a:rPr b="0" lang="en-US" sz="4400" spc="-1" strike="noStrike">
-                <a:solidFill>
-                  <a:srgbClr val="000000"/>
-                </a:solidFill>
-                <a:latin typeface="Arial"/>
-              </a:rPr>
-              <a:t>l</a:t>
-            </a:r>
-            <a:r>
-              <a:rPr b="0" lang="en-US" sz="4400" spc="-1" strike="noStrike">
-                <a:solidFill>
-                  <a:srgbClr val="000000"/>
-                </a:solidFill>
-                <a:latin typeface="Arial"/>
-              </a:rPr>
-              <a:t>c</a:t>
-            </a:r>
-            <a:r>
-              <a:rPr b="0" lang="en-US" sz="4400" spc="-1" strike="noStrike">
-                <a:solidFill>
-                  <a:srgbClr val="000000"/>
-                </a:solidFill>
-                <a:latin typeface="Arial"/>
-              </a:rPr>
-              <a:t>u</a:t>
-            </a:r>
-            <a:r>
-              <a:rPr b="0" lang="en-US" sz="4400" spc="-1" strike="noStrike">
-                <a:solidFill>
-                  <a:srgbClr val="000000"/>
-                </a:solidFill>
-                <a:latin typeface="Arial"/>
-              </a:rPr>
-              <a:t>l</a:t>
-            </a:r>
-            <a:r>
-              <a:rPr b="0" lang="en-US" sz="4400" spc="-1" strike="noStrike">
-                <a:solidFill>
-                  <a:srgbClr val="000000"/>
-                </a:solidFill>
-                <a:latin typeface="Arial"/>
-              </a:rPr>
-              <a:t>a</a:t>
-            </a:r>
-            <a:r>
-              <a:rPr b="0" lang="en-US" sz="4400" spc="-1" strike="noStrike">
-                <a:solidFill>
-                  <a:srgbClr val="000000"/>
-                </a:solidFill>
-                <a:latin typeface="Arial"/>
-              </a:rPr>
-              <a:t>t</a:t>
-            </a:r>
-            <a:r>
-              <a:rPr b="0" lang="en-US" sz="4400" spc="-1" strike="noStrike">
-                <a:solidFill>
-                  <a:srgbClr val="000000"/>
-                </a:solidFill>
-                <a:latin typeface="Arial"/>
-              </a:rPr>
-              <a:t>e </a:t>
-            </a:r>
-            <a:r>
-              <a:rPr b="0" lang="en-US" sz="4400" spc="-1" strike="noStrike">
-                <a:solidFill>
-                  <a:srgbClr val="000000"/>
-                </a:solidFill>
-                <a:latin typeface="Arial"/>
-              </a:rPr>
-              <a:t>t</a:t>
-            </a:r>
-            <a:r>
-              <a:rPr b="0" lang="en-US" sz="4400" spc="-1" strike="noStrike">
-                <a:solidFill>
-                  <a:srgbClr val="000000"/>
-                </a:solidFill>
-                <a:latin typeface="Arial"/>
-              </a:rPr>
-              <a:t>h</a:t>
-            </a:r>
-            <a:r>
-              <a:rPr b="0" lang="en-US" sz="4400" spc="-1" strike="noStrike">
-                <a:solidFill>
-                  <a:srgbClr val="000000"/>
-                </a:solidFill>
-                <a:latin typeface="Arial"/>
-              </a:rPr>
-              <a:t>e </a:t>
-            </a:r>
-            <a:r>
-              <a:rPr b="0" lang="en-US" sz="4400" spc="-1" strike="noStrike">
-                <a:solidFill>
-                  <a:srgbClr val="000000"/>
-                </a:solidFill>
-                <a:latin typeface="Arial"/>
-              </a:rPr>
-              <a:t>f</a:t>
-            </a:r>
-            <a:r>
-              <a:rPr b="0" lang="en-US" sz="4400" spc="-1" strike="noStrike">
-                <a:solidFill>
-                  <a:srgbClr val="000000"/>
-                </a:solidFill>
-                <a:latin typeface="Arial"/>
-              </a:rPr>
-              <a:t>e</a:t>
-            </a:r>
-            <a:r>
-              <a:rPr b="0" lang="en-US" sz="4400" spc="-1" strike="noStrike">
-                <a:solidFill>
-                  <a:srgbClr val="000000"/>
-                </a:solidFill>
-                <a:latin typeface="Arial"/>
-              </a:rPr>
-              <a:t>a</a:t>
-            </a:r>
-            <a:r>
-              <a:rPr b="0" lang="en-US" sz="4400" spc="-1" strike="noStrike">
-                <a:solidFill>
-                  <a:srgbClr val="000000"/>
-                </a:solidFill>
-                <a:latin typeface="Arial"/>
-              </a:rPr>
-              <a:t>t</a:t>
-            </a:r>
-            <a:r>
-              <a:rPr b="0" lang="en-US" sz="4400" spc="-1" strike="noStrike">
-                <a:solidFill>
-                  <a:srgbClr val="000000"/>
-                </a:solidFill>
-                <a:latin typeface="Arial"/>
-              </a:rPr>
-              <a:t>u</a:t>
-            </a:r>
-            <a:r>
-              <a:rPr b="0" lang="en-US" sz="4400" spc="-1" strike="noStrike">
-                <a:solidFill>
-                  <a:srgbClr val="000000"/>
-                </a:solidFill>
-                <a:latin typeface="Arial"/>
-              </a:rPr>
-              <a:t>r</a:t>
-            </a:r>
-            <a:r>
-              <a:rPr b="0" lang="en-US" sz="4400" spc="-1" strike="noStrike">
-                <a:solidFill>
-                  <a:srgbClr val="000000"/>
-                </a:solidFill>
-                <a:latin typeface="Arial"/>
-              </a:rPr>
-              <a:t>e </a:t>
-            </a:r>
-            <a:r>
-              <a:rPr b="0" lang="en-US" sz="4400" spc="-1" strike="noStrike">
-                <a:solidFill>
-                  <a:srgbClr val="000000"/>
-                </a:solidFill>
-                <a:latin typeface="Arial"/>
-              </a:rPr>
-              <a:t>m</a:t>
-            </a:r>
-            <a:r>
-              <a:rPr b="0" lang="en-US" sz="4400" spc="-1" strike="noStrike">
-                <a:solidFill>
-                  <a:srgbClr val="000000"/>
-                </a:solidFill>
-                <a:latin typeface="Arial"/>
-              </a:rPr>
-              <a:t>a</a:t>
-            </a:r>
-            <a:r>
-              <a:rPr b="0" lang="en-US" sz="4400" spc="-1" strike="noStrike">
-                <a:solidFill>
-                  <a:srgbClr val="000000"/>
-                </a:solidFill>
-                <a:latin typeface="Arial"/>
-              </a:rPr>
-              <a:t>p </a:t>
-            </a:r>
-            <a:r>
-              <a:rPr b="0" lang="en-US" sz="4400" spc="-1" strike="noStrike">
-                <a:solidFill>
-                  <a:srgbClr val="000000"/>
-                </a:solidFill>
-                <a:latin typeface="Arial"/>
-              </a:rPr>
-              <a:t>s</a:t>
-            </a:r>
-            <a:r>
-              <a:rPr b="0" lang="en-US" sz="4400" spc="-1" strike="noStrike">
-                <a:solidFill>
-                  <a:srgbClr val="000000"/>
-                </a:solidFill>
-                <a:latin typeface="Arial"/>
-              </a:rPr>
-              <a:t>i</a:t>
-            </a:r>
-            <a:r>
-              <a:rPr b="0" lang="en-US" sz="4400" spc="-1" strike="noStrike">
-                <a:solidFill>
-                  <a:srgbClr val="000000"/>
-                </a:solidFill>
-                <a:latin typeface="Arial"/>
-              </a:rPr>
-              <a:t>z</a:t>
-            </a:r>
-            <a:r>
-              <a:rPr b="0" lang="en-US" sz="4400" spc="-1" strike="noStrike">
-                <a:solidFill>
-                  <a:srgbClr val="000000"/>
-                </a:solidFill>
-                <a:latin typeface="Arial"/>
-              </a:rPr>
-              <a:t>e</a:t>
+              <a:t>Calculate the feature map size</a:t>
             </a:r>
             <a:endParaRPr b="0" lang="en-US" sz="4400" spc="-1" strike="noStrike">
               <a:solidFill>
@@ -7483,16 +7260,7 @@
                 </a:solidFill>
                 <a:latin typeface="Arial"/>
               </a:rPr>
-              <a:t>feature map </a:t>
-            </a:r>
-            <a:r>
-              <a:rPr b="0" lang="en-US" sz="2800" spc="-1" strike="noStrike">
-                <a:solidFill>
-                  <a:srgbClr val="000000"/>
-                </a:solidFill>
-                <a:latin typeface="Arial"/>
-              </a:rPr>
-              <a:t>layers</a:t>
+              <a:t>feature map layers</a:t>
             </a:r>
             <a:endParaRPr b="0" lang="en-US" sz="2800" spc="-1" strike="noStrike">
               <a:solidFill>
@@ -7863,37 +7631,7 @@
                 <a:latin typeface="Arial"/>
                 <a:ea typeface="Noto Sans CJK SC"/>
               </a:rPr>
-              <a:t>Pool</a:t>
-            </a:r>
-            <a:r>
-              <a:rPr b="0" lang="en-US" sz="4400" spc="-1" strike="noStrike">
-                <a:solidFill>
-                  <a:srgbClr val="000000"/>
-                </a:solidFill>
-                <a:latin typeface="Arial"/>
-                <a:ea typeface="Noto Sans CJK SC"/>
-              </a:rPr>
-              <a:t>ing </a:t>
-            </a:r>
-            <a:r>
-              <a:rPr b="0" lang="en-US" sz="4400" spc="-1" strike="noStrike">
-                <a:solidFill>
-                  <a:srgbClr val="000000"/>
-                </a:solidFill>
-                <a:latin typeface="Arial"/>
-                <a:ea typeface="Noto Sans CJK SC"/>
-              </a:rPr>
-              <a:t>lay</a:t>
-            </a:r>
-            <a:r>
-              <a:rPr b="0" lang="en-US" sz="4400" spc="-1" strike="noStrike">
-                <a:solidFill>
-                  <a:srgbClr val="000000"/>
-                </a:solidFill>
-                <a:latin typeface="Arial"/>
-                <a:ea typeface="Noto Sans CJK SC"/>
-              </a:rPr>
-              <a:t>er </a:t>
+              <a:t>Pooling layer </a:t>
             </a:r>
             <a:r>
               <a:rPr b="0" lang="en-US" sz="4400" spc="-1" strike="noStrike">
@@ -7902,43 +7640,7 @@
                 </a:solidFill>
                 <a:latin typeface="Arial"/>
               </a:rPr>
-              <a:t>met</a:t>
-            </a:r>
-            <a:r>
-              <a:rPr b="0" lang="en-US" sz="4400" spc="-1" strike="noStrike">
-                <a:solidFill>
-                  <a:srgbClr val="000000"/>
-                </a:solidFill>
-                <a:latin typeface="Arial"/>
-              </a:rPr>
-              <a:t>hod</a:t>
-            </a:r>
-            <a:r>
-              <a:rPr b="0" lang="en-US" sz="4400" spc="-1" strike="noStrike">
-                <a:solidFill>
-                  <a:srgbClr val="000000"/>
-                </a:solidFill>
-                <a:latin typeface="Arial"/>
-              </a:rPr>
-              <a:t>s </a:t>
-            </a:r>
-            <a:r>
-              <a:rPr b="0" lang="en-US" sz="4400" spc="-1" strike="noStrike">
-                <a:solidFill>
-                  <a:srgbClr val="000000"/>
-                </a:solidFill>
-                <a:latin typeface="Arial"/>
-              </a:rPr>
-              <a:t>(typ</a:t>
-            </a:r>
-            <a:r>
-              <a:rPr b="0" lang="en-US" sz="4400" spc="-1" strike="noStrike">
-                <a:solidFill>
-                  <a:srgbClr val="000000"/>
-                </a:solidFill>
-                <a:latin typeface="Arial"/>
-              </a:rPr>
-              <a:t>es)</a:t>
+              <a:t>methods (types)</a:t>
             </a:r>
             <a:endParaRPr b="0" lang="en-US" sz="4400" spc="-1" strike="noStrike">
               <a:solidFill>
@@ -8024,7 +7726,7 @@
               </a:rPr>
               <a:t>- Max pooling</a:t>
             </a:r>
-            <a:endParaRPr b="1" lang="en-US" sz="2000" spc="-1" strike="noStrike">
+            <a:endParaRPr b="0" lang="en-US" sz="2000" spc="-1" strike="noStrike">
               <a:solidFill>
                 <a:srgbClr val="000000"/>
               </a:solidFill>
@@ -8041,7 +7743,7 @@
               </a:rPr>
               <a:t>- Average Pooling</a:t>
             </a:r>
-            <a:endParaRPr b="1" lang="en-US" sz="2000" spc="-1" strike="noStrike">
+            <a:endParaRPr b="0" lang="en-US" sz="2000" spc="-1" strike="noStrike">
               <a:solidFill>
                 <a:srgbClr val="000000"/>
               </a:solidFill>
@@ -8206,9 +7908,32 @@
           <a:chExt cx="0" cy="0"/>
         </a:xfrm>
       </p:grpSpPr>
-      <p:sp>
-        <p:nvSpPr>
-          <p:cNvPr id="105" name="PlaceHolder 1"/>
+      <p:pic>
+        <p:nvPicPr>
+          <p:cNvPr id="105" name="" descr=""/>
+          <p:cNvPicPr/>
+          <p:nvPr/>
+        </p:nvPicPr>
+        <p:blipFill>
+          <a:blip r:embed="rId1"/>
+          <a:stretch/>
+        </p:blipFill>
+        <p:spPr>
+          <a:xfrm>
+            <a:off x="2057400" y="2514600"/>
+            <a:ext cx="6020640" cy="2877840"/>
+          </a:xfrm>
+          <a:prstGeom prst="rect">
+            <a:avLst/>
+          </a:prstGeom>
+          <a:ln w="0">
+            <a:noFill/>
+          </a:ln>
+        </p:spPr>
+      </p:pic>
+      <p:sp>
+        <p:nvSpPr>
+          <p:cNvPr id="106" name="PlaceHolder 1"/>
           <p:cNvSpPr>
             <a:spLocks noGrp="1"/>
           </p:cNvSpPr>
@@ -8244,7 +7969,7 @@
                 </a:solidFill>
                 <a:latin typeface="Arial"/>
               </a:rPr>
-              <a:t>Resources</a:t>
+              <a:t>Flatten Layer</a:t>
             </a:r>
             <a:endParaRPr b="0" lang="en-US" sz="4400" spc="-1" strike="noStrike">
               <a:solidFill>
@@ -8257,7 +7982,7 @@
       </p:sp>
       <p:sp>
         <p:nvSpPr>
-          <p:cNvPr id="106" name="PlaceHolder 2"/>
+          <p:cNvPr id="107" name="PlaceHolder 2"/>
           <p:cNvSpPr>
             <a:spLocks noGrp="1"/>
           </p:cNvSpPr>
@@ -8280,10 +8005,356 @@
         </p:spPr>
         <p:txBody>
           <a:bodyPr lIns="0" rIns="0" tIns="0" bIns="0" anchor="t">
-            <a:normAutofit fontScale="92000"/>
+            <a:normAutofit/>
           </a:bodyPr>
           <a:p>
-            <a:pPr marL="397440" indent="-298080">
+            <a:pPr marL="432000" indent="-324000">
+              <a:spcBef>
+                <a:spcPts val="1417"/>
+              </a:spcBef>
+              <a:buClr>
+                <a:srgbClr val="000000"/>
+              </a:buClr>
+              <a:buSzPct val="45000"/>
+              <a:buFont typeface="Wingdings" charset="2"/>
+              <a:buChar char=""/>
+            </a:pPr>
+            <a:r>
+              <a:rPr b="1" lang="en-US" sz="2600" spc="-1" strike="noStrike">
+                <a:solidFill>
+                  <a:srgbClr val="000000"/>
+                </a:solidFill>
+                <a:latin typeface="Arial"/>
+              </a:rPr>
+              <a:t>Flatten</a:t>
+            </a:r>
+            <a:r>
+              <a:rPr b="0" lang="en-US" sz="2600" spc="-1" strike="noStrike">
+                <a:solidFill>
+                  <a:srgbClr val="000000"/>
+                </a:solidFill>
+                <a:latin typeface="Arial"/>
+              </a:rPr>
+              <a:t> is used to flatten the input. For example, if flatten is applied to layer having input shape as (3,3), then the output shape of the layer will be (9)</a:t>
+            </a:r>
+            <a:endParaRPr b="0" lang="en-US" sz="2600" spc="-1" strike="noStrike">
+              <a:solidFill>
+                <a:srgbClr val="000000"/>
+              </a:solidFill>
+              <a:latin typeface="Arial"/>
+            </a:endParaRPr>
+          </a:p>
+        </p:txBody>
+      </p:sp>
+      <p:sp>
+        <p:nvSpPr>
+          <p:cNvPr id="108" name=""/>
+          <p:cNvSpPr txBox="1"/>
+          <p:nvPr/>
+        </p:nvSpPr>
+        <p:spPr>
+          <a:xfrm>
+            <a:off x="3171960" y="5029200"/>
+            <a:ext cx="2713680" cy="261000"/>
+          </a:xfrm>
+          <a:prstGeom prst="rect">
+            <a:avLst/>
+          </a:prstGeom>
+          <a:noFill/>
+          <a:ln w="0">
+            <a:noFill/>
+          </a:ln>
+        </p:spPr>
+        <p:txBody>
+          <a:bodyPr lIns="90000" rIns="90000" tIns="45000" bIns="45000" anchor="t">
+            <a:noAutofit/>
+          </a:bodyPr>
+          <a:p>
+            <a:r>
+              <a:rPr b="0" lang="en-US" sz="1200" spc="-1" strike="noStrike">
+                <a:solidFill>
+                  <a:srgbClr val="000000"/>
+                </a:solidFill>
+                <a:latin typeface="Arial"/>
+              </a:rPr>
+              <a:t>image source: superdatascience.com</a:t>
+            </a:r>
+            <a:endParaRPr b="0" lang="en-US" sz="1200" spc="-1" strike="noStrike">
+              <a:solidFill>
+                <a:srgbClr val="000000"/>
+              </a:solidFill>
+              <a:latin typeface="Arial"/>
+            </a:endParaRPr>
+          </a:p>
+        </p:txBody>
+      </p:sp>
+    </p:spTree>
+  </p:cSld>
+  <mc:AlternateContent>
+    <mc:Choice Requires="p14">
+      <p:transition spd="slow" p14:dur="2000"/>
+    </mc:Choice>
+    <mc:Fallback>
+      <p:transition spd="slow"/>
+    </mc:Fallback>
+  </mc:AlternateContent>
+</p:sld>
+</file>
+
+<file path=ppt/slides/slide18.xml><?xml version="1.0" encoding="utf-8"?>
+<p:sld xmlns:a="http://schemas.openxmlformats.org/drawingml/2006/main" xmlns:p="http://schemas.openxmlformats.org/presentationml/2006/main" xmlns:r="http://schemas.openxmlformats.org/officeDocument/2006/relationships" xmlns:p14="http://schemas.microsoft.com/office/powerpoint/2010/main" xmlns:p15="http://schemas.microsoft.com/office/powerpoint/2012/main" xmlns:mc="http://schemas.openxmlformats.org/markup-compatibility/2006">
+  <p:cSld>
+    <p:spTree>
+      <p:nvGrpSpPr>
+        <p:cNvPr id="1" name=""/>
+        <p:cNvGrpSpPr/>
+        <p:nvPr/>
+      </p:nvGrpSpPr>
+      <p:grpSpPr>
+        <a:xfrm>
+          <a:off x="0" y="0"/>
+          <a:ext cx="0" cy="0"/>
+          <a:chOff x="0" y="0"/>
+          <a:chExt cx="0" cy="0"/>
+        </a:xfrm>
+      </p:grpSpPr>
+      <p:pic>
+        <p:nvPicPr>
+          <p:cNvPr id="109" name="" descr=""/>
+          <p:cNvPicPr/>
+          <p:nvPr/>
+        </p:nvPicPr>
+        <p:blipFill>
+          <a:blip r:embed="rId1"/>
+          <a:stretch/>
+        </p:blipFill>
+        <p:spPr>
+          <a:xfrm>
+            <a:off x="1528200" y="1247760"/>
+            <a:ext cx="7509960" cy="4422240"/>
+          </a:xfrm>
+          <a:prstGeom prst="rect">
+            <a:avLst/>
+          </a:prstGeom>
+          <a:ln w="0">
+            <a:noFill/>
+          </a:ln>
+        </p:spPr>
+      </p:pic>
+      <p:sp>
+        <p:nvSpPr>
+          <p:cNvPr id="110" name="PlaceHolder 1"/>
+          <p:cNvSpPr>
+            <a:spLocks noGrp="1"/>
+          </p:cNvSpPr>
+          <p:nvPr>
+            <p:ph type="title"/>
+          </p:nvPr>
+        </p:nvSpPr>
+        <p:spPr>
+          <a:xfrm>
+            <a:off x="504000" y="226080"/>
+            <a:ext cx="9071640" cy="946440"/>
+          </a:xfrm>
+          <a:prstGeom prst="rect">
+            <a:avLst/>
+          </a:prstGeom>
+          <a:noFill/>
+          <a:ln w="0">
+            <a:noFill/>
+          </a:ln>
+        </p:spPr>
+        <p:txBody>
+          <a:bodyPr lIns="0" rIns="0" tIns="0" bIns="0" anchor="ctr">
+            <a:noAutofit/>
+          </a:bodyPr>
+          <a:p>
+            <a:pPr indent="0" algn="ctr">
+              <a:buNone/>
+            </a:pPr>
+            <a:r>
+              <a:rPr b="0" lang="en-US" sz="4400" spc="-1" strike="noStrike">
+                <a:solidFill>
+                  <a:srgbClr val="000000"/>
+                </a:solidFill>
+                <a:latin typeface="Arial"/>
+              </a:rPr>
+              <a:t>Fully Connected layer</a:t>
+            </a:r>
+            <a:endParaRPr b="0" lang="en-US" sz="4400" spc="-1" strike="noStrike">
+              <a:solidFill>
+                <a:srgbClr val="000000"/>
+              </a:solidFill>
+              <a:latin typeface="Arial"/>
+            </a:endParaRPr>
+          </a:p>
+        </p:txBody>
+      </p:sp>
+      <p:sp>
+        <p:nvSpPr>
+          <p:cNvPr id="111" name="PlaceHolder 2"/>
+          <p:cNvSpPr>
+            <a:spLocks noGrp="1"/>
+          </p:cNvSpPr>
+          <p:nvPr>
+            <p:ph/>
+          </p:nvPr>
+        </p:nvSpPr>
+        <p:spPr>
+          <a:xfrm>
+            <a:off x="504000" y="1326600"/>
+            <a:ext cx="9071640" cy="3288240"/>
+          </a:xfrm>
+          <a:prstGeom prst="rect">
+            <a:avLst/>
+          </a:prstGeom>
+          <a:noFill/>
+          <a:ln w="0">
+            <a:noFill/>
+          </a:ln>
+        </p:spPr>
+        <p:txBody>
+          <a:bodyPr lIns="0" rIns="0" tIns="0" bIns="0" anchor="t">
+            <a:normAutofit/>
+          </a:bodyPr>
+          <a:p>
+            <a:pPr marL="432000" indent="-324000">
+              <a:spcBef>
+                <a:spcPts val="1417"/>
+              </a:spcBef>
+              <a:buClr>
+                <a:srgbClr val="000000"/>
+              </a:buClr>
+              <a:buSzPct val="45000"/>
+              <a:buFont typeface="Wingdings" charset="2"/>
+              <a:buChar char=""/>
+            </a:pPr>
+            <a:r>
+              <a:rPr b="0" lang="en-US" sz="2200" spc="-1" strike="noStrike">
+                <a:solidFill>
+                  <a:srgbClr val="000000"/>
+                </a:solidFill>
+                <a:latin typeface="Arial"/>
+              </a:rPr>
+              <a:t>Is a fully connected neural networks – the classic neural network architecture, in which all neurons connect to all neurons in the next layer.</a:t>
+            </a:r>
+            <a:endParaRPr b="0" lang="en-US" sz="2200" spc="-1" strike="noStrike">
+              <a:solidFill>
+                <a:srgbClr val="000000"/>
+              </a:solidFill>
+              <a:latin typeface="Arial"/>
+            </a:endParaRPr>
+          </a:p>
+        </p:txBody>
+      </p:sp>
+    </p:spTree>
+  </p:cSld>
+  <mc:AlternateContent>
+    <mc:Choice Requires="p14">
+      <p:transition spd="slow" p14:dur="2000"/>
+    </mc:Choice>
+    <mc:Fallback>
+      <p:transition spd="slow"/>
+    </mc:Fallback>
+  </mc:AlternateContent>
+</p:sld>
+</file>
+
+<file path=ppt/slides/slide19.xml><?xml version="1.0" encoding="utf-8"?>
+<p:sld xmlns:a="http://schemas.openxmlformats.org/drawingml/2006/main" xmlns:p="http://schemas.openxmlformats.org/presentationml/2006/main" xmlns:r="http://schemas.openxmlformats.org/officeDocument/2006/relationships" xmlns:p14="http://schemas.microsoft.com/office/powerpoint/2010/main" xmlns:p15="http://schemas.microsoft.com/office/powerpoint/2012/main" xmlns:mc="http://schemas.openxmlformats.org/markup-compatibility/2006">
+  <p:cSld>
+    <p:spTree>
+      <p:nvGrpSpPr>
+        <p:cNvPr id="1" name=""/>
+        <p:cNvGrpSpPr/>
+        <p:nvPr/>
+      </p:nvGrpSpPr>
+      <p:grpSpPr>
+        <a:xfrm>
+          <a:off x="0" y="0"/>
+          <a:ext cx="0" cy="0"/>
+          <a:chOff x="0" y="0"/>
+          <a:chExt cx="0" cy="0"/>
+        </a:xfrm>
+      </p:grpSpPr>
+      <p:sp>
+        <p:nvSpPr>
+          <p:cNvPr id="112" name="PlaceHolder 1"/>
+          <p:cNvSpPr>
+            <a:spLocks noGrp="1"/>
+          </p:cNvSpPr>
+          <p:nvPr>
+            <p:ph type="title"/>
+          </p:nvPr>
+        </p:nvSpPr>
+        <p:spPr>
+          <a:xfrm>
+            <a:off x="504000" y="226080"/>
+            <a:ext cx="9071640" cy="946440"/>
+          </a:xfrm>
+          <a:prstGeom prst="rect">
+            <a:avLst/>
+          </a:prstGeom>
+          <a:noFill/>
+          <a:ln w="0">
+            <a:noFill/>
+          </a:ln>
+        </p:spPr>
+        <p:txBody>
+          <a:bodyPr lIns="0" rIns="0" tIns="0" bIns="0" anchor="ctr">
+            <a:noAutofit/>
+          </a:bodyPr>
+          <a:p>
+            <a:pPr indent="0" algn="ctr">
+              <a:buNone/>
+            </a:pPr>
+            <a:r>
+              <a:rPr b="0" lang="en-US" sz="4400" spc="-1" strike="noStrike">
+                <a:solidFill>
+                  <a:srgbClr val="000000"/>
+                </a:solidFill>
+                <a:latin typeface="Arial"/>
+              </a:rPr>
+              <a:t>Resources</a:t>
+            </a:r>
+            <a:endParaRPr b="0" lang="en-US" sz="4400" spc="-1" strike="noStrike">
+              <a:solidFill>
+                <a:srgbClr val="000000"/>
+              </a:solidFill>
+              <a:latin typeface="Arial"/>
+            </a:endParaRPr>
+          </a:p>
+        </p:txBody>
+      </p:sp>
+      <p:sp>
+        <p:nvSpPr>
+          <p:cNvPr id="113" name="PlaceHolder 2"/>
+          <p:cNvSpPr>
+            <a:spLocks noGrp="1"/>
+          </p:cNvSpPr>
+          <p:nvPr>
+            <p:ph/>
+          </p:nvPr>
+        </p:nvSpPr>
+        <p:spPr>
+          <a:xfrm>
+            <a:off x="504000" y="1326600"/>
+            <a:ext cx="9071640" cy="3288240"/>
+          </a:xfrm>
+          <a:prstGeom prst="rect">
+            <a:avLst/>
+          </a:prstGeom>
+          <a:noFill/>
+          <a:ln w="0">
+            <a:noFill/>
+          </a:ln>
+        </p:spPr>
+        <p:txBody>
+          <a:bodyPr lIns="0" rIns="0" tIns="0" bIns="0" anchor="t">
+            <a:normAutofit fontScale="61000"/>
+          </a:bodyPr>
+          <a:p>
+            <a:pPr marL="263520" indent="-197640">
               <a:spcBef>
                 <a:spcPts val="1417"/>
               </a:spcBef>
@@ -8312,7 +8383,7 @@
             </a:endParaRPr>
           </a:p>
           <a:p>
-            <a:pPr marL="397440" indent="-298080">
+            <a:pPr marL="263520" indent="-197640">
               <a:spcBef>
                 <a:spcPts val="1417"/>
               </a:spcBef>
@@ -8341,7 +8412,7 @@
             </a:endParaRPr>
           </a:p>
           <a:p>
-            <a:pPr marL="397440" indent="-298080">
+            <a:pPr marL="263520" indent="-197640">
               <a:spcBef>
                 <a:spcPts val="1417"/>
               </a:spcBef>
@@ -8370,7 +8441,7 @@
             </a:endParaRPr>
           </a:p>
           <a:p>
-            <a:pPr marL="397440" indent="-298080">
+            <a:pPr marL="263520" indent="-197640">
               <a:spcBef>
                 <a:spcPts val="1417"/>
               </a:spcBef>
@@ -8399,7 +8470,7 @@
             </a:endParaRPr>
           </a:p>
           <a:p>
-            <a:pPr marL="397440" indent="-298080">
+            <a:pPr marL="263520" indent="-197640">
               <a:spcBef>
                 <a:spcPts val="1417"/>
               </a:spcBef>
@@ -8428,7 +8499,7 @@
             </a:endParaRPr>
           </a:p>
           <a:p>
-            <a:pPr marL="397440" indent="-298080">
+            <a:pPr marL="263520" indent="-197640">
               <a:spcBef>
                 <a:spcPts val="1417"/>
               </a:spcBef>
@@ -8457,7 +8528,94 @@
             </a:endParaRPr>
           </a:p>
           <a:p>
-            <a:pPr marL="397440" indent="0">
+            <a:pPr marL="263520" indent="-197640">
+              <a:spcBef>
+                <a:spcPts val="1417"/>
+              </a:spcBef>
+              <a:buClr>
+                <a:srgbClr val="000000"/>
+              </a:buClr>
+              <a:buSzPct val="45000"/>
+              <a:buFont typeface="Wingdings" charset="2"/>
+              <a:buChar char=""/>
+            </a:pPr>
+            <a:r>
+              <a:rPr b="0" lang="en-US" sz="3200" spc="-1" strike="noStrike">
+                <a:solidFill>
+                  <a:srgbClr val="000000"/>
+                </a:solidFill>
+                <a:latin typeface="Arial"/>
+                <a:hlinkClick r:id="rId7"/>
+              </a:rPr>
+              <a:t>Convolutional Neural Networks (CNN): Step 3 - Flattening</a:t>
+            </a:r>
+            <a:endParaRPr b="0" lang="en-US" sz="3200" spc="-1" strike="noStrike">
+              <a:solidFill>
+                <a:srgbClr val="000000"/>
+              </a:solidFill>
+              <a:latin typeface="Arial"/>
+            </a:endParaRPr>
+          </a:p>
+          <a:p>
+            <a:pPr marL="263520" indent="-197640">
+              <a:spcBef>
+                <a:spcPts val="1417"/>
+              </a:spcBef>
+              <a:buClr>
+                <a:srgbClr val="000000"/>
+              </a:buClr>
+              <a:buSzPct val="45000"/>
+              <a:buFont typeface="Wingdings" charset="2"/>
+              <a:buChar char=""/>
+            </a:pPr>
+            <a:r>
+              <a:rPr b="0" lang="en-US" sz="3200" spc="-1" strike="noStrike">
+                <a:solidFill>
+                  <a:srgbClr val="000000"/>
+                </a:solidFill>
+                <a:latin typeface="Arial"/>
+                <a:hlinkClick r:id="rId8"/>
+              </a:rPr>
+              <a:t>Feature map size calculate in CNN | Stride, Padding | Deep Learning Animation [youtube]</a:t>
+            </a:r>
+            <a:endParaRPr b="0" lang="en-US" sz="3200" spc="-1" strike="noStrike">
+              <a:solidFill>
+                <a:srgbClr val="000000"/>
+              </a:solidFill>
+              <a:latin typeface="Arial"/>
+            </a:endParaRPr>
+          </a:p>
+          <a:p>
+            <a:pPr marL="263520" indent="-197640">
+              <a:spcBef>
+                <a:spcPts val="1417"/>
+              </a:spcBef>
+              <a:buClr>
+                <a:srgbClr val="000000"/>
+              </a:buClr>
+              <a:buSzPct val="45000"/>
+              <a:buFont typeface="Wingdings" charset="2"/>
+              <a:buChar char=""/>
+            </a:pPr>
+            <a:r>
+              <a:rPr b="0" lang="en-US" sz="3200" spc="-1" strike="noStrike">
+                <a:solidFill>
+                  <a:srgbClr val="000000"/>
+                </a:solidFill>
+                <a:latin typeface="Arial"/>
+                <a:hlinkClick r:id="rId9"/>
+              </a:rPr>
+              <a:t>Fully Connected Layers in Convolutional Neural Networks</a:t>
+            </a:r>
+            <a:endParaRPr b="0" lang="en-US" sz="3200" spc="-1" strike="noStrike">
+              <a:solidFill>
+                <a:srgbClr val="000000"/>
+              </a:solidFill>
+              <a:latin typeface="Arial"/>
+            </a:endParaRPr>
+          </a:p>
+          <a:p>
+            <a:pPr marL="263520" indent="0">
               <a:spcBef>
                 <a:spcPts val="1417"/>
               </a:spcBef>

</xml_diff>

<commit_message>
add padding types slide
</commit_message>
<xml_diff>
--- a/CNN.pptx
+++ b/CNN.pptx
@@ -27,6 +27,7 @@
     <p:sldId id="272" r:id="rId20"/>
     <p:sldId id="273" r:id="rId21"/>
     <p:sldId id="274" r:id="rId22"/>
+    <p:sldId id="275" r:id="rId23"/>
   </p:sldIdLst>
   <p:sldSz cx="10080625" cy="5670550"/>
   <p:notesSz cx="7772400" cy="10058400"/>
@@ -357,7 +358,7 @@
             <a:pPr indent="0" algn="r">
               <a:buNone/>
             </a:pPr>
-            <a:fld id="{62BE3A67-271C-4438-8660-5C8A41BB8055}" type="slidenum">
+            <a:fld id="{761D5A96-CC0B-4C88-BE78-4EF0115CF9EE}" type="slidenum">
               <a:rPr b="0" lang="en-US" sz="1400" spc="-1" strike="noStrike">
                 <a:solidFill>
                   <a:srgbClr val="000000"/>
@@ -381,7 +382,7 @@
 </p:notesMaster>
 </file>
 
-<file path=ppt/notesSlides/notesSlide16.xml><?xml version="1.0" encoding="utf-8"?>
+<file path=ppt/notesSlides/notesSlide17.xml><?xml version="1.0" encoding="utf-8"?>
 <p:notes xmlns:a="http://schemas.openxmlformats.org/drawingml/2006/main" xmlns:p="http://schemas.openxmlformats.org/presentationml/2006/main" xmlns:r="http://schemas.openxmlformats.org/officeDocument/2006/relationships" xmlns:p14="http://schemas.microsoft.com/office/powerpoint/2010/main" xmlns:p15="http://schemas.microsoft.com/office/powerpoint/2012/main" xmlns:mc="http://schemas.openxmlformats.org/markup-compatibility/2006">
   <p:cSld>
     <p:spTree>
@@ -400,7 +401,7 @@
       </p:grpSpPr>
       <p:sp>
         <p:nvSpPr>
-          <p:cNvPr id="120" name="PlaceHolder 1"/>
+          <p:cNvPr id="127" name="PlaceHolder 1"/>
           <p:cNvSpPr>
             <a:spLocks noGrp="1"/>
           </p:cNvSpPr>
@@ -423,7 +424,7 @@
       </p:sp>
       <p:sp>
         <p:nvSpPr>
-          <p:cNvPr id="121" name="PlaceHolder 2"/>
+          <p:cNvPr id="128" name="PlaceHolder 2"/>
           <p:cNvSpPr>
             <a:spLocks noGrp="1"/>
           </p:cNvSpPr>
@@ -556,7 +557,7 @@
       </p:grpSpPr>
       <p:sp>
         <p:nvSpPr>
-          <p:cNvPr id="114" name="PlaceHolder 1"/>
+          <p:cNvPr id="121" name="PlaceHolder 1"/>
           <p:cNvSpPr>
             <a:spLocks noGrp="1"/>
           </p:cNvSpPr>
@@ -579,7 +580,7 @@
       </p:sp>
       <p:sp>
         <p:nvSpPr>
-          <p:cNvPr id="115" name="PlaceHolder 2"/>
+          <p:cNvPr id="122" name="PlaceHolder 2"/>
           <p:cNvSpPr>
             <a:spLocks noGrp="1"/>
           </p:cNvSpPr>
@@ -704,7 +705,7 @@
       </p:grpSpPr>
       <p:sp>
         <p:nvSpPr>
-          <p:cNvPr id="116" name="PlaceHolder 1"/>
+          <p:cNvPr id="123" name="PlaceHolder 1"/>
           <p:cNvSpPr>
             <a:spLocks noGrp="1"/>
           </p:cNvSpPr>
@@ -727,7 +728,7 @@
       </p:sp>
       <p:sp>
         <p:nvSpPr>
-          <p:cNvPr id="117" name="PlaceHolder 2"/>
+          <p:cNvPr id="124" name="PlaceHolder 2"/>
           <p:cNvSpPr>
             <a:spLocks noGrp="1"/>
           </p:cNvSpPr>
@@ -943,7 +944,7 @@
       </p:grpSpPr>
       <p:sp>
         <p:nvSpPr>
-          <p:cNvPr id="118" name="PlaceHolder 1"/>
+          <p:cNvPr id="125" name="PlaceHolder 1"/>
           <p:cNvSpPr>
             <a:spLocks noGrp="1"/>
           </p:cNvSpPr>
@@ -966,7 +967,7 @@
       </p:sp>
       <p:sp>
         <p:nvSpPr>
-          <p:cNvPr id="119" name="PlaceHolder 2"/>
+          <p:cNvPr id="126" name="PlaceHolder 2"/>
           <p:cNvSpPr>
             <a:spLocks noGrp="1"/>
           </p:cNvSpPr>
@@ -1109,7 +1110,7 @@
         <p:txBody>
           <a:bodyPr/>
           <a:p>
-            <a:fld id="{C4B90D89-7902-4047-A37F-17C7FF51A0B8}" type="slidenum">
+            <a:fld id="{D8FF8748-F054-46D4-81FE-A4334F42625C}" type="slidenum">
               <a:t>&lt;#&gt;</a:t>
             </a:fld>
           </a:p>
@@ -1318,7 +1319,7 @@
         <p:txBody>
           <a:bodyPr/>
           <a:p>
-            <a:fld id="{7252F51C-3A82-4AF1-98EE-FF54AC7234B5}" type="slidenum">
+            <a:fld id="{5563D445-48BE-49C3-BBDA-E424F015B164}" type="slidenum">
               <a:t>&lt;#&gt;</a:t>
             </a:fld>
           </a:p>
@@ -1613,7 +1614,7 @@
         <p:txBody>
           <a:bodyPr/>
           <a:p>
-            <a:fld id="{DF66BA93-AFCA-4E78-9B51-E9140757D688}" type="slidenum">
+            <a:fld id="{F58AAA94-F468-4F05-A6EE-52953C39E4F6}" type="slidenum">
               <a:t>&lt;#&gt;</a:t>
             </a:fld>
           </a:p>
@@ -1994,7 +1995,7 @@
         <p:txBody>
           <a:bodyPr/>
           <a:p>
-            <a:fld id="{6B77DBE9-F270-45E2-A67D-D2233AB4FBC4}" type="slidenum">
+            <a:fld id="{2B5DC771-1A4D-4ED5-9A8B-9C7BAA83745C}" type="slidenum">
               <a:t>&lt;#&gt;</a:t>
             </a:fld>
           </a:p>
@@ -2157,7 +2158,7 @@
         <p:txBody>
           <a:bodyPr/>
           <a:p>
-            <a:fld id="{0A962805-C592-4BDC-9678-B39AAC73813F}" type="slidenum">
+            <a:fld id="{F7D3738C-EB2D-4626-88C8-AB35B2750CF3}" type="slidenum">
               <a:t>&lt;#&gt;</a:t>
             </a:fld>
           </a:p>
@@ -2323,7 +2324,7 @@
         <p:txBody>
           <a:bodyPr/>
           <a:p>
-            <a:fld id="{67FF3F8A-2C1F-4DD0-8DBF-DFF43F2DD151}" type="slidenum">
+            <a:fld id="{62812092-6142-433B-A2E8-1212E7967516}" type="slidenum">
               <a:t>&lt;#&gt;</a:t>
             </a:fld>
           </a:p>
@@ -2532,7 +2533,7 @@
         <p:txBody>
           <a:bodyPr/>
           <a:p>
-            <a:fld id="{85E0287F-9CF0-477C-8A58-2EFA2F3D1F54}" type="slidenum">
+            <a:fld id="{CD08AEEA-C13D-4574-817A-C889809C89E2}" type="slidenum">
               <a:t>&lt;#&gt;</a:t>
             </a:fld>
           </a:p>
@@ -2655,7 +2656,7 @@
         <p:txBody>
           <a:bodyPr/>
           <a:p>
-            <a:fld id="{FE9615BB-FA62-44E1-BE0A-FE72A8D9660B}" type="slidenum">
+            <a:fld id="{9C78CCA0-B986-497D-879F-9C6EB6FBE2F4}" type="slidenum">
               <a:t>&lt;#&gt;</a:t>
             </a:fld>
           </a:p>
@@ -2776,7 +2777,7 @@
         <p:txBody>
           <a:bodyPr/>
           <a:p>
-            <a:fld id="{DEC431D8-EF34-4DBE-BB91-25C2CE566C7F}" type="slidenum">
+            <a:fld id="{DAB2DE71-7111-4E75-A3E0-E84BCC2497A4}" type="slidenum">
               <a:t>&lt;#&gt;</a:t>
             </a:fld>
           </a:p>
@@ -3028,7 +3029,7 @@
         <p:txBody>
           <a:bodyPr/>
           <a:p>
-            <a:fld id="{C08033D2-02D5-4694-8921-D1876D7CF16B}" type="slidenum">
+            <a:fld id="{E5A8DBEE-827F-4D41-9250-AE8007C87F55}" type="slidenum">
               <a:t>&lt;#&gt;</a:t>
             </a:fld>
           </a:p>
@@ -3280,7 +3281,7 @@
         <p:txBody>
           <a:bodyPr/>
           <a:p>
-            <a:fld id="{CA4E9F52-B0DD-472A-8F00-CE9375EB14ED}" type="slidenum">
+            <a:fld id="{798E63AF-5C2A-45A6-A8B5-A630060C8403}" type="slidenum">
               <a:t>&lt;#&gt;</a:t>
             </a:fld>
           </a:p>
@@ -3532,7 +3533,7 @@
         <p:txBody>
           <a:bodyPr/>
           <a:p>
-            <a:fld id="{DBF6A764-CD77-489A-9899-7FD9FC72EA94}" type="slidenum">
+            <a:fld id="{A072A163-2C64-4F73-83FC-42894957980C}" type="slidenum">
               <a:t>&lt;#&gt;</a:t>
             </a:fld>
           </a:p>
@@ -4017,7 +4018,7 @@
             <a:pPr indent="0" algn="r">
               <a:buNone/>
             </a:pPr>
-            <a:fld id="{9184E723-51CC-40BE-9BB2-E7D1D8223D2F}" type="slidenum">
+            <a:fld id="{D5D233E6-DE83-401D-B0D5-A0346FD899F9}" type="slidenum">
               <a:rPr b="0" lang="en-US" sz="1400" spc="-1" strike="noStrike">
                 <a:solidFill>
                   <a:srgbClr val="000000"/>
@@ -7037,10 +7038,20 @@
                   <a:srgbClr val="000000"/>
                 </a:solidFill>
                 <a:latin typeface="Arial"/>
+                <a:ea typeface="Noto Sans CJK SC"/>
               </a:rPr>
-              <a:t>Calculate the feature map size</a:t>
-            </a:r>
-            <a:endParaRPr b="0" lang="en-US" sz="4400" spc="-1" strike="noStrike">
+              <a:t>Padding Types </a:t>
+            </a:r>
+            <a:r>
+              <a:rPr b="0" lang="en-US" sz="2200" spc="-1" strike="noStrike">
+                <a:solidFill>
+                  <a:srgbClr val="000000"/>
+                </a:solidFill>
+                <a:latin typeface="Arial"/>
+              </a:rPr>
+              <a:t>Convolutional layer cont..</a:t>
+            </a:r>
+            <a:endParaRPr b="0" lang="en-US" sz="2200" spc="-1" strike="noStrike">
               <a:solidFill>
                 <a:srgbClr val="000000"/>
               </a:solidFill>
@@ -7049,29 +7060,1101 @@
           </a:p>
         </p:txBody>
       </p:sp>
-      <p:pic>
-        <p:nvPicPr>
-          <p:cNvPr id="93" name="" descr=""/>
-          <p:cNvPicPr/>
+      <p:graphicFrame>
+        <p:nvGraphicFramePr>
+          <p:cNvPr id="93" name=""/>
+          <p:cNvGraphicFramePr/>
           <p:nvPr/>
-        </p:nvPicPr>
-        <p:blipFill>
-          <a:blip r:embed="rId1"/>
-          <a:stretch/>
-        </p:blipFill>
+        </p:nvGraphicFramePr>
+        <p:xfrm>
+          <a:off x="3359520" y="2961720"/>
+          <a:ext cx="917280" cy="912600"/>
+        </p:xfrm>
+        <a:graphic>
+          <a:graphicData uri="http://schemas.openxmlformats.org/drawingml/2006/table">
+            <a:tbl>
+              <a:tblPr/>
+              <a:tblGrid>
+                <a:gridCol w="459000"/>
+                <a:gridCol w="458640"/>
+              </a:tblGrid>
+              <a:tr h="456480">
+                <a:tc>
+                  <a:txBody>
+                    <a:bodyPr lIns="36000" rIns="36000" tIns="36000" bIns="36000" anchor="t">
+                      <a:noAutofit/>
+                    </a:bodyPr>
+                    <a:p>
+                      <a:endParaRPr b="0" lang="en-US" sz="1800" spc="-1" strike="noStrike">
+                        <a:solidFill>
+                          <a:srgbClr val="000000"/>
+                        </a:solidFill>
+                        <a:latin typeface="Arial"/>
+                      </a:endParaRPr>
+                    </a:p>
+                  </a:txBody>
+                  <a:tcPr anchor="t" marL="36000" marR="36000">
+                    <a:lnL w="7200">
+                      <a:solidFill>
+                        <a:srgbClr val="000000"/>
+                      </a:solidFill>
+                      <a:prstDash val="solid"/>
+                    </a:lnL>
+                    <a:lnR w="7200">
+                      <a:solidFill>
+                        <a:srgbClr val="000000"/>
+                      </a:solidFill>
+                      <a:prstDash val="solid"/>
+                    </a:lnR>
+                    <a:lnT w="7200">
+                      <a:solidFill>
+                        <a:srgbClr val="000000"/>
+                      </a:solidFill>
+                      <a:prstDash val="solid"/>
+                    </a:lnT>
+                    <a:lnB w="7200">
+                      <a:solidFill>
+                        <a:srgbClr val="000000"/>
+                      </a:solidFill>
+                      <a:prstDash val="solid"/>
+                    </a:lnB>
+                    <a:solidFill>
+                      <a:srgbClr val="bf0041"/>
+                    </a:solidFill>
+                  </a:tcPr>
+                </a:tc>
+                <a:tc>
+                  <a:txBody>
+                    <a:bodyPr lIns="36000" rIns="36000" tIns="36000" bIns="36000" anchor="t">
+                      <a:noAutofit/>
+                    </a:bodyPr>
+                    <a:p>
+                      <a:endParaRPr b="0" lang="en-US" sz="1800" spc="-1" strike="noStrike">
+                        <a:solidFill>
+                          <a:srgbClr val="000000"/>
+                        </a:solidFill>
+                        <a:latin typeface="Arial"/>
+                      </a:endParaRPr>
+                    </a:p>
+                  </a:txBody>
+                  <a:tcPr anchor="t" marL="36000" marR="36000">
+                    <a:lnL w="7200">
+                      <a:solidFill>
+                        <a:srgbClr val="000000"/>
+                      </a:solidFill>
+                      <a:prstDash val="solid"/>
+                    </a:lnL>
+                    <a:lnR w="7200">
+                      <a:solidFill>
+                        <a:srgbClr val="000000"/>
+                      </a:solidFill>
+                      <a:prstDash val="solid"/>
+                    </a:lnR>
+                    <a:lnT w="7200">
+                      <a:solidFill>
+                        <a:srgbClr val="000000"/>
+                      </a:solidFill>
+                      <a:prstDash val="solid"/>
+                    </a:lnT>
+                    <a:lnB w="7200">
+                      <a:solidFill>
+                        <a:srgbClr val="000000"/>
+                      </a:solidFill>
+                      <a:prstDash val="solid"/>
+                    </a:lnB>
+                    <a:solidFill>
+                      <a:srgbClr val="bf0041"/>
+                    </a:solidFill>
+                  </a:tcPr>
+                </a:tc>
+              </a:tr>
+              <a:tr h="456480">
+                <a:tc>
+                  <a:txBody>
+                    <a:bodyPr lIns="36000" rIns="36000" tIns="36000" bIns="36000" anchor="t">
+                      <a:noAutofit/>
+                    </a:bodyPr>
+                    <a:p>
+                      <a:endParaRPr b="0" lang="en-US" sz="1800" spc="-1" strike="noStrike">
+                        <a:solidFill>
+                          <a:srgbClr val="000000"/>
+                        </a:solidFill>
+                        <a:latin typeface="Arial"/>
+                      </a:endParaRPr>
+                    </a:p>
+                  </a:txBody>
+                  <a:tcPr anchor="t" marL="36000" marR="36000">
+                    <a:lnL w="7200">
+                      <a:solidFill>
+                        <a:srgbClr val="000000"/>
+                      </a:solidFill>
+                      <a:prstDash val="solid"/>
+                    </a:lnL>
+                    <a:lnR w="7200">
+                      <a:solidFill>
+                        <a:srgbClr val="000000"/>
+                      </a:solidFill>
+                      <a:prstDash val="solid"/>
+                    </a:lnR>
+                    <a:lnT w="7200">
+                      <a:solidFill>
+                        <a:srgbClr val="000000"/>
+                      </a:solidFill>
+                      <a:prstDash val="solid"/>
+                    </a:lnT>
+                    <a:lnB w="7200">
+                      <a:solidFill>
+                        <a:srgbClr val="000000"/>
+                      </a:solidFill>
+                      <a:prstDash val="solid"/>
+                    </a:lnB>
+                    <a:solidFill>
+                      <a:srgbClr val="bf0041"/>
+                    </a:solidFill>
+                  </a:tcPr>
+                </a:tc>
+                <a:tc>
+                  <a:txBody>
+                    <a:bodyPr lIns="36000" rIns="36000" tIns="36000" bIns="36000" anchor="t">
+                      <a:noAutofit/>
+                    </a:bodyPr>
+                    <a:p>
+                      <a:endParaRPr b="0" lang="en-US" sz="1800" spc="-1" strike="noStrike">
+                        <a:solidFill>
+                          <a:srgbClr val="000000"/>
+                        </a:solidFill>
+                        <a:latin typeface="Arial"/>
+                      </a:endParaRPr>
+                    </a:p>
+                  </a:txBody>
+                  <a:tcPr anchor="t" marL="36000" marR="36000">
+                    <a:lnL w="7200">
+                      <a:solidFill>
+                        <a:srgbClr val="000000"/>
+                      </a:solidFill>
+                      <a:prstDash val="solid"/>
+                    </a:lnL>
+                    <a:lnR w="7200">
+                      <a:solidFill>
+                        <a:srgbClr val="000000"/>
+                      </a:solidFill>
+                      <a:prstDash val="solid"/>
+                    </a:lnR>
+                    <a:lnT w="7200">
+                      <a:solidFill>
+                        <a:srgbClr val="000000"/>
+                      </a:solidFill>
+                      <a:prstDash val="solid"/>
+                    </a:lnT>
+                    <a:lnB w="7200">
+                      <a:solidFill>
+                        <a:srgbClr val="000000"/>
+                      </a:solidFill>
+                      <a:prstDash val="solid"/>
+                    </a:lnB>
+                    <a:solidFill>
+                      <a:srgbClr val="bf0041"/>
+                    </a:solidFill>
+                  </a:tcPr>
+                </a:tc>
+              </a:tr>
+            </a:tbl>
+          </a:graphicData>
+        </a:graphic>
+      </p:graphicFrame>
+      <p:graphicFrame>
+        <p:nvGraphicFramePr>
+          <p:cNvPr id="94" name=""/>
+          <p:cNvGraphicFramePr/>
+          <p:nvPr/>
+        </p:nvGraphicFramePr>
+        <p:xfrm>
+          <a:off x="5364720" y="2434320"/>
+          <a:ext cx="1846440" cy="1767960"/>
+        </p:xfrm>
+        <a:graphic>
+          <a:graphicData uri="http://schemas.openxmlformats.org/drawingml/2006/table">
+            <a:tbl>
+              <a:tblPr/>
+              <a:tblGrid>
+                <a:gridCol w="462240"/>
+                <a:gridCol w="462240"/>
+                <a:gridCol w="462240"/>
+                <a:gridCol w="460080"/>
+              </a:tblGrid>
+              <a:tr h="444600">
+                <a:tc>
+                  <a:txBody>
+                    <a:bodyPr lIns="36000" rIns="36000" tIns="36000" bIns="36000" anchor="ctr">
+                      <a:noAutofit/>
+                    </a:bodyPr>
+                    <a:p>
+                      <a:pPr algn="ctr"/>
+                      <a:endParaRPr b="0" lang="en-US" sz="1800" spc="-1" strike="noStrike">
+                        <a:solidFill>
+                          <a:srgbClr val="000000"/>
+                        </a:solidFill>
+                        <a:latin typeface="Arial"/>
+                      </a:endParaRPr>
+                    </a:p>
+                  </a:txBody>
+                  <a:tcPr anchor="ctr" marL="36000" marR="36000">
+                    <a:lnL w="7200">
+                      <a:solidFill>
+                        <a:srgbClr val="000000"/>
+                      </a:solidFill>
+                      <a:prstDash val="solid"/>
+                    </a:lnL>
+                    <a:lnR w="7200">
+                      <a:solidFill>
+                        <a:srgbClr val="000000"/>
+                      </a:solidFill>
+                      <a:prstDash val="solid"/>
+                    </a:lnR>
+                    <a:lnT w="7200">
+                      <a:solidFill>
+                        <a:srgbClr val="000000"/>
+                      </a:solidFill>
+                      <a:prstDash val="solid"/>
+                    </a:lnT>
+                    <a:lnB w="7200">
+                      <a:solidFill>
+                        <a:srgbClr val="000000"/>
+                      </a:solidFill>
+                      <a:prstDash val="solid"/>
+                    </a:lnB>
+                    <a:noFill/>
+                  </a:tcPr>
+                </a:tc>
+                <a:tc>
+                  <a:txBody>
+                    <a:bodyPr lIns="36000" rIns="36000" tIns="36000" bIns="36000" anchor="ctr">
+                      <a:noAutofit/>
+                    </a:bodyPr>
+                    <a:p>
+                      <a:pPr algn="ctr"/>
+                      <a:endParaRPr b="0" lang="en-US" sz="1800" spc="-1" strike="noStrike">
+                        <a:solidFill>
+                          <a:srgbClr val="000000"/>
+                        </a:solidFill>
+                        <a:latin typeface="Arial"/>
+                      </a:endParaRPr>
+                    </a:p>
+                  </a:txBody>
+                  <a:tcPr anchor="ctr" marL="36000" marR="36000">
+                    <a:lnL w="7200">
+                      <a:solidFill>
+                        <a:srgbClr val="000000"/>
+                      </a:solidFill>
+                      <a:prstDash val="solid"/>
+                    </a:lnL>
+                    <a:lnR w="7200">
+                      <a:solidFill>
+                        <a:srgbClr val="000000"/>
+                      </a:solidFill>
+                      <a:prstDash val="solid"/>
+                    </a:lnR>
+                    <a:lnT w="7200">
+                      <a:solidFill>
+                        <a:srgbClr val="000000"/>
+                      </a:solidFill>
+                      <a:prstDash val="solid"/>
+                    </a:lnT>
+                    <a:lnB w="7200">
+                      <a:solidFill>
+                        <a:srgbClr val="000000"/>
+                      </a:solidFill>
+                      <a:prstDash val="solid"/>
+                    </a:lnB>
+                    <a:noFill/>
+                  </a:tcPr>
+                </a:tc>
+                <a:tc>
+                  <a:txBody>
+                    <a:bodyPr lIns="36000" rIns="36000" tIns="36000" bIns="36000" anchor="ctr">
+                      <a:noAutofit/>
+                    </a:bodyPr>
+                    <a:p>
+                      <a:pPr algn="ctr"/>
+                      <a:endParaRPr b="0" lang="en-US" sz="1800" spc="-1" strike="noStrike">
+                        <a:solidFill>
+                          <a:srgbClr val="000000"/>
+                        </a:solidFill>
+                        <a:latin typeface="Arial"/>
+                      </a:endParaRPr>
+                    </a:p>
+                  </a:txBody>
+                  <a:tcPr anchor="ctr" marL="36000" marR="36000">
+                    <a:lnL w="7200">
+                      <a:solidFill>
+                        <a:srgbClr val="000000"/>
+                      </a:solidFill>
+                      <a:prstDash val="solid"/>
+                    </a:lnL>
+                    <a:lnR w="7200">
+                      <a:solidFill>
+                        <a:srgbClr val="000000"/>
+                      </a:solidFill>
+                      <a:prstDash val="solid"/>
+                    </a:lnR>
+                    <a:lnT w="7200">
+                      <a:solidFill>
+                        <a:srgbClr val="000000"/>
+                      </a:solidFill>
+                      <a:prstDash val="solid"/>
+                    </a:lnT>
+                    <a:lnB w="7200">
+                      <a:solidFill>
+                        <a:srgbClr val="000000"/>
+                      </a:solidFill>
+                      <a:prstDash val="solid"/>
+                    </a:lnB>
+                    <a:noFill/>
+                  </a:tcPr>
+                </a:tc>
+                <a:tc>
+                  <a:txBody>
+                    <a:bodyPr lIns="36000" rIns="36000" tIns="36000" bIns="36000" anchor="ctr">
+                      <a:noAutofit/>
+                    </a:bodyPr>
+                    <a:p>
+                      <a:pPr algn="ctr"/>
+                      <a:endParaRPr b="0" lang="en-US" sz="1800" spc="-1" strike="noStrike">
+                        <a:solidFill>
+                          <a:srgbClr val="000000"/>
+                        </a:solidFill>
+                        <a:latin typeface="Arial"/>
+                      </a:endParaRPr>
+                    </a:p>
+                  </a:txBody>
+                  <a:tcPr anchor="ctr" marL="36000" marR="36000">
+                    <a:lnL w="7200">
+                      <a:solidFill>
+                        <a:srgbClr val="000000"/>
+                      </a:solidFill>
+                      <a:prstDash val="solid"/>
+                    </a:lnL>
+                    <a:lnR w="7200">
+                      <a:solidFill>
+                        <a:srgbClr val="000000"/>
+                      </a:solidFill>
+                      <a:prstDash val="solid"/>
+                    </a:lnR>
+                    <a:lnT w="7200">
+                      <a:solidFill>
+                        <a:srgbClr val="000000"/>
+                      </a:solidFill>
+                      <a:prstDash val="solid"/>
+                    </a:lnT>
+                    <a:lnB w="7200">
+                      <a:solidFill>
+                        <a:srgbClr val="000000"/>
+                      </a:solidFill>
+                      <a:prstDash val="solid"/>
+                    </a:lnB>
+                    <a:noFill/>
+                  </a:tcPr>
+                </a:tc>
+              </a:tr>
+              <a:tr h="444600">
+                <a:tc>
+                  <a:txBody>
+                    <a:bodyPr lIns="36000" rIns="36000" tIns="36000" bIns="36000" anchor="ctr">
+                      <a:noAutofit/>
+                    </a:bodyPr>
+                    <a:p>
+                      <a:endParaRPr b="0" lang="en-US" sz="1800" spc="-1" strike="noStrike">
+                        <a:solidFill>
+                          <a:srgbClr val="000000"/>
+                        </a:solidFill>
+                        <a:latin typeface="Arial"/>
+                      </a:endParaRPr>
+                    </a:p>
+                  </a:txBody>
+                  <a:tcPr anchor="ctr" marL="36000" marR="36000">
+                    <a:lnL w="7200">
+                      <a:solidFill>
+                        <a:srgbClr val="000000"/>
+                      </a:solidFill>
+                      <a:prstDash val="solid"/>
+                    </a:lnL>
+                    <a:lnR w="7200">
+                      <a:solidFill>
+                        <a:srgbClr val="000000"/>
+                      </a:solidFill>
+                      <a:prstDash val="solid"/>
+                    </a:lnR>
+                    <a:lnT w="7200">
+                      <a:solidFill>
+                        <a:srgbClr val="000000"/>
+                      </a:solidFill>
+                      <a:prstDash val="solid"/>
+                    </a:lnT>
+                    <a:lnB w="7200">
+                      <a:solidFill>
+                        <a:srgbClr val="000000"/>
+                      </a:solidFill>
+                      <a:prstDash val="solid"/>
+                    </a:lnB>
+                    <a:noFill/>
+                  </a:tcPr>
+                </a:tc>
+                <a:tc>
+                  <a:txBody>
+                    <a:bodyPr lIns="36000" rIns="36000" tIns="36000" bIns="36000" anchor="ctr">
+                      <a:noAutofit/>
+                    </a:bodyPr>
+                    <a:p>
+                      <a:pPr algn="ctr"/>
+                      <a:endParaRPr b="0" lang="en-US" sz="1800" spc="-1" strike="noStrike">
+                        <a:solidFill>
+                          <a:srgbClr val="000000"/>
+                        </a:solidFill>
+                        <a:latin typeface="Arial"/>
+                      </a:endParaRPr>
+                    </a:p>
+                  </a:txBody>
+                  <a:tcPr anchor="ctr" marL="36000" marR="36000">
+                    <a:lnL w="7200">
+                      <a:solidFill>
+                        <a:srgbClr val="000000"/>
+                      </a:solidFill>
+                      <a:prstDash val="solid"/>
+                    </a:lnL>
+                    <a:lnR w="7200">
+                      <a:solidFill>
+                        <a:srgbClr val="000000"/>
+                      </a:solidFill>
+                      <a:prstDash val="solid"/>
+                    </a:lnR>
+                    <a:lnT w="7200">
+                      <a:solidFill>
+                        <a:srgbClr val="000000"/>
+                      </a:solidFill>
+                      <a:prstDash val="solid"/>
+                    </a:lnT>
+                    <a:lnB w="7200">
+                      <a:solidFill>
+                        <a:srgbClr val="000000"/>
+                      </a:solidFill>
+                      <a:prstDash val="solid"/>
+                    </a:lnB>
+                    <a:solidFill>
+                      <a:srgbClr val="bf0041"/>
+                    </a:solidFill>
+                  </a:tcPr>
+                </a:tc>
+                <a:tc>
+                  <a:txBody>
+                    <a:bodyPr lIns="36000" rIns="36000" tIns="36000" bIns="36000" anchor="ctr">
+                      <a:noAutofit/>
+                    </a:bodyPr>
+                    <a:p>
+                      <a:pPr algn="ctr"/>
+                      <a:endParaRPr b="0" lang="en-US" sz="1800" spc="-1" strike="noStrike">
+                        <a:solidFill>
+                          <a:srgbClr val="000000"/>
+                        </a:solidFill>
+                        <a:latin typeface="Arial"/>
+                      </a:endParaRPr>
+                    </a:p>
+                  </a:txBody>
+                  <a:tcPr anchor="ctr" marL="36000" marR="36000">
+                    <a:lnL w="7200">
+                      <a:solidFill>
+                        <a:srgbClr val="000000"/>
+                      </a:solidFill>
+                      <a:prstDash val="solid"/>
+                    </a:lnL>
+                    <a:lnR w="7200">
+                      <a:solidFill>
+                        <a:srgbClr val="000000"/>
+                      </a:solidFill>
+                      <a:prstDash val="solid"/>
+                    </a:lnR>
+                    <a:lnT w="7200">
+                      <a:solidFill>
+                        <a:srgbClr val="000000"/>
+                      </a:solidFill>
+                      <a:prstDash val="solid"/>
+                    </a:lnT>
+                    <a:lnB w="7200">
+                      <a:solidFill>
+                        <a:srgbClr val="000000"/>
+                      </a:solidFill>
+                      <a:prstDash val="solid"/>
+                    </a:lnB>
+                    <a:solidFill>
+                      <a:srgbClr val="bf0041"/>
+                    </a:solidFill>
+                  </a:tcPr>
+                </a:tc>
+                <a:tc>
+                  <a:txBody>
+                    <a:bodyPr lIns="36000" rIns="36000" tIns="36000" bIns="36000" anchor="ctr">
+                      <a:noAutofit/>
+                    </a:bodyPr>
+                    <a:p>
+                      <a:pPr algn="ctr"/>
+                      <a:endParaRPr b="0" lang="en-US" sz="1800" spc="-1" strike="noStrike">
+                        <a:solidFill>
+                          <a:srgbClr val="000000"/>
+                        </a:solidFill>
+                        <a:latin typeface="Arial"/>
+                      </a:endParaRPr>
+                    </a:p>
+                  </a:txBody>
+                  <a:tcPr anchor="ctr" marL="36000" marR="36000">
+                    <a:lnL w="7200">
+                      <a:solidFill>
+                        <a:srgbClr val="000000"/>
+                      </a:solidFill>
+                      <a:prstDash val="solid"/>
+                    </a:lnL>
+                    <a:lnR w="7200">
+                      <a:solidFill>
+                        <a:srgbClr val="000000"/>
+                      </a:solidFill>
+                      <a:prstDash val="solid"/>
+                    </a:lnR>
+                    <a:lnT w="7200">
+                      <a:solidFill>
+                        <a:srgbClr val="000000"/>
+                      </a:solidFill>
+                      <a:prstDash val="solid"/>
+                    </a:lnT>
+                    <a:lnB w="7200">
+                      <a:solidFill>
+                        <a:srgbClr val="000000"/>
+                      </a:solidFill>
+                      <a:prstDash val="solid"/>
+                    </a:lnB>
+                    <a:noFill/>
+                  </a:tcPr>
+                </a:tc>
+              </a:tr>
+              <a:tr h="444600">
+                <a:tc>
+                  <a:txBody>
+                    <a:bodyPr lIns="36000" rIns="36000" tIns="36000" bIns="36000" anchor="ctr">
+                      <a:noAutofit/>
+                    </a:bodyPr>
+                    <a:p>
+                      <a:endParaRPr b="0" lang="en-US" sz="1800" spc="-1" strike="noStrike">
+                        <a:solidFill>
+                          <a:srgbClr val="000000"/>
+                        </a:solidFill>
+                        <a:latin typeface="Arial"/>
+                      </a:endParaRPr>
+                    </a:p>
+                  </a:txBody>
+                  <a:tcPr anchor="ctr" marL="36000" marR="36000">
+                    <a:lnL w="7200">
+                      <a:solidFill>
+                        <a:srgbClr val="000000"/>
+                      </a:solidFill>
+                      <a:prstDash val="solid"/>
+                    </a:lnL>
+                    <a:lnR w="7200">
+                      <a:solidFill>
+                        <a:srgbClr val="000000"/>
+                      </a:solidFill>
+                      <a:prstDash val="solid"/>
+                    </a:lnR>
+                    <a:lnT w="7200">
+                      <a:solidFill>
+                        <a:srgbClr val="000000"/>
+                      </a:solidFill>
+                      <a:prstDash val="solid"/>
+                    </a:lnT>
+                    <a:lnB w="7200">
+                      <a:solidFill>
+                        <a:srgbClr val="000000"/>
+                      </a:solidFill>
+                      <a:prstDash val="solid"/>
+                    </a:lnB>
+                    <a:noFill/>
+                  </a:tcPr>
+                </a:tc>
+                <a:tc>
+                  <a:txBody>
+                    <a:bodyPr lIns="36000" rIns="36000" tIns="36000" bIns="36000" anchor="ctr">
+                      <a:noAutofit/>
+                    </a:bodyPr>
+                    <a:p>
+                      <a:pPr algn="ctr"/>
+                      <a:endParaRPr b="0" lang="en-US" sz="1800" spc="-1" strike="noStrike">
+                        <a:solidFill>
+                          <a:srgbClr val="000000"/>
+                        </a:solidFill>
+                        <a:latin typeface="Arial"/>
+                      </a:endParaRPr>
+                    </a:p>
+                  </a:txBody>
+                  <a:tcPr anchor="ctr" marL="36000" marR="36000">
+                    <a:lnL w="7200">
+                      <a:solidFill>
+                        <a:srgbClr val="000000"/>
+                      </a:solidFill>
+                      <a:prstDash val="solid"/>
+                    </a:lnL>
+                    <a:lnR w="7200">
+                      <a:solidFill>
+                        <a:srgbClr val="000000"/>
+                      </a:solidFill>
+                      <a:prstDash val="solid"/>
+                    </a:lnR>
+                    <a:lnT w="7200">
+                      <a:solidFill>
+                        <a:srgbClr val="000000"/>
+                      </a:solidFill>
+                      <a:prstDash val="solid"/>
+                    </a:lnT>
+                    <a:lnB w="7200">
+                      <a:solidFill>
+                        <a:srgbClr val="000000"/>
+                      </a:solidFill>
+                      <a:prstDash val="solid"/>
+                    </a:lnB>
+                    <a:solidFill>
+                      <a:srgbClr val="bf0041"/>
+                    </a:solidFill>
+                  </a:tcPr>
+                </a:tc>
+                <a:tc>
+                  <a:txBody>
+                    <a:bodyPr lIns="36000" rIns="36000" tIns="36000" bIns="36000" anchor="ctr">
+                      <a:noAutofit/>
+                    </a:bodyPr>
+                    <a:p>
+                      <a:pPr algn="ctr"/>
+                      <a:endParaRPr b="0" lang="en-US" sz="1800" spc="-1" strike="noStrike">
+                        <a:solidFill>
+                          <a:srgbClr val="000000"/>
+                        </a:solidFill>
+                        <a:latin typeface="Arial"/>
+                      </a:endParaRPr>
+                    </a:p>
+                  </a:txBody>
+                  <a:tcPr anchor="ctr" marL="36000" marR="36000">
+                    <a:lnL w="7200">
+                      <a:solidFill>
+                        <a:srgbClr val="000000"/>
+                      </a:solidFill>
+                      <a:prstDash val="solid"/>
+                    </a:lnL>
+                    <a:lnR w="7200">
+                      <a:solidFill>
+                        <a:srgbClr val="000000"/>
+                      </a:solidFill>
+                      <a:prstDash val="solid"/>
+                    </a:lnR>
+                    <a:lnT w="7200">
+                      <a:solidFill>
+                        <a:srgbClr val="000000"/>
+                      </a:solidFill>
+                      <a:prstDash val="solid"/>
+                    </a:lnT>
+                    <a:lnB w="7200">
+                      <a:solidFill>
+                        <a:srgbClr val="000000"/>
+                      </a:solidFill>
+                      <a:prstDash val="solid"/>
+                    </a:lnB>
+                    <a:solidFill>
+                      <a:srgbClr val="bf0041"/>
+                    </a:solidFill>
+                  </a:tcPr>
+                </a:tc>
+                <a:tc>
+                  <a:txBody>
+                    <a:bodyPr lIns="36000" rIns="36000" tIns="36000" bIns="36000" anchor="ctr">
+                      <a:noAutofit/>
+                    </a:bodyPr>
+                    <a:p>
+                      <a:pPr algn="ctr"/>
+                      <a:endParaRPr b="0" lang="en-US" sz="1800" spc="-1" strike="noStrike">
+                        <a:solidFill>
+                          <a:srgbClr val="000000"/>
+                        </a:solidFill>
+                        <a:latin typeface="Arial"/>
+                      </a:endParaRPr>
+                    </a:p>
+                  </a:txBody>
+                  <a:tcPr anchor="ctr" marL="36000" marR="36000">
+                    <a:lnL w="7200">
+                      <a:solidFill>
+                        <a:srgbClr val="000000"/>
+                      </a:solidFill>
+                      <a:prstDash val="solid"/>
+                    </a:lnL>
+                    <a:lnR w="7200">
+                      <a:solidFill>
+                        <a:srgbClr val="000000"/>
+                      </a:solidFill>
+                      <a:prstDash val="solid"/>
+                    </a:lnR>
+                    <a:lnT w="7200">
+                      <a:solidFill>
+                        <a:srgbClr val="000000"/>
+                      </a:solidFill>
+                      <a:prstDash val="solid"/>
+                    </a:lnT>
+                    <a:lnB w="7200">
+                      <a:solidFill>
+                        <a:srgbClr val="000000"/>
+                      </a:solidFill>
+                      <a:prstDash val="solid"/>
+                    </a:lnB>
+                    <a:noFill/>
+                  </a:tcPr>
+                </a:tc>
+              </a:tr>
+              <a:tr h="434520">
+                <a:tc>
+                  <a:txBody>
+                    <a:bodyPr lIns="36000" rIns="36000" tIns="36000" bIns="36000" anchor="ctr">
+                      <a:noAutofit/>
+                    </a:bodyPr>
+                    <a:p>
+                      <a:endParaRPr b="0" lang="en-US" sz="1800" spc="-1" strike="noStrike">
+                        <a:solidFill>
+                          <a:srgbClr val="000000"/>
+                        </a:solidFill>
+                        <a:latin typeface="Arial"/>
+                      </a:endParaRPr>
+                    </a:p>
+                  </a:txBody>
+                  <a:tcPr anchor="ctr" marL="36000" marR="36000">
+                    <a:lnL w="7200">
+                      <a:solidFill>
+                        <a:srgbClr val="000000"/>
+                      </a:solidFill>
+                      <a:prstDash val="solid"/>
+                    </a:lnL>
+                    <a:lnR w="7200">
+                      <a:solidFill>
+                        <a:srgbClr val="000000"/>
+                      </a:solidFill>
+                      <a:prstDash val="solid"/>
+                    </a:lnR>
+                    <a:lnT w="7200">
+                      <a:solidFill>
+                        <a:srgbClr val="000000"/>
+                      </a:solidFill>
+                      <a:prstDash val="solid"/>
+                    </a:lnT>
+                    <a:lnB w="7200">
+                      <a:solidFill>
+                        <a:srgbClr val="000000"/>
+                      </a:solidFill>
+                      <a:prstDash val="solid"/>
+                    </a:lnB>
+                    <a:noFill/>
+                  </a:tcPr>
+                </a:tc>
+                <a:tc>
+                  <a:txBody>
+                    <a:bodyPr lIns="36000" rIns="36000" tIns="36000" bIns="36000" anchor="ctr">
+                      <a:noAutofit/>
+                    </a:bodyPr>
+                    <a:p>
+                      <a:pPr algn="ctr"/>
+                      <a:endParaRPr b="0" lang="en-US" sz="1800" spc="-1" strike="noStrike">
+                        <a:solidFill>
+                          <a:srgbClr val="000000"/>
+                        </a:solidFill>
+                        <a:latin typeface="Arial"/>
+                      </a:endParaRPr>
+                    </a:p>
+                  </a:txBody>
+                  <a:tcPr anchor="ctr" marL="36000" marR="36000">
+                    <a:lnL w="7200">
+                      <a:solidFill>
+                        <a:srgbClr val="000000"/>
+                      </a:solidFill>
+                      <a:prstDash val="solid"/>
+                    </a:lnL>
+                    <a:lnR w="7200">
+                      <a:solidFill>
+                        <a:srgbClr val="000000"/>
+                      </a:solidFill>
+                      <a:prstDash val="solid"/>
+                    </a:lnR>
+                    <a:lnT w="7200">
+                      <a:solidFill>
+                        <a:srgbClr val="000000"/>
+                      </a:solidFill>
+                      <a:prstDash val="solid"/>
+                    </a:lnT>
+                    <a:lnB w="7200">
+                      <a:solidFill>
+                        <a:srgbClr val="000000"/>
+                      </a:solidFill>
+                      <a:prstDash val="solid"/>
+                    </a:lnB>
+                    <a:noFill/>
+                  </a:tcPr>
+                </a:tc>
+                <a:tc>
+                  <a:txBody>
+                    <a:bodyPr lIns="36000" rIns="36000" tIns="36000" bIns="36000" anchor="ctr">
+                      <a:noAutofit/>
+                    </a:bodyPr>
+                    <a:p>
+                      <a:pPr algn="ctr"/>
+                      <a:endParaRPr b="0" lang="en-US" sz="1800" spc="-1" strike="noStrike">
+                        <a:solidFill>
+                          <a:srgbClr val="000000"/>
+                        </a:solidFill>
+                        <a:latin typeface="Arial"/>
+                      </a:endParaRPr>
+                    </a:p>
+                  </a:txBody>
+                  <a:tcPr anchor="ctr" marL="36000" marR="36000">
+                    <a:lnL w="7200">
+                      <a:solidFill>
+                        <a:srgbClr val="000000"/>
+                      </a:solidFill>
+                      <a:prstDash val="solid"/>
+                    </a:lnL>
+                    <a:lnR w="7200">
+                      <a:solidFill>
+                        <a:srgbClr val="000000"/>
+                      </a:solidFill>
+                      <a:prstDash val="solid"/>
+                    </a:lnR>
+                    <a:lnT w="7200">
+                      <a:solidFill>
+                        <a:srgbClr val="000000"/>
+                      </a:solidFill>
+                      <a:prstDash val="solid"/>
+                    </a:lnT>
+                    <a:lnB w="7200">
+                      <a:solidFill>
+                        <a:srgbClr val="000000"/>
+                      </a:solidFill>
+                      <a:prstDash val="solid"/>
+                    </a:lnB>
+                    <a:noFill/>
+                  </a:tcPr>
+                </a:tc>
+                <a:tc>
+                  <a:txBody>
+                    <a:bodyPr lIns="36000" rIns="36000" tIns="36000" bIns="36000" anchor="ctr">
+                      <a:noAutofit/>
+                    </a:bodyPr>
+                    <a:p>
+                      <a:pPr algn="ctr"/>
+                      <a:endParaRPr b="0" lang="en-US" sz="1800" spc="-1" strike="noStrike">
+                        <a:solidFill>
+                          <a:srgbClr val="000000"/>
+                        </a:solidFill>
+                        <a:latin typeface="Arial"/>
+                      </a:endParaRPr>
+                    </a:p>
+                  </a:txBody>
+                  <a:tcPr anchor="ctr" marL="36000" marR="36000">
+                    <a:lnL w="7200">
+                      <a:solidFill>
+                        <a:srgbClr val="000000"/>
+                      </a:solidFill>
+                      <a:prstDash val="solid"/>
+                    </a:lnL>
+                    <a:lnR w="7200">
+                      <a:solidFill>
+                        <a:srgbClr val="000000"/>
+                      </a:solidFill>
+                      <a:prstDash val="solid"/>
+                    </a:lnR>
+                    <a:lnT w="7200">
+                      <a:solidFill>
+                        <a:srgbClr val="000000"/>
+                      </a:solidFill>
+                      <a:prstDash val="solid"/>
+                    </a:lnT>
+                    <a:lnB w="7200">
+                      <a:solidFill>
+                        <a:srgbClr val="000000"/>
+                      </a:solidFill>
+                      <a:prstDash val="solid"/>
+                    </a:lnB>
+                    <a:noFill/>
+                  </a:tcPr>
+                </a:tc>
+              </a:tr>
+            </a:tbl>
+          </a:graphicData>
+        </a:graphic>
+      </p:graphicFrame>
+      <p:sp>
+        <p:nvSpPr>
+          <p:cNvPr id="95" name=""/>
+          <p:cNvSpPr txBox="1"/>
+          <p:nvPr/>
+        </p:nvSpPr>
         <p:spPr>
           <a:xfrm>
-            <a:off x="1152720" y="2057400"/>
-            <a:ext cx="7305480" cy="1999800"/>
+            <a:off x="3135600" y="4022280"/>
+            <a:ext cx="1404360" cy="346320"/>
           </a:xfrm>
           <a:prstGeom prst="rect">
             <a:avLst/>
           </a:prstGeom>
+          <a:noFill/>
           <a:ln w="0">
             <a:noFill/>
           </a:ln>
         </p:spPr>
-      </p:pic>
+        <p:txBody>
+          <a:bodyPr lIns="90000" rIns="90000" tIns="45000" bIns="45000" anchor="t">
+            <a:noAutofit/>
+          </a:bodyPr>
+          <a:p>
+            <a:r>
+              <a:rPr b="0" lang="en-US" sz="1800" spc="-1" strike="noStrike">
+                <a:solidFill>
+                  <a:srgbClr val="000000"/>
+                </a:solidFill>
+                <a:latin typeface="Arial"/>
+              </a:rPr>
+              <a:t>Padding = 0</a:t>
+            </a:r>
+            <a:endParaRPr b="0" lang="en-US" sz="1800" spc="-1" strike="noStrike">
+              <a:solidFill>
+                <a:srgbClr val="000000"/>
+              </a:solidFill>
+              <a:latin typeface="Arial"/>
+            </a:endParaRPr>
+          </a:p>
+        </p:txBody>
+      </p:sp>
+      <p:sp>
+        <p:nvSpPr>
+          <p:cNvPr id="96" name=""/>
+          <p:cNvSpPr txBox="1"/>
+          <p:nvPr/>
+        </p:nvSpPr>
+        <p:spPr>
+          <a:xfrm>
+            <a:off x="5421600" y="4368600"/>
+            <a:ext cx="1404360" cy="346320"/>
+          </a:xfrm>
+          <a:prstGeom prst="rect">
+            <a:avLst/>
+          </a:prstGeom>
+          <a:noFill/>
+          <a:ln w="0">
+            <a:noFill/>
+          </a:ln>
+        </p:spPr>
+        <p:txBody>
+          <a:bodyPr lIns="90000" rIns="90000" tIns="45000" bIns="45000" anchor="t">
+            <a:noAutofit/>
+          </a:bodyPr>
+          <a:p>
+            <a:r>
+              <a:rPr b="0" lang="en-US" sz="1800" spc="-1" strike="noStrike">
+                <a:solidFill>
+                  <a:srgbClr val="000000"/>
+                </a:solidFill>
+                <a:latin typeface="Arial"/>
+              </a:rPr>
+              <a:t>Padding = 1</a:t>
+            </a:r>
+            <a:endParaRPr b="0" lang="en-US" sz="1800" spc="-1" strike="noStrike">
+              <a:solidFill>
+                <a:srgbClr val="000000"/>
+              </a:solidFill>
+              <a:latin typeface="Arial"/>
+            </a:endParaRPr>
+          </a:p>
+        </p:txBody>
+      </p:sp>
+      <p:sp>
+        <p:nvSpPr>
+          <p:cNvPr id="97" name=""/>
+          <p:cNvSpPr txBox="1"/>
+          <p:nvPr/>
+        </p:nvSpPr>
+        <p:spPr>
+          <a:xfrm>
+            <a:off x="2937960" y="2193480"/>
+            <a:ext cx="1683360" cy="346320"/>
+          </a:xfrm>
+          <a:prstGeom prst="rect">
+            <a:avLst/>
+          </a:prstGeom>
+          <a:noFill/>
+          <a:ln w="0">
+            <a:noFill/>
+          </a:ln>
+        </p:spPr>
+        <p:txBody>
+          <a:bodyPr lIns="90000" rIns="90000" tIns="45000" bIns="45000" anchor="t">
+            <a:noAutofit/>
+          </a:bodyPr>
+          <a:p>
+            <a:r>
+              <a:rPr b="1" lang="en-US" sz="1800" spc="-1" strike="noStrike">
+                <a:solidFill>
+                  <a:srgbClr val="000000"/>
+                </a:solidFill>
+                <a:latin typeface="Arial"/>
+              </a:rPr>
+              <a:t>Valid Padding</a:t>
+            </a:r>
+            <a:endParaRPr b="0" lang="en-US" sz="1800" spc="-1" strike="noStrike">
+              <a:solidFill>
+                <a:srgbClr val="000000"/>
+              </a:solidFill>
+              <a:latin typeface="Arial"/>
+            </a:endParaRPr>
+          </a:p>
+        </p:txBody>
+      </p:sp>
+      <p:sp>
+        <p:nvSpPr>
+          <p:cNvPr id="98" name=""/>
+          <p:cNvSpPr txBox="1"/>
+          <p:nvPr/>
+        </p:nvSpPr>
+        <p:spPr>
+          <a:xfrm>
+            <a:off x="5421600" y="1736280"/>
+            <a:ext cx="1756440" cy="346320"/>
+          </a:xfrm>
+          <a:prstGeom prst="rect">
+            <a:avLst/>
+          </a:prstGeom>
+          <a:noFill/>
+          <a:ln w="0">
+            <a:noFill/>
+          </a:ln>
+        </p:spPr>
+        <p:txBody>
+          <a:bodyPr lIns="90000" rIns="90000" tIns="45000" bIns="45000" anchor="t">
+            <a:noAutofit/>
+          </a:bodyPr>
+          <a:p>
+            <a:r>
+              <a:rPr b="1" lang="en-US" sz="1800" spc="-1" strike="noStrike">
+                <a:solidFill>
+                  <a:srgbClr val="000000"/>
+                </a:solidFill>
+                <a:latin typeface="Arial"/>
+              </a:rPr>
+              <a:t>Same Padding</a:t>
+            </a:r>
+            <a:endParaRPr b="0" lang="en-US" sz="1800" spc="-1" strike="noStrike">
+              <a:solidFill>
+                <a:srgbClr val="000000"/>
+              </a:solidFill>
+              <a:latin typeface="Arial"/>
+            </a:endParaRPr>
+          </a:p>
+        </p:txBody>
+      </p:sp>
     </p:spTree>
   </p:cSld>
   <mc:AlternateContent>
@@ -7086,309 +8169,6 @@
 </file>
 
 <file path=ppt/slides/slide12.xml><?xml version="1.0" encoding="utf-8"?>
-<p:sld xmlns:a="http://schemas.openxmlformats.org/drawingml/2006/main" xmlns:p="http://schemas.openxmlformats.org/presentationml/2006/main" xmlns:r="http://schemas.openxmlformats.org/officeDocument/2006/relationships" xmlns:p14="http://schemas.microsoft.com/office/powerpoint/2010/main" xmlns:p15="http://schemas.microsoft.com/office/powerpoint/2012/main" xmlns:mc="http://schemas.openxmlformats.org/markup-compatibility/2006">
-  <p:cSld>
-    <p:spTree>
-      <p:nvGrpSpPr>
-        <p:cNvPr id="1" name=""/>
-        <p:cNvGrpSpPr/>
-        <p:nvPr/>
-      </p:nvGrpSpPr>
-      <p:grpSpPr>
-        <a:xfrm>
-          <a:off x="0" y="0"/>
-          <a:ext cx="0" cy="0"/>
-          <a:chOff x="0" y="0"/>
-          <a:chExt cx="0" cy="0"/>
-        </a:xfrm>
-      </p:grpSpPr>
-      <p:pic>
-        <p:nvPicPr>
-          <p:cNvPr id="94" name="" descr=""/>
-          <p:cNvPicPr/>
-          <p:nvPr/>
-        </p:nvPicPr>
-        <p:blipFill>
-          <a:blip r:embed="rId1"/>
-          <a:stretch/>
-        </p:blipFill>
-        <p:spPr>
-          <a:xfrm>
-            <a:off x="963360" y="-720"/>
-            <a:ext cx="8149680" cy="5669640"/>
-          </a:xfrm>
-          <a:prstGeom prst="rect">
-            <a:avLst/>
-          </a:prstGeom>
-          <a:ln w="0">
-            <a:noFill/>
-          </a:ln>
-        </p:spPr>
-      </p:pic>
-    </p:spTree>
-  </p:cSld>
-  <mc:AlternateContent>
-    <mc:Choice Requires="p14">
-      <p:transition spd="slow" p14:dur="2000"/>
-    </mc:Choice>
-    <mc:Fallback>
-      <p:transition spd="slow"/>
-    </mc:Fallback>
-  </mc:AlternateContent>
-</p:sld>
-</file>
-
-<file path=ppt/slides/slide13.xml><?xml version="1.0" encoding="utf-8"?>
-<p:sld xmlns:a="http://schemas.openxmlformats.org/drawingml/2006/main" xmlns:p="http://schemas.openxmlformats.org/presentationml/2006/main" xmlns:r="http://schemas.openxmlformats.org/officeDocument/2006/relationships" xmlns:p14="http://schemas.microsoft.com/office/powerpoint/2010/main" xmlns:p15="http://schemas.microsoft.com/office/powerpoint/2012/main" xmlns:mc="http://schemas.openxmlformats.org/markup-compatibility/2006">
-  <p:cSld>
-    <p:spTree>
-      <p:nvGrpSpPr>
-        <p:cNvPr id="1" name=""/>
-        <p:cNvGrpSpPr/>
-        <p:nvPr/>
-      </p:nvGrpSpPr>
-      <p:grpSpPr>
-        <a:xfrm>
-          <a:off x="0" y="0"/>
-          <a:ext cx="0" cy="0"/>
-          <a:chOff x="0" y="0"/>
-          <a:chExt cx="0" cy="0"/>
-        </a:xfrm>
-      </p:grpSpPr>
-      <p:sp>
-        <p:nvSpPr>
-          <p:cNvPr id="95" name="PlaceHolder 1"/>
-          <p:cNvSpPr>
-            <a:spLocks noGrp="1"/>
-          </p:cNvSpPr>
-          <p:nvPr>
-            <p:ph type="title"/>
-          </p:nvPr>
-        </p:nvSpPr>
-        <p:spPr>
-          <a:xfrm>
-            <a:off x="504000" y="226080"/>
-            <a:ext cx="9071640" cy="946440"/>
-          </a:xfrm>
-          <a:prstGeom prst="rect">
-            <a:avLst/>
-          </a:prstGeom>
-          <a:noFill/>
-          <a:ln w="0">
-            <a:noFill/>
-          </a:ln>
-        </p:spPr>
-        <p:txBody>
-          <a:bodyPr lIns="0" rIns="0" tIns="0" bIns="0" anchor="ctr">
-            <a:noAutofit/>
-          </a:bodyPr>
-          <a:p>
-            <a:pPr indent="0" algn="ctr">
-              <a:buNone/>
-            </a:pPr>
-            <a:r>
-              <a:rPr b="0" lang="en-US" sz="4400" spc="-1" strike="noStrike">
-                <a:solidFill>
-                  <a:srgbClr val="000000"/>
-                </a:solidFill>
-                <a:latin typeface="Arial"/>
-              </a:rPr>
-              <a:t>ReLU layer</a:t>
-            </a:r>
-            <a:endParaRPr b="0" lang="en-US" sz="4400" spc="-1" strike="noStrike">
-              <a:solidFill>
-                <a:srgbClr val="000000"/>
-              </a:solidFill>
-              <a:latin typeface="Arial"/>
-            </a:endParaRPr>
-          </a:p>
-        </p:txBody>
-      </p:sp>
-      <p:sp>
-        <p:nvSpPr>
-          <p:cNvPr id="96" name="PlaceHolder 2"/>
-          <p:cNvSpPr>
-            <a:spLocks noGrp="1"/>
-          </p:cNvSpPr>
-          <p:nvPr>
-            <p:ph/>
-          </p:nvPr>
-        </p:nvSpPr>
-        <p:spPr>
-          <a:xfrm>
-            <a:off x="504000" y="1326600"/>
-            <a:ext cx="9071640" cy="3288240"/>
-          </a:xfrm>
-          <a:prstGeom prst="rect">
-            <a:avLst/>
-          </a:prstGeom>
-          <a:noFill/>
-          <a:ln w="0">
-            <a:noFill/>
-          </a:ln>
-        </p:spPr>
-        <p:txBody>
-          <a:bodyPr lIns="0" rIns="0" tIns="0" bIns="0" anchor="t">
-            <a:normAutofit/>
-          </a:bodyPr>
-          <a:p>
-            <a:pPr marL="432000" indent="-324000">
-              <a:spcBef>
-                <a:spcPts val="1417"/>
-              </a:spcBef>
-              <a:buClr>
-                <a:srgbClr val="000000"/>
-              </a:buClr>
-              <a:buSzPct val="45000"/>
-              <a:buFont typeface="Wingdings" charset="2"/>
-              <a:buChar char=""/>
-            </a:pPr>
-            <a:r>
-              <a:rPr b="0" lang="en-US" sz="2800" spc="-1" strike="noStrike">
-                <a:solidFill>
-                  <a:srgbClr val="000000"/>
-                </a:solidFill>
-                <a:latin typeface="Arial"/>
-                <a:ea typeface="Noto Sans CJK SC"/>
-              </a:rPr>
-              <a:t>Applying max(0, x) on the previous </a:t>
-            </a:r>
-            <a:r>
-              <a:rPr b="0" lang="en-US" sz="2800" spc="-1" strike="noStrike">
-                <a:solidFill>
-                  <a:srgbClr val="000000"/>
-                </a:solidFill>
-                <a:latin typeface="Arial"/>
-              </a:rPr>
-              <a:t>feature map layers</a:t>
-            </a:r>
-            <a:endParaRPr b="0" lang="en-US" sz="2800" spc="-1" strike="noStrike">
-              <a:solidFill>
-                <a:srgbClr val="000000"/>
-              </a:solidFill>
-              <a:latin typeface="Arial"/>
-            </a:endParaRPr>
-          </a:p>
-          <a:p>
-            <a:pPr marL="432000" indent="-324000">
-              <a:spcBef>
-                <a:spcPts val="1417"/>
-              </a:spcBef>
-              <a:buClr>
-                <a:srgbClr val="000000"/>
-              </a:buClr>
-              <a:buSzPct val="45000"/>
-              <a:buFont typeface="Wingdings" charset="2"/>
-              <a:buChar char=""/>
-            </a:pPr>
-            <a:r>
-              <a:rPr b="0" lang="en-US" sz="2800" spc="-1" strike="noStrike">
-                <a:solidFill>
-                  <a:srgbClr val="000000"/>
-                </a:solidFill>
-                <a:latin typeface="Arial"/>
-              </a:rPr>
-              <a:t>This one does not change size unlike the previous one</a:t>
-            </a:r>
-            <a:endParaRPr b="0" lang="en-US" sz="2800" spc="-1" strike="noStrike">
-              <a:solidFill>
-                <a:srgbClr val="000000"/>
-              </a:solidFill>
-              <a:latin typeface="Arial"/>
-            </a:endParaRPr>
-          </a:p>
-        </p:txBody>
-      </p:sp>
-      <p:pic>
-        <p:nvPicPr>
-          <p:cNvPr id="97" name="" descr=""/>
-          <p:cNvPicPr/>
-          <p:nvPr/>
-        </p:nvPicPr>
-        <p:blipFill>
-          <a:blip r:embed="rId1"/>
-          <a:stretch/>
-        </p:blipFill>
-        <p:spPr>
-          <a:xfrm>
-            <a:off x="2298240" y="2298600"/>
-            <a:ext cx="5016960" cy="3187800"/>
-          </a:xfrm>
-          <a:prstGeom prst="rect">
-            <a:avLst/>
-          </a:prstGeom>
-          <a:ln w="0">
-            <a:noFill/>
-          </a:ln>
-        </p:spPr>
-      </p:pic>
-    </p:spTree>
-  </p:cSld>
-  <mc:AlternateContent>
-    <mc:Choice Requires="p14">
-      <p:transition spd="slow" p14:dur="2000"/>
-    </mc:Choice>
-    <mc:Fallback>
-      <p:transition spd="slow"/>
-    </mc:Fallback>
-  </mc:AlternateContent>
-</p:sld>
-</file>
-
-<file path=ppt/slides/slide14.xml><?xml version="1.0" encoding="utf-8"?>
-<p:sld xmlns:a="http://schemas.openxmlformats.org/drawingml/2006/main" xmlns:p="http://schemas.openxmlformats.org/presentationml/2006/main" xmlns:r="http://schemas.openxmlformats.org/officeDocument/2006/relationships" xmlns:p14="http://schemas.microsoft.com/office/powerpoint/2010/main" xmlns:p15="http://schemas.microsoft.com/office/powerpoint/2012/main" xmlns:mc="http://schemas.openxmlformats.org/markup-compatibility/2006">
-  <p:cSld>
-    <p:spTree>
-      <p:nvGrpSpPr>
-        <p:cNvPr id="1" name=""/>
-        <p:cNvGrpSpPr/>
-        <p:nvPr/>
-      </p:nvGrpSpPr>
-      <p:grpSpPr>
-        <a:xfrm>
-          <a:off x="0" y="0"/>
-          <a:ext cx="0" cy="0"/>
-          <a:chOff x="0" y="0"/>
-          <a:chExt cx="0" cy="0"/>
-        </a:xfrm>
-      </p:grpSpPr>
-      <p:pic>
-        <p:nvPicPr>
-          <p:cNvPr id="98" name="" descr=""/>
-          <p:cNvPicPr/>
-          <p:nvPr/>
-        </p:nvPicPr>
-        <p:blipFill>
-          <a:blip r:embed="rId1"/>
-          <a:stretch/>
-        </p:blipFill>
-        <p:spPr>
-          <a:xfrm>
-            <a:off x="1600200" y="0"/>
-            <a:ext cx="7571880" cy="5669640"/>
-          </a:xfrm>
-          <a:prstGeom prst="rect">
-            <a:avLst/>
-          </a:prstGeom>
-          <a:ln w="0">
-            <a:noFill/>
-          </a:ln>
-        </p:spPr>
-      </p:pic>
-    </p:spTree>
-  </p:cSld>
-  <mc:AlternateContent>
-    <mc:Choice Requires="p14">
-      <p:transition spd="slow" p14:dur="2000"/>
-    </mc:Choice>
-    <mc:Fallback>
-      <p:transition spd="slow"/>
-    </mc:Fallback>
-  </mc:AlternateContent>
-</p:sld>
-</file>
-
-<file path=ppt/slides/slide15.xml><?xml version="1.0" encoding="utf-8"?>
 <p:sld xmlns:a="http://schemas.openxmlformats.org/drawingml/2006/main" xmlns:p="http://schemas.openxmlformats.org/presentationml/2006/main" xmlns:r="http://schemas.openxmlformats.org/officeDocument/2006/relationships" xmlns:p14="http://schemas.microsoft.com/office/powerpoint/2010/main" xmlns:p15="http://schemas.microsoft.com/office/powerpoint/2012/main" xmlns:mc="http://schemas.openxmlformats.org/markup-compatibility/2006">
   <p:cSld>
     <p:spTree>
@@ -7443,7 +8223,162 @@
                 </a:solidFill>
                 <a:latin typeface="Arial"/>
               </a:rPr>
-              <a:t>Pooling layer</a:t>
+              <a:t>Calculate the feature map size</a:t>
+            </a:r>
+            <a:endParaRPr b="0" lang="en-US" sz="4400" spc="-1" strike="noStrike">
+              <a:solidFill>
+                <a:srgbClr val="000000"/>
+              </a:solidFill>
+              <a:latin typeface="Arial"/>
+            </a:endParaRPr>
+          </a:p>
+        </p:txBody>
+      </p:sp>
+      <p:pic>
+        <p:nvPicPr>
+          <p:cNvPr id="100" name="" descr=""/>
+          <p:cNvPicPr/>
+          <p:nvPr/>
+        </p:nvPicPr>
+        <p:blipFill>
+          <a:blip r:embed="rId1"/>
+          <a:stretch/>
+        </p:blipFill>
+        <p:spPr>
+          <a:xfrm>
+            <a:off x="1152720" y="2057400"/>
+            <a:ext cx="7305480" cy="1999800"/>
+          </a:xfrm>
+          <a:prstGeom prst="rect">
+            <a:avLst/>
+          </a:prstGeom>
+          <a:ln w="0">
+            <a:noFill/>
+          </a:ln>
+        </p:spPr>
+      </p:pic>
+    </p:spTree>
+  </p:cSld>
+  <mc:AlternateContent>
+    <mc:Choice Requires="p14">
+      <p:transition spd="slow" p14:dur="2000"/>
+    </mc:Choice>
+    <mc:Fallback>
+      <p:transition spd="slow"/>
+    </mc:Fallback>
+  </mc:AlternateContent>
+</p:sld>
+</file>
+
+<file path=ppt/slides/slide13.xml><?xml version="1.0" encoding="utf-8"?>
+<p:sld xmlns:a="http://schemas.openxmlformats.org/drawingml/2006/main" xmlns:p="http://schemas.openxmlformats.org/presentationml/2006/main" xmlns:r="http://schemas.openxmlformats.org/officeDocument/2006/relationships" xmlns:p14="http://schemas.microsoft.com/office/powerpoint/2010/main" xmlns:p15="http://schemas.microsoft.com/office/powerpoint/2012/main" xmlns:mc="http://schemas.openxmlformats.org/markup-compatibility/2006">
+  <p:cSld>
+    <p:spTree>
+      <p:nvGrpSpPr>
+        <p:cNvPr id="1" name=""/>
+        <p:cNvGrpSpPr/>
+        <p:nvPr/>
+      </p:nvGrpSpPr>
+      <p:grpSpPr>
+        <a:xfrm>
+          <a:off x="0" y="0"/>
+          <a:ext cx="0" cy="0"/>
+          <a:chOff x="0" y="0"/>
+          <a:chExt cx="0" cy="0"/>
+        </a:xfrm>
+      </p:grpSpPr>
+      <p:pic>
+        <p:nvPicPr>
+          <p:cNvPr id="101" name="" descr=""/>
+          <p:cNvPicPr/>
+          <p:nvPr/>
+        </p:nvPicPr>
+        <p:blipFill>
+          <a:blip r:embed="rId1"/>
+          <a:stretch/>
+        </p:blipFill>
+        <p:spPr>
+          <a:xfrm>
+            <a:off x="963360" y="-720"/>
+            <a:ext cx="8149680" cy="5669640"/>
+          </a:xfrm>
+          <a:prstGeom prst="rect">
+            <a:avLst/>
+          </a:prstGeom>
+          <a:ln w="0">
+            <a:noFill/>
+          </a:ln>
+        </p:spPr>
+      </p:pic>
+    </p:spTree>
+  </p:cSld>
+  <mc:AlternateContent>
+    <mc:Choice Requires="p14">
+      <p:transition spd="slow" p14:dur="2000"/>
+    </mc:Choice>
+    <mc:Fallback>
+      <p:transition spd="slow"/>
+    </mc:Fallback>
+  </mc:AlternateContent>
+</p:sld>
+</file>
+
+<file path=ppt/slides/slide14.xml><?xml version="1.0" encoding="utf-8"?>
+<p:sld xmlns:a="http://schemas.openxmlformats.org/drawingml/2006/main" xmlns:p="http://schemas.openxmlformats.org/presentationml/2006/main" xmlns:r="http://schemas.openxmlformats.org/officeDocument/2006/relationships" xmlns:p14="http://schemas.microsoft.com/office/powerpoint/2010/main" xmlns:p15="http://schemas.microsoft.com/office/powerpoint/2012/main" xmlns:mc="http://schemas.openxmlformats.org/markup-compatibility/2006">
+  <p:cSld>
+    <p:spTree>
+      <p:nvGrpSpPr>
+        <p:cNvPr id="1" name=""/>
+        <p:cNvGrpSpPr/>
+        <p:nvPr/>
+      </p:nvGrpSpPr>
+      <p:grpSpPr>
+        <a:xfrm>
+          <a:off x="0" y="0"/>
+          <a:ext cx="0" cy="0"/>
+          <a:chOff x="0" y="0"/>
+          <a:chExt cx="0" cy="0"/>
+        </a:xfrm>
+      </p:grpSpPr>
+      <p:sp>
+        <p:nvSpPr>
+          <p:cNvPr id="102" name="PlaceHolder 1"/>
+          <p:cNvSpPr>
+            <a:spLocks noGrp="1"/>
+          </p:cNvSpPr>
+          <p:nvPr>
+            <p:ph type="title"/>
+          </p:nvPr>
+        </p:nvSpPr>
+        <p:spPr>
+          <a:xfrm>
+            <a:off x="504000" y="226080"/>
+            <a:ext cx="9071640" cy="946440"/>
+          </a:xfrm>
+          <a:prstGeom prst="rect">
+            <a:avLst/>
+          </a:prstGeom>
+          <a:noFill/>
+          <a:ln w="0">
+            <a:noFill/>
+          </a:ln>
+        </p:spPr>
+        <p:txBody>
+          <a:bodyPr lIns="0" rIns="0" tIns="0" bIns="0" anchor="ctr">
+            <a:noAutofit/>
+          </a:bodyPr>
+          <a:p>
+            <a:pPr indent="0" algn="ctr">
+              <a:buNone/>
+            </a:pPr>
+            <a:r>
+              <a:rPr b="0" lang="en-US" sz="4400" spc="-1" strike="noStrike">
+                <a:solidFill>
+                  <a:srgbClr val="000000"/>
+                </a:solidFill>
+                <a:latin typeface="Arial"/>
+              </a:rPr>
+              <a:t>ReLU layer</a:t>
             </a:r>
             <a:endParaRPr b="0" lang="en-US" sz="4400" spc="-1" strike="noStrike">
               <a:solidFill>
@@ -7456,7 +8391,7 @@
       </p:sp>
       <p:sp>
         <p:nvSpPr>
-          <p:cNvPr id="100" name="PlaceHolder 2"/>
+          <p:cNvPr id="103" name="PlaceHolder 2"/>
           <p:cNvSpPr>
             <a:spLocks noGrp="1"/>
           </p:cNvSpPr>
@@ -7494,15 +8429,25 @@
               <a:buChar char=""/>
             </a:pPr>
             <a:r>
-              <a:rPr b="0" lang="en-US" sz="3200" spc="-1" strike="noStrike">
+              <a:rPr b="0" lang="en-US" sz="2800" spc="-1" strike="noStrike">
+                <a:solidFill>
+                  <a:srgbClr val="000000"/>
+                </a:solidFill>
+                <a:latin typeface="Arial"/>
+                <a:ea typeface="Noto Sans CJK SC"/>
+              </a:rPr>
+              <a:t>Applying max(0, x) on the previous </a:t>
+            </a:r>
+            <a:r>
+              <a:rPr b="0" lang="en-US" sz="2800" spc="-1" strike="noStrike">
                 <a:solidFill>
                   <a:srgbClr val="000000"/>
                 </a:solidFill>
                 <a:latin typeface="Arial"/>
               </a:rPr>
-              <a:t>Its purpose is to gradually shrink the representation’s spatial size to reduce the number of parameters and computations in the network.</a:t>
-            </a:r>
-            <a:endParaRPr b="0" lang="en-US" sz="3200" spc="-1" strike="noStrike">
+              <a:t>feature map layers</a:t>
+            </a:r>
+            <a:endParaRPr b="0" lang="en-US" sz="2800" spc="-1" strike="noStrike">
               <a:solidFill>
                 <a:srgbClr val="000000"/>
               </a:solidFill>
@@ -7522,15 +8467,15 @@
               <a:buChar char=""/>
             </a:pPr>
             <a:r>
-              <a:rPr b="0" lang="en-US" sz="3200" spc="-1" strike="noStrike">
+              <a:rPr b="0" lang="en-US" sz="2800" spc="-1" strike="noStrike">
                 <a:solidFill>
                   <a:srgbClr val="000000"/>
                 </a:solidFill>
                 <a:latin typeface="Arial"/>
               </a:rPr>
-              <a:t>The pooling layer treats each feature map separately.</a:t>
-            </a:r>
-            <a:endParaRPr b="0" lang="en-US" sz="3200" spc="-1" strike="noStrike">
+              <a:t>This one does not change size unlike the previous one</a:t>
+            </a:r>
+            <a:endParaRPr b="0" lang="en-US" sz="2800" spc="-1" strike="noStrike">
               <a:solidFill>
                 <a:srgbClr val="000000"/>
               </a:solidFill>
@@ -7539,6 +8484,82 @@
           </a:p>
         </p:txBody>
       </p:sp>
+      <p:pic>
+        <p:nvPicPr>
+          <p:cNvPr id="104" name="" descr=""/>
+          <p:cNvPicPr/>
+          <p:nvPr/>
+        </p:nvPicPr>
+        <p:blipFill>
+          <a:blip r:embed="rId1"/>
+          <a:stretch/>
+        </p:blipFill>
+        <p:spPr>
+          <a:xfrm>
+            <a:off x="2298240" y="2298600"/>
+            <a:ext cx="5016960" cy="3187800"/>
+          </a:xfrm>
+          <a:prstGeom prst="rect">
+            <a:avLst/>
+          </a:prstGeom>
+          <a:ln w="0">
+            <a:noFill/>
+          </a:ln>
+        </p:spPr>
+      </p:pic>
+    </p:spTree>
+  </p:cSld>
+  <mc:AlternateContent>
+    <mc:Choice Requires="p14">
+      <p:transition spd="slow" p14:dur="2000"/>
+    </mc:Choice>
+    <mc:Fallback>
+      <p:transition spd="slow"/>
+    </mc:Fallback>
+  </mc:AlternateContent>
+</p:sld>
+</file>
+
+<file path=ppt/slides/slide15.xml><?xml version="1.0" encoding="utf-8"?>
+<p:sld xmlns:a="http://schemas.openxmlformats.org/drawingml/2006/main" xmlns:p="http://schemas.openxmlformats.org/presentationml/2006/main" xmlns:r="http://schemas.openxmlformats.org/officeDocument/2006/relationships" xmlns:p14="http://schemas.microsoft.com/office/powerpoint/2010/main" xmlns:p15="http://schemas.microsoft.com/office/powerpoint/2012/main" xmlns:mc="http://schemas.openxmlformats.org/markup-compatibility/2006">
+  <p:cSld>
+    <p:spTree>
+      <p:nvGrpSpPr>
+        <p:cNvPr id="1" name=""/>
+        <p:cNvGrpSpPr/>
+        <p:nvPr/>
+      </p:nvGrpSpPr>
+      <p:grpSpPr>
+        <a:xfrm>
+          <a:off x="0" y="0"/>
+          <a:ext cx="0" cy="0"/>
+          <a:chOff x="0" y="0"/>
+          <a:chExt cx="0" cy="0"/>
+        </a:xfrm>
+      </p:grpSpPr>
+      <p:pic>
+        <p:nvPicPr>
+          <p:cNvPr id="105" name="" descr=""/>
+          <p:cNvPicPr/>
+          <p:nvPr/>
+        </p:nvPicPr>
+        <p:blipFill>
+          <a:blip r:embed="rId1"/>
+          <a:stretch/>
+        </p:blipFill>
+        <p:spPr>
+          <a:xfrm>
+            <a:off x="1600200" y="0"/>
+            <a:ext cx="7571880" cy="5669640"/>
+          </a:xfrm>
+          <a:prstGeom prst="rect">
+            <a:avLst/>
+          </a:prstGeom>
+          <a:ln w="0">
+            <a:noFill/>
+          </a:ln>
+        </p:spPr>
+      </p:pic>
     </p:spTree>
   </p:cSld>
   <mc:AlternateContent>
@@ -7569,32 +8590,9 @@
           <a:chExt cx="0" cy="0"/>
         </a:xfrm>
       </p:grpSpPr>
-      <p:pic>
-        <p:nvPicPr>
-          <p:cNvPr id="101" name="" descr=""/>
-          <p:cNvPicPr/>
-          <p:nvPr/>
-        </p:nvPicPr>
-        <p:blipFill>
-          <a:blip r:embed="rId1"/>
-          <a:stretch/>
-        </p:blipFill>
-        <p:spPr>
-          <a:xfrm>
-            <a:off x="3154680" y="691560"/>
-            <a:ext cx="6622560" cy="4890240"/>
-          </a:xfrm>
-          <a:prstGeom prst="rect">
-            <a:avLst/>
-          </a:prstGeom>
-          <a:ln w="0">
-            <a:noFill/>
-          </a:ln>
-        </p:spPr>
-      </p:pic>
       <p:sp>
         <p:nvSpPr>
-          <p:cNvPr id="102" name="PlaceHolder 1"/>
+          <p:cNvPr id="106" name="PlaceHolder 1"/>
           <p:cNvSpPr>
             <a:spLocks noGrp="1"/>
           </p:cNvSpPr>
@@ -7620,6 +8618,193 @@
             <a:noAutofit/>
           </a:bodyPr>
           <a:p>
+            <a:pPr indent="0" algn="ctr">
+              <a:buNone/>
+            </a:pPr>
+            <a:r>
+              <a:rPr b="0" lang="en-US" sz="4400" spc="-1" strike="noStrike">
+                <a:solidFill>
+                  <a:srgbClr val="000000"/>
+                </a:solidFill>
+                <a:latin typeface="Arial"/>
+              </a:rPr>
+              <a:t>Pooling layer</a:t>
+            </a:r>
+            <a:endParaRPr b="0" lang="en-US" sz="4400" spc="-1" strike="noStrike">
+              <a:solidFill>
+                <a:srgbClr val="000000"/>
+              </a:solidFill>
+              <a:latin typeface="Arial"/>
+            </a:endParaRPr>
+          </a:p>
+        </p:txBody>
+      </p:sp>
+      <p:sp>
+        <p:nvSpPr>
+          <p:cNvPr id="107" name="PlaceHolder 2"/>
+          <p:cNvSpPr>
+            <a:spLocks noGrp="1"/>
+          </p:cNvSpPr>
+          <p:nvPr>
+            <p:ph/>
+          </p:nvPr>
+        </p:nvSpPr>
+        <p:spPr>
+          <a:xfrm>
+            <a:off x="504000" y="1326600"/>
+            <a:ext cx="9071640" cy="3288240"/>
+          </a:xfrm>
+          <a:prstGeom prst="rect">
+            <a:avLst/>
+          </a:prstGeom>
+          <a:noFill/>
+          <a:ln w="0">
+            <a:noFill/>
+          </a:ln>
+        </p:spPr>
+        <p:txBody>
+          <a:bodyPr lIns="0" rIns="0" tIns="0" bIns="0" anchor="t">
+            <a:normAutofit/>
+          </a:bodyPr>
+          <a:p>
+            <a:pPr marL="432000" indent="-324000">
+              <a:spcBef>
+                <a:spcPts val="1417"/>
+              </a:spcBef>
+              <a:buClr>
+                <a:srgbClr val="000000"/>
+              </a:buClr>
+              <a:buSzPct val="45000"/>
+              <a:buFont typeface="Wingdings" charset="2"/>
+              <a:buChar char=""/>
+            </a:pPr>
+            <a:r>
+              <a:rPr b="0" lang="en-US" sz="3200" spc="-1" strike="noStrike">
+                <a:solidFill>
+                  <a:srgbClr val="000000"/>
+                </a:solidFill>
+                <a:latin typeface="Arial"/>
+              </a:rPr>
+              <a:t>Its purpose is to gradually shrink the representation’s spatial size to reduce the number of parameters and computations in the network.</a:t>
+            </a:r>
+            <a:endParaRPr b="0" lang="en-US" sz="3200" spc="-1" strike="noStrike">
+              <a:solidFill>
+                <a:srgbClr val="000000"/>
+              </a:solidFill>
+              <a:latin typeface="Arial"/>
+            </a:endParaRPr>
+          </a:p>
+          <a:p>
+            <a:pPr marL="432000" indent="-324000">
+              <a:spcBef>
+                <a:spcPts val="1417"/>
+              </a:spcBef>
+              <a:buClr>
+                <a:srgbClr val="000000"/>
+              </a:buClr>
+              <a:buSzPct val="45000"/>
+              <a:buFont typeface="Wingdings" charset="2"/>
+              <a:buChar char=""/>
+            </a:pPr>
+            <a:r>
+              <a:rPr b="0" lang="en-US" sz="3200" spc="-1" strike="noStrike">
+                <a:solidFill>
+                  <a:srgbClr val="000000"/>
+                </a:solidFill>
+                <a:latin typeface="Arial"/>
+              </a:rPr>
+              <a:t>The pooling layer treats each feature map separately.</a:t>
+            </a:r>
+            <a:endParaRPr b="0" lang="en-US" sz="3200" spc="-1" strike="noStrike">
+              <a:solidFill>
+                <a:srgbClr val="000000"/>
+              </a:solidFill>
+              <a:latin typeface="Arial"/>
+            </a:endParaRPr>
+          </a:p>
+        </p:txBody>
+      </p:sp>
+    </p:spTree>
+  </p:cSld>
+  <mc:AlternateContent>
+    <mc:Choice Requires="p14">
+      <p:transition spd="slow" p14:dur="2000"/>
+    </mc:Choice>
+    <mc:Fallback>
+      <p:transition spd="slow"/>
+    </mc:Fallback>
+  </mc:AlternateContent>
+</p:sld>
+</file>
+
+<file path=ppt/slides/slide17.xml><?xml version="1.0" encoding="utf-8"?>
+<p:sld xmlns:a="http://schemas.openxmlformats.org/drawingml/2006/main" xmlns:p="http://schemas.openxmlformats.org/presentationml/2006/main" xmlns:r="http://schemas.openxmlformats.org/officeDocument/2006/relationships" xmlns:p14="http://schemas.microsoft.com/office/powerpoint/2010/main" xmlns:p15="http://schemas.microsoft.com/office/powerpoint/2012/main" xmlns:mc="http://schemas.openxmlformats.org/markup-compatibility/2006">
+  <p:cSld>
+    <p:spTree>
+      <p:nvGrpSpPr>
+        <p:cNvPr id="1" name=""/>
+        <p:cNvGrpSpPr/>
+        <p:nvPr/>
+      </p:nvGrpSpPr>
+      <p:grpSpPr>
+        <a:xfrm>
+          <a:off x="0" y="0"/>
+          <a:ext cx="0" cy="0"/>
+          <a:chOff x="0" y="0"/>
+          <a:chExt cx="0" cy="0"/>
+        </a:xfrm>
+      </p:grpSpPr>
+      <p:pic>
+        <p:nvPicPr>
+          <p:cNvPr id="108" name="" descr=""/>
+          <p:cNvPicPr/>
+          <p:nvPr/>
+        </p:nvPicPr>
+        <p:blipFill>
+          <a:blip r:embed="rId1"/>
+          <a:stretch/>
+        </p:blipFill>
+        <p:spPr>
+          <a:xfrm>
+            <a:off x="3154680" y="691560"/>
+            <a:ext cx="6622560" cy="4890240"/>
+          </a:xfrm>
+          <a:prstGeom prst="rect">
+            <a:avLst/>
+          </a:prstGeom>
+          <a:ln w="0">
+            <a:noFill/>
+          </a:ln>
+        </p:spPr>
+      </p:pic>
+      <p:sp>
+        <p:nvSpPr>
+          <p:cNvPr id="109" name="PlaceHolder 1"/>
+          <p:cNvSpPr>
+            <a:spLocks noGrp="1"/>
+          </p:cNvSpPr>
+          <p:nvPr>
+            <p:ph type="title"/>
+          </p:nvPr>
+        </p:nvSpPr>
+        <p:spPr>
+          <a:xfrm>
+            <a:off x="504000" y="226080"/>
+            <a:ext cx="9071640" cy="946440"/>
+          </a:xfrm>
+          <a:prstGeom prst="rect">
+            <a:avLst/>
+          </a:prstGeom>
+          <a:noFill/>
+          <a:ln w="0">
+            <a:noFill/>
+          </a:ln>
+        </p:spPr>
+        <p:txBody>
+          <a:bodyPr lIns="0" rIns="0" tIns="0" bIns="0" anchor="ctr">
+            <a:noAutofit/>
+          </a:bodyPr>
+          <a:p>
             <a:pPr marL="216000" indent="0">
               <a:buNone/>
             </a:pPr>
@@ -7653,7 +8838,7 @@
       </p:sp>
       <p:sp>
         <p:nvSpPr>
-          <p:cNvPr id="103" name=""/>
+          <p:cNvPr id="110" name=""/>
           <p:cNvSpPr txBox="1"/>
           <p:nvPr/>
         </p:nvSpPr>
@@ -7695,7 +8880,7 @@
       </p:sp>
       <p:sp>
         <p:nvSpPr>
-          <p:cNvPr id="104" name=""/>
+          <p:cNvPr id="111" name=""/>
           <p:cNvSpPr txBox="1"/>
           <p:nvPr/>
         </p:nvSpPr>
@@ -7796,7 +8981,7 @@
                                           </p:stCondLst>
                                         </p:cTn>
                                         <p:tgtEl>
-                                          <p:spTgt spid="101"/>
+                                          <p:spTgt spid="108"/>
                                         </p:tgtEl>
                                         <p:attrNameLst>
                                           <p:attrName>style.visibility</p:attrName>
@@ -7810,7 +8995,7 @@
                                       <p:cBhvr additive="repl">
                                         <p:cTn id="21" dur="500"/>
                                         <p:tgtEl>
-                                          <p:spTgt spid="101"/>
+                                          <p:spTgt spid="108"/>
                                         </p:tgtEl>
                                       </p:cBhvr>
                                     </p:animEffect>
@@ -7831,7 +9016,7 @@
                                           </p:stCondLst>
                                         </p:cTn>
                                         <p:tgtEl>
-                                          <p:spTgt spid="103">
+                                          <p:spTgt spid="110">
                                             <p:txEl>
                                               <p:pRg st="0" end="0"/>
                                             </p:txEl>
@@ -7849,7 +9034,7 @@
                                       <p:cBhvr additive="repl">
                                         <p:cTn id="24" dur="500"/>
                                         <p:tgtEl>
-                                          <p:spTgt spid="103">
+                                          <p:spTgt spid="110">
                                             <p:txEl>
                                               <p:pRg st="0" end="0"/>
                                             </p:txEl>
@@ -7891,7 +9076,7 @@
 </p:sld>
 </file>
 
-<file path=ppt/slides/slide17.xml><?xml version="1.0" encoding="utf-8"?>
+<file path=ppt/slides/slide18.xml><?xml version="1.0" encoding="utf-8"?>
 <p:sld xmlns:a="http://schemas.openxmlformats.org/drawingml/2006/main" xmlns:p="http://schemas.openxmlformats.org/presentationml/2006/main" xmlns:r="http://schemas.openxmlformats.org/officeDocument/2006/relationships" xmlns:p14="http://schemas.microsoft.com/office/powerpoint/2010/main" xmlns:p15="http://schemas.microsoft.com/office/powerpoint/2012/main" xmlns:mc="http://schemas.openxmlformats.org/markup-compatibility/2006">
   <p:cSld>
     <p:spTree>
@@ -7910,7 +9095,7 @@
       </p:grpSpPr>
       <p:pic>
         <p:nvPicPr>
-          <p:cNvPr id="105" name="" descr=""/>
+          <p:cNvPr id="112" name="" descr=""/>
           <p:cNvPicPr/>
           <p:nvPr/>
         </p:nvPicPr>
@@ -7933,7 +9118,7 @@
       </p:pic>
       <p:sp>
         <p:nvSpPr>
-          <p:cNvPr id="106" name="PlaceHolder 1"/>
+          <p:cNvPr id="113" name="PlaceHolder 1"/>
           <p:cNvSpPr>
             <a:spLocks noGrp="1"/>
           </p:cNvSpPr>
@@ -7982,7 +9167,7 @@
       </p:sp>
       <p:sp>
         <p:nvSpPr>
-          <p:cNvPr id="107" name="PlaceHolder 2"/>
+          <p:cNvPr id="114" name="PlaceHolder 2"/>
           <p:cNvSpPr>
             <a:spLocks noGrp="1"/>
           </p:cNvSpPr>
@@ -8048,7 +9233,7 @@
       </p:sp>
       <p:sp>
         <p:nvSpPr>
-          <p:cNvPr id="108" name=""/>
+          <p:cNvPr id="115" name=""/>
           <p:cNvSpPr txBox="1"/>
           <p:nvPr/>
         </p:nvSpPr>
@@ -8080,165 +9265,6 @@
               <a:t>image source: superdatascience.com</a:t>
             </a:r>
             <a:endParaRPr b="0" lang="en-US" sz="1200" spc="-1" strike="noStrike">
-              <a:solidFill>
-                <a:srgbClr val="000000"/>
-              </a:solidFill>
-              <a:latin typeface="Arial"/>
-            </a:endParaRPr>
-          </a:p>
-        </p:txBody>
-      </p:sp>
-    </p:spTree>
-  </p:cSld>
-  <mc:AlternateContent>
-    <mc:Choice Requires="p14">
-      <p:transition spd="slow" p14:dur="2000"/>
-    </mc:Choice>
-    <mc:Fallback>
-      <p:transition spd="slow"/>
-    </mc:Fallback>
-  </mc:AlternateContent>
-</p:sld>
-</file>
-
-<file path=ppt/slides/slide18.xml><?xml version="1.0" encoding="utf-8"?>
-<p:sld xmlns:a="http://schemas.openxmlformats.org/drawingml/2006/main" xmlns:p="http://schemas.openxmlformats.org/presentationml/2006/main" xmlns:r="http://schemas.openxmlformats.org/officeDocument/2006/relationships" xmlns:p14="http://schemas.microsoft.com/office/powerpoint/2010/main" xmlns:p15="http://schemas.microsoft.com/office/powerpoint/2012/main" xmlns:mc="http://schemas.openxmlformats.org/markup-compatibility/2006">
-  <p:cSld>
-    <p:spTree>
-      <p:nvGrpSpPr>
-        <p:cNvPr id="1" name=""/>
-        <p:cNvGrpSpPr/>
-        <p:nvPr/>
-      </p:nvGrpSpPr>
-      <p:grpSpPr>
-        <a:xfrm>
-          <a:off x="0" y="0"/>
-          <a:ext cx="0" cy="0"/>
-          <a:chOff x="0" y="0"/>
-          <a:chExt cx="0" cy="0"/>
-        </a:xfrm>
-      </p:grpSpPr>
-      <p:pic>
-        <p:nvPicPr>
-          <p:cNvPr id="109" name="" descr=""/>
-          <p:cNvPicPr/>
-          <p:nvPr/>
-        </p:nvPicPr>
-        <p:blipFill>
-          <a:blip r:embed="rId1"/>
-          <a:stretch/>
-        </p:blipFill>
-        <p:spPr>
-          <a:xfrm>
-            <a:off x="1528200" y="1247760"/>
-            <a:ext cx="7509960" cy="4422240"/>
-          </a:xfrm>
-          <a:prstGeom prst="rect">
-            <a:avLst/>
-          </a:prstGeom>
-          <a:ln w="0">
-            <a:noFill/>
-          </a:ln>
-        </p:spPr>
-      </p:pic>
-      <p:sp>
-        <p:nvSpPr>
-          <p:cNvPr id="110" name="PlaceHolder 1"/>
-          <p:cNvSpPr>
-            <a:spLocks noGrp="1"/>
-          </p:cNvSpPr>
-          <p:nvPr>
-            <p:ph type="title"/>
-          </p:nvPr>
-        </p:nvSpPr>
-        <p:spPr>
-          <a:xfrm>
-            <a:off x="504000" y="226080"/>
-            <a:ext cx="9071640" cy="946440"/>
-          </a:xfrm>
-          <a:prstGeom prst="rect">
-            <a:avLst/>
-          </a:prstGeom>
-          <a:noFill/>
-          <a:ln w="0">
-            <a:noFill/>
-          </a:ln>
-        </p:spPr>
-        <p:txBody>
-          <a:bodyPr lIns="0" rIns="0" tIns="0" bIns="0" anchor="ctr">
-            <a:noAutofit/>
-          </a:bodyPr>
-          <a:p>
-            <a:pPr indent="0" algn="ctr">
-              <a:buNone/>
-            </a:pPr>
-            <a:r>
-              <a:rPr b="0" lang="en-US" sz="4400" spc="-1" strike="noStrike">
-                <a:solidFill>
-                  <a:srgbClr val="000000"/>
-                </a:solidFill>
-                <a:latin typeface="Arial"/>
-              </a:rPr>
-              <a:t>Fully Connected layer</a:t>
-            </a:r>
-            <a:endParaRPr b="0" lang="en-US" sz="4400" spc="-1" strike="noStrike">
-              <a:solidFill>
-                <a:srgbClr val="000000"/>
-              </a:solidFill>
-              <a:latin typeface="Arial"/>
-            </a:endParaRPr>
-          </a:p>
-        </p:txBody>
-      </p:sp>
-      <p:sp>
-        <p:nvSpPr>
-          <p:cNvPr id="111" name="PlaceHolder 2"/>
-          <p:cNvSpPr>
-            <a:spLocks noGrp="1"/>
-          </p:cNvSpPr>
-          <p:nvPr>
-            <p:ph/>
-          </p:nvPr>
-        </p:nvSpPr>
-        <p:spPr>
-          <a:xfrm>
-            <a:off x="504000" y="1326600"/>
-            <a:ext cx="9071640" cy="3288240"/>
-          </a:xfrm>
-          <a:prstGeom prst="rect">
-            <a:avLst/>
-          </a:prstGeom>
-          <a:noFill/>
-          <a:ln w="0">
-            <a:noFill/>
-          </a:ln>
-        </p:spPr>
-        <p:txBody>
-          <a:bodyPr lIns="0" rIns="0" tIns="0" bIns="0" anchor="t">
-            <a:normAutofit/>
-          </a:bodyPr>
-          <a:p>
-            <a:pPr marL="432000" indent="-324000">
-              <a:spcBef>
-                <a:spcPts val="1417"/>
-              </a:spcBef>
-              <a:buClr>
-                <a:srgbClr val="000000"/>
-              </a:buClr>
-              <a:buSzPct val="45000"/>
-              <a:buFont typeface="Wingdings" charset="2"/>
-              <a:buChar char=""/>
-            </a:pPr>
-            <a:r>
-              <a:rPr b="0" lang="en-US" sz="2200" spc="-1" strike="noStrike">
-                <a:solidFill>
-                  <a:srgbClr val="000000"/>
-                </a:solidFill>
-                <a:latin typeface="Arial"/>
-              </a:rPr>
-              <a:t>Is a fully connected neural networks – the classic neural network architecture, in which all neurons connect to all neurons in the next layer.</a:t>
-            </a:r>
-            <a:endParaRPr b="0" lang="en-US" sz="2200" spc="-1" strike="noStrike">
               <a:solidFill>
                 <a:srgbClr val="000000"/>
               </a:solidFill>
@@ -8277,9 +9303,32 @@
           <a:chExt cx="0" cy="0"/>
         </a:xfrm>
       </p:grpSpPr>
+      <p:pic>
+        <p:nvPicPr>
+          <p:cNvPr id="116" name="" descr=""/>
+          <p:cNvPicPr/>
+          <p:nvPr/>
+        </p:nvPicPr>
+        <p:blipFill>
+          <a:blip r:embed="rId1"/>
+          <a:stretch/>
+        </p:blipFill>
+        <p:spPr>
+          <a:xfrm>
+            <a:off x="1528200" y="1247760"/>
+            <a:ext cx="7509960" cy="4422240"/>
+          </a:xfrm>
+          <a:prstGeom prst="rect">
+            <a:avLst/>
+          </a:prstGeom>
+          <a:ln w="0">
+            <a:noFill/>
+          </a:ln>
+        </p:spPr>
+      </p:pic>
       <p:sp>
         <p:nvSpPr>
-          <p:cNvPr id="112" name="PlaceHolder 1"/>
+          <p:cNvPr id="117" name="PlaceHolder 1"/>
           <p:cNvSpPr>
             <a:spLocks noGrp="1"/>
           </p:cNvSpPr>
@@ -8315,7 +9364,7 @@
                 </a:solidFill>
                 <a:latin typeface="Arial"/>
               </a:rPr>
-              <a:t>Resources</a:t>
+              <a:t>Fully Connected layer</a:t>
             </a:r>
             <a:endParaRPr b="0" lang="en-US" sz="4400" spc="-1" strike="noStrike">
               <a:solidFill>
@@ -8328,7 +9377,7 @@
       </p:sp>
       <p:sp>
         <p:nvSpPr>
-          <p:cNvPr id="113" name="PlaceHolder 2"/>
+          <p:cNvPr id="118" name="PlaceHolder 2"/>
           <p:cNvSpPr>
             <a:spLocks noGrp="1"/>
           </p:cNvSpPr>
@@ -8351,10 +9400,10 @@
         </p:spPr>
         <p:txBody>
           <a:bodyPr lIns="0" rIns="0" tIns="0" bIns="0" anchor="t">
-            <a:normAutofit fontScale="61000"/>
+            <a:normAutofit/>
           </a:bodyPr>
           <a:p>
-            <a:pPr marL="263520" indent="-197640">
+            <a:pPr marL="432000" indent="-324000">
               <a:spcBef>
                 <a:spcPts val="1417"/>
               </a:spcBef>
@@ -8366,271 +9415,15 @@
               <a:buChar char=""/>
             </a:pPr>
             <a:r>
-              <a:rPr b="0" lang="en-US" sz="3200" spc="-1" strike="noStrike">
-                <a:solidFill>
-                  <a:srgbClr val="000000"/>
-                </a:solidFill>
-                <a:latin typeface="Arial"/>
-                <a:hlinkClick r:id="rId1"/>
-              </a:rPr>
-              <a:t>Convolutional neural network [wikipedia]</a:t>
-            </a:r>
-            <a:endParaRPr b="0" lang="en-US" sz="3200" spc="-1" strike="noStrike">
-              <a:solidFill>
-                <a:srgbClr val="000000"/>
-              </a:solidFill>
-              <a:latin typeface="Arial"/>
-            </a:endParaRPr>
-          </a:p>
-          <a:p>
-            <a:pPr marL="263520" indent="-197640">
-              <a:spcBef>
-                <a:spcPts val="1417"/>
-              </a:spcBef>
-              <a:buClr>
-                <a:srgbClr val="000000"/>
-              </a:buClr>
-              <a:buSzPct val="45000"/>
-              <a:buFont typeface="Wingdings" charset="2"/>
-              <a:buChar char=""/>
-            </a:pPr>
-            <a:r>
-              <a:rPr b="0" lang="en-US" sz="3200" spc="-1" strike="noStrike">
-                <a:solidFill>
-                  <a:srgbClr val="000000"/>
-                </a:solidFill>
-                <a:latin typeface="Arial"/>
-                <a:hlinkClick r:id="rId2"/>
-              </a:rPr>
-              <a:t>Feed-forward neural network [wikipedia]</a:t>
-            </a:r>
-            <a:endParaRPr b="0" lang="en-US" sz="3200" spc="-1" strike="noStrike">
-              <a:solidFill>
-                <a:srgbClr val="000000"/>
-              </a:solidFill>
-              <a:latin typeface="Arial"/>
-            </a:endParaRPr>
-          </a:p>
-          <a:p>
-            <a:pPr marL="263520" indent="-197640">
-              <a:spcBef>
-                <a:spcPts val="1417"/>
-              </a:spcBef>
-              <a:buClr>
-                <a:srgbClr val="000000"/>
-              </a:buClr>
-              <a:buSzPct val="45000"/>
-              <a:buFont typeface="Wingdings" charset="2"/>
-              <a:buChar char=""/>
-            </a:pPr>
-            <a:r>
-              <a:rPr b="0" lang="en-US" sz="3200" spc="-1" strike="noStrike">
-                <a:solidFill>
-                  <a:srgbClr val="000000"/>
-                </a:solidFill>
-                <a:latin typeface="Arial"/>
-                <a:hlinkClick r:id="rId3"/>
-              </a:rPr>
-              <a:t>Basics of CNN in Deep Learning</a:t>
-            </a:r>
-            <a:endParaRPr b="0" lang="en-US" sz="3200" spc="-1" strike="noStrike">
-              <a:solidFill>
-                <a:srgbClr val="000000"/>
-              </a:solidFill>
-              <a:latin typeface="Arial"/>
-            </a:endParaRPr>
-          </a:p>
-          <a:p>
-            <a:pPr marL="263520" indent="-197640">
-              <a:spcBef>
-                <a:spcPts val="1417"/>
-              </a:spcBef>
-              <a:buClr>
-                <a:srgbClr val="000000"/>
-              </a:buClr>
-              <a:buSzPct val="45000"/>
-              <a:buFont typeface="Wingdings" charset="2"/>
-              <a:buChar char=""/>
-            </a:pPr>
-            <a:r>
-              <a:rPr b="0" lang="en-US" sz="3200" spc="-1" strike="noStrike">
-                <a:solidFill>
-                  <a:srgbClr val="000000"/>
-                </a:solidFill>
-                <a:latin typeface="Arial"/>
-                <a:hlinkClick r:id="rId4"/>
-              </a:rPr>
-              <a:t>Intuitively Understanding Convolutions for Deep Learning</a:t>
-            </a:r>
-            <a:endParaRPr b="0" lang="en-US" sz="3200" spc="-1" strike="noStrike">
-              <a:solidFill>
-                <a:srgbClr val="000000"/>
-              </a:solidFill>
-              <a:latin typeface="Arial"/>
-            </a:endParaRPr>
-          </a:p>
-          <a:p>
-            <a:pPr marL="263520" indent="-197640">
-              <a:spcBef>
-                <a:spcPts val="1417"/>
-              </a:spcBef>
-              <a:buClr>
-                <a:srgbClr val="000000"/>
-              </a:buClr>
-              <a:buSzPct val="45000"/>
-              <a:buFont typeface="Wingdings" charset="2"/>
-              <a:buChar char=""/>
-            </a:pPr>
-            <a:r>
-              <a:rPr b="0" lang="en-US" sz="3200" spc="-1" strike="noStrike">
-                <a:solidFill>
-                  <a:srgbClr val="000000"/>
-                </a:solidFill>
-                <a:latin typeface="Arial"/>
-                <a:hlinkClick r:id="rId5"/>
-              </a:rPr>
-              <a:t>Convolutional Neural Network CNN- الشبكات العصبية الملتفة by dr. Ahmed Yousry [youtube]</a:t>
-            </a:r>
-            <a:endParaRPr b="0" lang="en-US" sz="3200" spc="-1" strike="noStrike">
-              <a:solidFill>
-                <a:srgbClr val="000000"/>
-              </a:solidFill>
-              <a:latin typeface="Arial"/>
-            </a:endParaRPr>
-          </a:p>
-          <a:p>
-            <a:pPr marL="263520" indent="-197640">
-              <a:spcBef>
-                <a:spcPts val="1417"/>
-              </a:spcBef>
-              <a:buClr>
-                <a:srgbClr val="000000"/>
-              </a:buClr>
-              <a:buSzPct val="45000"/>
-              <a:buFont typeface="Wingdings" charset="2"/>
-              <a:buChar char=""/>
-            </a:pPr>
-            <a:r>
-              <a:rPr b="0" lang="en-US" sz="3200" spc="-1" strike="noStrike">
-                <a:solidFill>
-                  <a:srgbClr val="000000"/>
-                </a:solidFill>
-                <a:latin typeface="Arial"/>
-                <a:hlinkClick r:id="rId6"/>
-              </a:rPr>
-              <a:t>What is ReLU and Sigmoid activation function?</a:t>
-            </a:r>
-            <a:endParaRPr b="0" lang="en-US" sz="3200" spc="-1" strike="noStrike">
-              <a:solidFill>
-                <a:srgbClr val="000000"/>
-              </a:solidFill>
-              <a:latin typeface="Arial"/>
-            </a:endParaRPr>
-          </a:p>
-          <a:p>
-            <a:pPr marL="263520" indent="-197640">
-              <a:spcBef>
-                <a:spcPts val="1417"/>
-              </a:spcBef>
-              <a:buClr>
-                <a:srgbClr val="000000"/>
-              </a:buClr>
-              <a:buSzPct val="45000"/>
-              <a:buFont typeface="Wingdings" charset="2"/>
-              <a:buChar char=""/>
-            </a:pPr>
-            <a:r>
-              <a:rPr b="0" lang="en-US" sz="3200" spc="-1" strike="noStrike">
-                <a:solidFill>
-                  <a:srgbClr val="000000"/>
-                </a:solidFill>
-                <a:latin typeface="Arial"/>
-                <a:hlinkClick r:id="rId7"/>
-              </a:rPr>
-              <a:t>Convolutional Neural Networks (CNN): Step 3 - Flattening</a:t>
-            </a:r>
-            <a:endParaRPr b="0" lang="en-US" sz="3200" spc="-1" strike="noStrike">
-              <a:solidFill>
-                <a:srgbClr val="000000"/>
-              </a:solidFill>
-              <a:latin typeface="Arial"/>
-            </a:endParaRPr>
-          </a:p>
-          <a:p>
-            <a:pPr marL="263520" indent="-197640">
-              <a:spcBef>
-                <a:spcPts val="1417"/>
-              </a:spcBef>
-              <a:buClr>
-                <a:srgbClr val="000000"/>
-              </a:buClr>
-              <a:buSzPct val="45000"/>
-              <a:buFont typeface="Wingdings" charset="2"/>
-              <a:buChar char=""/>
-            </a:pPr>
-            <a:r>
-              <a:rPr b="0" lang="en-US" sz="3200" spc="-1" strike="noStrike">
-                <a:solidFill>
-                  <a:srgbClr val="000000"/>
-                </a:solidFill>
-                <a:latin typeface="Arial"/>
-                <a:hlinkClick r:id="rId8"/>
-              </a:rPr>
-              <a:t>Feature map size calculate in CNN | Stride, Padding | Deep Learning Animation [youtube]</a:t>
-            </a:r>
-            <a:endParaRPr b="0" lang="en-US" sz="3200" spc="-1" strike="noStrike">
-              <a:solidFill>
-                <a:srgbClr val="000000"/>
-              </a:solidFill>
-              <a:latin typeface="Arial"/>
-            </a:endParaRPr>
-          </a:p>
-          <a:p>
-            <a:pPr marL="263520" indent="-197640">
-              <a:spcBef>
-                <a:spcPts val="1417"/>
-              </a:spcBef>
-              <a:buClr>
-                <a:srgbClr val="000000"/>
-              </a:buClr>
-              <a:buSzPct val="45000"/>
-              <a:buFont typeface="Wingdings" charset="2"/>
-              <a:buChar char=""/>
-            </a:pPr>
-            <a:r>
-              <a:rPr b="0" lang="en-US" sz="3200" spc="-1" strike="noStrike">
-                <a:solidFill>
-                  <a:srgbClr val="000000"/>
-                </a:solidFill>
-                <a:latin typeface="Arial"/>
-                <a:hlinkClick r:id="rId9"/>
-              </a:rPr>
-              <a:t>Fully Connected Layers in Convolutional Neural Networks</a:t>
-            </a:r>
-            <a:endParaRPr b="0" lang="en-US" sz="3200" spc="-1" strike="noStrike">
-              <a:solidFill>
-                <a:srgbClr val="000000"/>
-              </a:solidFill>
-              <a:latin typeface="Arial"/>
-            </a:endParaRPr>
-          </a:p>
-          <a:p>
-            <a:pPr marL="263520" indent="0">
-              <a:spcBef>
-                <a:spcPts val="1417"/>
-              </a:spcBef>
-              <a:buNone/>
-            </a:pPr>
-            <a:r>
-              <a:rPr b="0" lang="en-US" sz="3200" spc="-1" strike="noStrike">
+              <a:rPr b="0" lang="en-US" sz="2200" spc="-1" strike="noStrike">
                 <a:solidFill>
                   <a:srgbClr val="000000"/>
                 </a:solidFill>
                 <a:latin typeface="Arial"/>
               </a:rPr>
-              <a:t> </a:t>
-            </a:r>
-            <a:endParaRPr b="0" lang="en-US" sz="3200" spc="-1" strike="noStrike">
+              <a:t>Is a fully connected neural networks – the classic neural network architecture, in which all neurons connect to all neurons in the next layer.</a:t>
+            </a:r>
+            <a:endParaRPr b="0" lang="en-US" sz="2200" spc="-1" strike="noStrike">
               <a:solidFill>
                 <a:srgbClr val="000000"/>
               </a:solidFill>
@@ -8793,6 +9586,398 @@
                 <a:latin typeface="Arial"/>
               </a:rPr>
               <a:t> neural network that learns feature engineering by itself via filters (or kernel) optimization.</a:t>
+            </a:r>
+            <a:endParaRPr b="0" lang="en-US" sz="3200" spc="-1" strike="noStrike">
+              <a:solidFill>
+                <a:srgbClr val="000000"/>
+              </a:solidFill>
+              <a:latin typeface="Arial"/>
+            </a:endParaRPr>
+          </a:p>
+        </p:txBody>
+      </p:sp>
+    </p:spTree>
+  </p:cSld>
+  <mc:AlternateContent>
+    <mc:Choice Requires="p14">
+      <p:transition spd="slow" p14:dur="2000"/>
+    </mc:Choice>
+    <mc:Fallback>
+      <p:transition spd="slow"/>
+    </mc:Fallback>
+  </mc:AlternateContent>
+</p:sld>
+</file>
+
+<file path=ppt/slides/slide20.xml><?xml version="1.0" encoding="utf-8"?>
+<p:sld xmlns:a="http://schemas.openxmlformats.org/drawingml/2006/main" xmlns:p="http://schemas.openxmlformats.org/presentationml/2006/main" xmlns:r="http://schemas.openxmlformats.org/officeDocument/2006/relationships" xmlns:p14="http://schemas.microsoft.com/office/powerpoint/2010/main" xmlns:p15="http://schemas.microsoft.com/office/powerpoint/2012/main" xmlns:mc="http://schemas.openxmlformats.org/markup-compatibility/2006">
+  <p:cSld>
+    <p:spTree>
+      <p:nvGrpSpPr>
+        <p:cNvPr id="1" name=""/>
+        <p:cNvGrpSpPr/>
+        <p:nvPr/>
+      </p:nvGrpSpPr>
+      <p:grpSpPr>
+        <a:xfrm>
+          <a:off x="0" y="0"/>
+          <a:ext cx="0" cy="0"/>
+          <a:chOff x="0" y="0"/>
+          <a:chExt cx="0" cy="0"/>
+        </a:xfrm>
+      </p:grpSpPr>
+      <p:sp>
+        <p:nvSpPr>
+          <p:cNvPr id="119" name="PlaceHolder 1"/>
+          <p:cNvSpPr>
+            <a:spLocks noGrp="1"/>
+          </p:cNvSpPr>
+          <p:nvPr>
+            <p:ph type="title"/>
+          </p:nvPr>
+        </p:nvSpPr>
+        <p:spPr>
+          <a:xfrm>
+            <a:off x="504000" y="226080"/>
+            <a:ext cx="9071640" cy="946440"/>
+          </a:xfrm>
+          <a:prstGeom prst="rect">
+            <a:avLst/>
+          </a:prstGeom>
+          <a:noFill/>
+          <a:ln w="0">
+            <a:noFill/>
+          </a:ln>
+        </p:spPr>
+        <p:txBody>
+          <a:bodyPr lIns="0" rIns="0" tIns="0" bIns="0" anchor="ctr">
+            <a:noAutofit/>
+          </a:bodyPr>
+          <a:p>
+            <a:pPr indent="0" algn="ctr">
+              <a:buNone/>
+            </a:pPr>
+            <a:r>
+              <a:rPr b="0" lang="en-US" sz="4400" spc="-1" strike="noStrike">
+                <a:solidFill>
+                  <a:srgbClr val="000000"/>
+                </a:solidFill>
+                <a:latin typeface="Arial"/>
+              </a:rPr>
+              <a:t>Resources</a:t>
+            </a:r>
+            <a:endParaRPr b="0" lang="en-US" sz="4400" spc="-1" strike="noStrike">
+              <a:solidFill>
+                <a:srgbClr val="000000"/>
+              </a:solidFill>
+              <a:latin typeface="Arial"/>
+            </a:endParaRPr>
+          </a:p>
+        </p:txBody>
+      </p:sp>
+      <p:sp>
+        <p:nvSpPr>
+          <p:cNvPr id="120" name="PlaceHolder 2"/>
+          <p:cNvSpPr>
+            <a:spLocks noGrp="1"/>
+          </p:cNvSpPr>
+          <p:nvPr>
+            <p:ph/>
+          </p:nvPr>
+        </p:nvSpPr>
+        <p:spPr>
+          <a:xfrm>
+            <a:off x="504000" y="1326600"/>
+            <a:ext cx="9071640" cy="3288240"/>
+          </a:xfrm>
+          <a:prstGeom prst="rect">
+            <a:avLst/>
+          </a:prstGeom>
+          <a:noFill/>
+          <a:ln w="0">
+            <a:noFill/>
+          </a:ln>
+        </p:spPr>
+        <p:txBody>
+          <a:bodyPr lIns="0" rIns="0" tIns="0" bIns="0" anchor="t">
+            <a:normAutofit fontScale="61000"/>
+          </a:bodyPr>
+          <a:p>
+            <a:pPr marL="263520" indent="-197640">
+              <a:spcBef>
+                <a:spcPts val="1417"/>
+              </a:spcBef>
+              <a:buClr>
+                <a:srgbClr val="000000"/>
+              </a:buClr>
+              <a:buSzPct val="45000"/>
+              <a:buFont typeface="Wingdings" charset="2"/>
+              <a:buChar char=""/>
+            </a:pPr>
+            <a:r>
+              <a:rPr b="0" lang="en-US" sz="3200" spc="-1" strike="noStrike">
+                <a:solidFill>
+                  <a:srgbClr val="000000"/>
+                </a:solidFill>
+                <a:latin typeface="Arial"/>
+                <a:hlinkClick r:id="rId1"/>
+              </a:rPr>
+              <a:t>Convolutional neural network [wikipedia]</a:t>
+            </a:r>
+            <a:endParaRPr b="0" lang="en-US" sz="3200" spc="-1" strike="noStrike">
+              <a:solidFill>
+                <a:srgbClr val="000000"/>
+              </a:solidFill>
+              <a:latin typeface="Arial"/>
+            </a:endParaRPr>
+          </a:p>
+          <a:p>
+            <a:pPr marL="263520" indent="-197640">
+              <a:spcBef>
+                <a:spcPts val="1417"/>
+              </a:spcBef>
+              <a:buClr>
+                <a:srgbClr val="000000"/>
+              </a:buClr>
+              <a:buSzPct val="45000"/>
+              <a:buFont typeface="Wingdings" charset="2"/>
+              <a:buChar char=""/>
+            </a:pPr>
+            <a:r>
+              <a:rPr b="0" lang="en-US" sz="3200" spc="-1" strike="noStrike">
+                <a:solidFill>
+                  <a:srgbClr val="000000"/>
+                </a:solidFill>
+                <a:latin typeface="Arial"/>
+                <a:hlinkClick r:id="rId2"/>
+              </a:rPr>
+              <a:t>Feed-forward neural network [wikipedia]</a:t>
+            </a:r>
+            <a:endParaRPr b="0" lang="en-US" sz="3200" spc="-1" strike="noStrike">
+              <a:solidFill>
+                <a:srgbClr val="000000"/>
+              </a:solidFill>
+              <a:latin typeface="Arial"/>
+            </a:endParaRPr>
+          </a:p>
+          <a:p>
+            <a:pPr marL="263520" indent="-197640">
+              <a:spcBef>
+                <a:spcPts val="1417"/>
+              </a:spcBef>
+              <a:buClr>
+                <a:srgbClr val="000000"/>
+              </a:buClr>
+              <a:buSzPct val="45000"/>
+              <a:buFont typeface="Wingdings" charset="2"/>
+              <a:buChar char=""/>
+            </a:pPr>
+            <a:r>
+              <a:rPr b="0" lang="en-US" sz="3200" spc="-1" strike="noStrike">
+                <a:solidFill>
+                  <a:srgbClr val="000000"/>
+                </a:solidFill>
+                <a:latin typeface="Arial"/>
+                <a:hlinkClick r:id="rId3"/>
+              </a:rPr>
+              <a:t>Basics of CNN in Deep Learning</a:t>
+            </a:r>
+            <a:endParaRPr b="0" lang="en-US" sz="3200" spc="-1" strike="noStrike">
+              <a:solidFill>
+                <a:srgbClr val="000000"/>
+              </a:solidFill>
+              <a:latin typeface="Arial"/>
+            </a:endParaRPr>
+          </a:p>
+          <a:p>
+            <a:pPr marL="263520" indent="-197640">
+              <a:spcBef>
+                <a:spcPts val="1417"/>
+              </a:spcBef>
+              <a:buClr>
+                <a:srgbClr val="000000"/>
+              </a:buClr>
+              <a:buSzPct val="45000"/>
+              <a:buFont typeface="Wingdings" charset="2"/>
+              <a:buChar char=""/>
+            </a:pPr>
+            <a:r>
+              <a:rPr b="0" lang="en-US" sz="3200" spc="-1" strike="noStrike">
+                <a:solidFill>
+                  <a:srgbClr val="000000"/>
+                </a:solidFill>
+                <a:latin typeface="Arial"/>
+                <a:hlinkClick r:id="rId4"/>
+              </a:rPr>
+              <a:t>Intuitively Understanding Convolutions for Deep Learning</a:t>
+            </a:r>
+            <a:endParaRPr b="0" lang="en-US" sz="3200" spc="-1" strike="noStrike">
+              <a:solidFill>
+                <a:srgbClr val="000000"/>
+              </a:solidFill>
+              <a:latin typeface="Arial"/>
+            </a:endParaRPr>
+          </a:p>
+          <a:p>
+            <a:pPr marL="263520" indent="-197640">
+              <a:spcBef>
+                <a:spcPts val="1417"/>
+              </a:spcBef>
+              <a:buClr>
+                <a:srgbClr val="000000"/>
+              </a:buClr>
+              <a:buSzPct val="45000"/>
+              <a:buFont typeface="Wingdings" charset="2"/>
+              <a:buChar char=""/>
+            </a:pPr>
+            <a:r>
+              <a:rPr b="0" lang="en-US" sz="3200" spc="-1" strike="noStrike">
+                <a:solidFill>
+                  <a:srgbClr val="000000"/>
+                </a:solidFill>
+                <a:latin typeface="Arial"/>
+                <a:hlinkClick r:id="rId5"/>
+              </a:rPr>
+              <a:t>Convolutional Neural Network CNN- الشبكات العصبية الملتفة by dr. Ahmed Yousry [youtube]</a:t>
+            </a:r>
+            <a:endParaRPr b="0" lang="en-US" sz="3200" spc="-1" strike="noStrike">
+              <a:solidFill>
+                <a:srgbClr val="000000"/>
+              </a:solidFill>
+              <a:latin typeface="Arial"/>
+            </a:endParaRPr>
+          </a:p>
+          <a:p>
+            <a:pPr marL="263520" indent="-197640">
+              <a:spcBef>
+                <a:spcPts val="1417"/>
+              </a:spcBef>
+              <a:buClr>
+                <a:srgbClr val="000000"/>
+              </a:buClr>
+              <a:buSzPct val="45000"/>
+              <a:buFont typeface="Wingdings" charset="2"/>
+              <a:buChar char=""/>
+            </a:pPr>
+            <a:r>
+              <a:rPr b="0" lang="en-US" sz="3200" spc="-1" strike="noStrike">
+                <a:solidFill>
+                  <a:srgbClr val="000000"/>
+                </a:solidFill>
+                <a:latin typeface="Arial"/>
+                <a:hlinkClick r:id="rId6"/>
+              </a:rPr>
+              <a:t>What is ReLU and Sigmoid activation function?</a:t>
+            </a:r>
+            <a:endParaRPr b="0" lang="en-US" sz="3200" spc="-1" strike="noStrike">
+              <a:solidFill>
+                <a:srgbClr val="000000"/>
+              </a:solidFill>
+              <a:latin typeface="Arial"/>
+            </a:endParaRPr>
+          </a:p>
+          <a:p>
+            <a:pPr marL="263520" indent="-197640">
+              <a:spcBef>
+                <a:spcPts val="1417"/>
+              </a:spcBef>
+              <a:buClr>
+                <a:srgbClr val="000000"/>
+              </a:buClr>
+              <a:buSzPct val="45000"/>
+              <a:buFont typeface="Wingdings" charset="2"/>
+              <a:buChar char=""/>
+            </a:pPr>
+            <a:r>
+              <a:rPr b="0" lang="en-US" sz="3200" spc="-1" strike="noStrike">
+                <a:solidFill>
+                  <a:srgbClr val="000000"/>
+                </a:solidFill>
+                <a:latin typeface="Arial"/>
+                <a:hlinkClick r:id="rId7"/>
+              </a:rPr>
+              <a:t>Convolutional Neural Networks (CNN): Step 3 - Flattening</a:t>
+            </a:r>
+            <a:endParaRPr b="0" lang="en-US" sz="3200" spc="-1" strike="noStrike">
+              <a:solidFill>
+                <a:srgbClr val="000000"/>
+              </a:solidFill>
+              <a:latin typeface="Arial"/>
+            </a:endParaRPr>
+          </a:p>
+          <a:p>
+            <a:pPr marL="263520" indent="-197640">
+              <a:spcBef>
+                <a:spcPts val="1417"/>
+              </a:spcBef>
+              <a:buClr>
+                <a:srgbClr val="000000"/>
+              </a:buClr>
+              <a:buSzPct val="45000"/>
+              <a:buFont typeface="Wingdings" charset="2"/>
+              <a:buChar char=""/>
+            </a:pPr>
+            <a:r>
+              <a:rPr b="0" lang="en-US" sz="3200" spc="-1" strike="noStrike">
+                <a:solidFill>
+                  <a:srgbClr val="000000"/>
+                </a:solidFill>
+                <a:latin typeface="Arial"/>
+                <a:hlinkClick r:id="rId8"/>
+              </a:rPr>
+              <a:t>Feature map size calculate in CNN | Stride, Padding | Deep Learning Animation [youtube]</a:t>
+            </a:r>
+            <a:endParaRPr b="0" lang="en-US" sz="3200" spc="-1" strike="noStrike">
+              <a:solidFill>
+                <a:srgbClr val="000000"/>
+              </a:solidFill>
+              <a:latin typeface="Arial"/>
+            </a:endParaRPr>
+          </a:p>
+          <a:p>
+            <a:pPr marL="263520" indent="-197640">
+              <a:spcBef>
+                <a:spcPts val="1417"/>
+              </a:spcBef>
+              <a:buClr>
+                <a:srgbClr val="000000"/>
+              </a:buClr>
+              <a:buSzPct val="45000"/>
+              <a:buFont typeface="Wingdings" charset="2"/>
+              <a:buChar char=""/>
+            </a:pPr>
+            <a:r>
+              <a:rPr b="0" lang="en-US" sz="3200" spc="-1" strike="noStrike">
+                <a:solidFill>
+                  <a:srgbClr val="000000"/>
+                </a:solidFill>
+                <a:latin typeface="Arial"/>
+                <a:hlinkClick r:id="rId9"/>
+              </a:rPr>
+              <a:t>Fully Connected Layers in Convolutional Neural Networks</a:t>
+            </a:r>
+            <a:endParaRPr b="0" lang="en-US" sz="3200" spc="-1" strike="noStrike">
+              <a:solidFill>
+                <a:srgbClr val="000000"/>
+              </a:solidFill>
+              <a:latin typeface="Arial"/>
+            </a:endParaRPr>
+          </a:p>
+          <a:p>
+            <a:pPr marL="263520" indent="0">
+              <a:spcBef>
+                <a:spcPts val="1417"/>
+              </a:spcBef>
+              <a:buNone/>
+            </a:pPr>
+            <a:r>
+              <a:rPr b="0" lang="en-US" sz="3200" spc="-1" strike="noStrike">
+                <a:solidFill>
+                  <a:srgbClr val="000000"/>
+                </a:solidFill>
+                <a:latin typeface="Arial"/>
+              </a:rPr>
+              <a:t> </a:t>
             </a:r>
             <a:endParaRPr b="0" lang="en-US" sz="3200" spc="-1" strike="noStrike">
               <a:solidFill>

</xml_diff>

<commit_message>
update the pptx to the last odp version
</commit_message>
<xml_diff>
--- a/CNN.pptx
+++ b/CNN.pptx
@@ -28,6 +28,8 @@
     <p:sldId id="273" r:id="rId21"/>
     <p:sldId id="274" r:id="rId22"/>
     <p:sldId id="275" r:id="rId23"/>
+    <p:sldId id="276" r:id="rId24"/>
+    <p:sldId id="277" r:id="rId25"/>
   </p:sldIdLst>
   <p:sldSz cx="10080625" cy="5670550"/>
   <p:notesSz cx="7772400" cy="10058400"/>
@@ -358,7 +360,7 @@
             <a:pPr indent="0" algn="r">
               <a:buNone/>
             </a:pPr>
-            <a:fld id="{761D5A96-CC0B-4C88-BE78-4EF0115CF9EE}" type="slidenum">
+            <a:fld id="{D8E58831-7158-4039-8B1F-ED71122BC9ED}" type="slidenum">
               <a:rPr b="0" lang="en-US" sz="1400" spc="-1" strike="noStrike">
                 <a:solidFill>
                   <a:srgbClr val="000000"/>
@@ -382,7 +384,7 @@
 </p:notesMaster>
 </file>
 
-<file path=ppt/notesSlides/notesSlide17.xml><?xml version="1.0" encoding="utf-8"?>
+<file path=ppt/notesSlides/notesSlide10.xml><?xml version="1.0" encoding="utf-8"?>
 <p:notes xmlns:a="http://schemas.openxmlformats.org/drawingml/2006/main" xmlns:p="http://schemas.openxmlformats.org/presentationml/2006/main" xmlns:r="http://schemas.openxmlformats.org/officeDocument/2006/relationships" xmlns:p14="http://schemas.microsoft.com/office/powerpoint/2010/main" xmlns:p15="http://schemas.microsoft.com/office/powerpoint/2012/main" xmlns:mc="http://schemas.openxmlformats.org/markup-compatibility/2006">
   <p:cSld>
     <p:spTree>
@@ -401,7 +403,7 @@
       </p:grpSpPr>
       <p:sp>
         <p:nvSpPr>
-          <p:cNvPr id="127" name="PlaceHolder 1"/>
+          <p:cNvPr id="135" name="PlaceHolder 1"/>
           <p:cNvSpPr>
             <a:spLocks noGrp="1"/>
           </p:cNvSpPr>
@@ -424,7 +426,255 @@
       </p:sp>
       <p:sp>
         <p:nvSpPr>
-          <p:cNvPr id="128" name="PlaceHolder 2"/>
+          <p:cNvPr id="136" name="PlaceHolder 2"/>
+          <p:cNvSpPr>
+            <a:spLocks noGrp="1"/>
+          </p:cNvSpPr>
+          <p:nvPr>
+            <p:ph type="body"/>
+          </p:nvPr>
+        </p:nvSpPr>
+        <p:spPr>
+          <a:xfrm>
+            <a:off x="777240" y="4777560"/>
+            <a:ext cx="6217560" cy="4525920"/>
+          </a:xfrm>
+          <a:prstGeom prst="rect">
+            <a:avLst/>
+          </a:prstGeom>
+          <a:noFill/>
+          <a:ln w="0">
+            <a:noFill/>
+          </a:ln>
+        </p:spPr>
+        <p:txBody>
+          <a:bodyPr lIns="0" rIns="0" tIns="0" bIns="0" anchor="t">
+            <a:noAutofit/>
+          </a:bodyPr>
+          <a:p>
+            <a:pPr marL="216000" indent="0">
+              <a:buNone/>
+            </a:pPr>
+            <a:r>
+              <a:rPr b="0" lang="en-US" sz="2000" spc="-1" strike="noStrike">
+                <a:solidFill>
+                  <a:srgbClr val="000000"/>
+                </a:solidFill>
+                <a:latin typeface="Arial"/>
+              </a:rPr>
+              <a:t>it aids in preventing any information loss, particularly from the edges of the image</a:t>
+            </a:r>
+            <a:endParaRPr b="0" lang="en-US" sz="2000" spc="-1" strike="noStrike">
+              <a:solidFill>
+                <a:srgbClr val="000000"/>
+              </a:solidFill>
+              <a:latin typeface="Arial"/>
+            </a:endParaRPr>
+          </a:p>
+        </p:txBody>
+      </p:sp>
+    </p:spTree>
+  </p:cSld>
+</p:notes>
+</file>
+
+<file path=ppt/notesSlides/notesSlide11.xml><?xml version="1.0" encoding="utf-8"?>
+<p:notes xmlns:a="http://schemas.openxmlformats.org/drawingml/2006/main" xmlns:p="http://schemas.openxmlformats.org/presentationml/2006/main" xmlns:r="http://schemas.openxmlformats.org/officeDocument/2006/relationships" xmlns:p14="http://schemas.microsoft.com/office/powerpoint/2010/main" xmlns:p15="http://schemas.microsoft.com/office/powerpoint/2012/main" xmlns:mc="http://schemas.openxmlformats.org/markup-compatibility/2006">
+  <p:cSld>
+    <p:spTree>
+      <p:nvGrpSpPr>
+        <p:cNvPr id="1" name=""/>
+        <p:cNvGrpSpPr/>
+        <p:nvPr/>
+      </p:nvGrpSpPr>
+      <p:grpSpPr>
+        <a:xfrm>
+          <a:off x="0" y="0"/>
+          <a:ext cx="0" cy="0"/>
+          <a:chOff x="0" y="0"/>
+          <a:chExt cx="0" cy="0"/>
+        </a:xfrm>
+      </p:grpSpPr>
+      <p:sp>
+        <p:nvSpPr>
+          <p:cNvPr id="137" name="PlaceHolder 1"/>
+          <p:cNvSpPr>
+            <a:spLocks noGrp="1"/>
+          </p:cNvSpPr>
+          <p:nvPr>
+            <p:ph type="sldImg"/>
+          </p:nvPr>
+        </p:nvSpPr>
+        <p:spPr>
+          <a:xfrm>
+            <a:off x="533520" y="764280"/>
+            <a:ext cx="6704640" cy="3771360"/>
+          </a:xfrm>
+          <a:prstGeom prst="rect">
+            <a:avLst/>
+          </a:prstGeom>
+          <a:ln w="0">
+            <a:noFill/>
+          </a:ln>
+        </p:spPr>
+      </p:sp>
+      <p:sp>
+        <p:nvSpPr>
+          <p:cNvPr id="138" name="PlaceHolder 2"/>
+          <p:cNvSpPr>
+            <a:spLocks noGrp="1"/>
+          </p:cNvSpPr>
+          <p:nvPr>
+            <p:ph type="body"/>
+          </p:nvPr>
+        </p:nvSpPr>
+        <p:spPr>
+          <a:xfrm>
+            <a:off x="777240" y="4777560"/>
+            <a:ext cx="6217560" cy="4525920"/>
+          </a:xfrm>
+          <a:prstGeom prst="rect">
+            <a:avLst/>
+          </a:prstGeom>
+          <a:noFill/>
+          <a:ln w="0">
+            <a:noFill/>
+          </a:ln>
+        </p:spPr>
+        <p:txBody>
+          <a:bodyPr lIns="0" rIns="0" tIns="0" bIns="0" anchor="t">
+            <a:noAutofit/>
+          </a:bodyPr>
+          <a:p>
+            <a:pPr marL="216000" indent="0">
+              <a:buNone/>
+            </a:pPr>
+            <a:r>
+              <a:rPr b="0" lang="en-US" sz="2000" spc="-1" strike="noStrike">
+                <a:solidFill>
+                  <a:srgbClr val="000000"/>
+                </a:solidFill>
+                <a:latin typeface="Arial"/>
+              </a:rPr>
+              <a:t>3. Different Types of Padding:</a:t>
+            </a:r>
+            <a:endParaRPr b="0" lang="en-US" sz="2000" spc="-1" strike="noStrike">
+              <a:solidFill>
+                <a:srgbClr val="000000"/>
+              </a:solidFill>
+              <a:latin typeface="Arial"/>
+            </a:endParaRPr>
+          </a:p>
+          <a:p>
+            <a:pPr marL="216000" indent="0">
+              <a:buNone/>
+            </a:pPr>
+            <a:r>
+              <a:rPr b="0" lang="en-US" sz="2000" spc="-1" strike="noStrike">
+                <a:solidFill>
+                  <a:srgbClr val="000000"/>
+                </a:solidFill>
+                <a:latin typeface="Arial"/>
+              </a:rPr>
+              <a:t>Valid Padding</a:t>
+            </a:r>
+            <a:endParaRPr b="0" lang="en-US" sz="2000" spc="-1" strike="noStrike">
+              <a:solidFill>
+                <a:srgbClr val="000000"/>
+              </a:solidFill>
+              <a:latin typeface="Arial"/>
+            </a:endParaRPr>
+          </a:p>
+          <a:p>
+            <a:pPr marL="216000" indent="0">
+              <a:buNone/>
+            </a:pPr>
+            <a:r>
+              <a:rPr b="0" lang="en-US" sz="2000" spc="-1" strike="noStrike">
+                <a:solidFill>
+                  <a:srgbClr val="000000"/>
+                </a:solidFill>
+                <a:latin typeface="Arial"/>
+              </a:rPr>
+              <a:t>Same Padding</a:t>
+            </a:r>
+            <a:endParaRPr b="0" lang="en-US" sz="2000" spc="-1" strike="noStrike">
+              <a:solidFill>
+                <a:srgbClr val="000000"/>
+              </a:solidFill>
+              <a:latin typeface="Arial"/>
+            </a:endParaRPr>
+          </a:p>
+          <a:p>
+            <a:pPr marL="216000" indent="0">
+              <a:buNone/>
+            </a:pPr>
+            <a:r>
+              <a:rPr b="0" lang="en-US" sz="2000" spc="-1" strike="noStrike">
+                <a:solidFill>
+                  <a:srgbClr val="000000"/>
+                </a:solidFill>
+                <a:latin typeface="Arial"/>
+              </a:rPr>
+              <a:t>Causal Padding</a:t>
+            </a:r>
+            <a:endParaRPr b="0" lang="en-US" sz="2000" spc="-1" strike="noStrike">
+              <a:solidFill>
+                <a:srgbClr val="000000"/>
+              </a:solidFill>
+              <a:latin typeface="Arial"/>
+            </a:endParaRPr>
+          </a:p>
+        </p:txBody>
+      </p:sp>
+    </p:spTree>
+  </p:cSld>
+</p:notes>
+</file>
+
+<file path=ppt/notesSlides/notesSlide18.xml><?xml version="1.0" encoding="utf-8"?>
+<p:notes xmlns:a="http://schemas.openxmlformats.org/drawingml/2006/main" xmlns:p="http://schemas.openxmlformats.org/presentationml/2006/main" xmlns:r="http://schemas.openxmlformats.org/officeDocument/2006/relationships" xmlns:p14="http://schemas.microsoft.com/office/powerpoint/2010/main" xmlns:p15="http://schemas.microsoft.com/office/powerpoint/2012/main" xmlns:mc="http://schemas.openxmlformats.org/markup-compatibility/2006">
+  <p:cSld>
+    <p:spTree>
+      <p:nvGrpSpPr>
+        <p:cNvPr id="1" name=""/>
+        <p:cNvGrpSpPr/>
+        <p:nvPr/>
+      </p:nvGrpSpPr>
+      <p:grpSpPr>
+        <a:xfrm>
+          <a:off x="0" y="0"/>
+          <a:ext cx="0" cy="0"/>
+          <a:chOff x="0" y="0"/>
+          <a:chExt cx="0" cy="0"/>
+        </a:xfrm>
+      </p:grpSpPr>
+      <p:sp>
+        <p:nvSpPr>
+          <p:cNvPr id="139" name="PlaceHolder 1"/>
+          <p:cNvSpPr>
+            <a:spLocks noGrp="1"/>
+          </p:cNvSpPr>
+          <p:nvPr>
+            <p:ph type="sldImg"/>
+          </p:nvPr>
+        </p:nvSpPr>
+        <p:spPr>
+          <a:xfrm>
+            <a:off x="533520" y="764280"/>
+            <a:ext cx="6704640" cy="3771360"/>
+          </a:xfrm>
+          <a:prstGeom prst="rect">
+            <a:avLst/>
+          </a:prstGeom>
+          <a:ln w="0">
+            <a:noFill/>
+          </a:ln>
+        </p:spPr>
+      </p:sp>
+      <p:sp>
+        <p:nvSpPr>
+          <p:cNvPr id="140" name="PlaceHolder 2"/>
           <p:cNvSpPr>
             <a:spLocks noGrp="1"/>
           </p:cNvSpPr>
@@ -557,7 +807,7 @@
       </p:grpSpPr>
       <p:sp>
         <p:nvSpPr>
-          <p:cNvPr id="121" name="PlaceHolder 1"/>
+          <p:cNvPr id="129" name="PlaceHolder 1"/>
           <p:cNvSpPr>
             <a:spLocks noGrp="1"/>
           </p:cNvSpPr>
@@ -580,7 +830,7 @@
       </p:sp>
       <p:sp>
         <p:nvSpPr>
-          <p:cNvPr id="122" name="PlaceHolder 2"/>
+          <p:cNvPr id="130" name="PlaceHolder 2"/>
           <p:cNvSpPr>
             <a:spLocks noGrp="1"/>
           </p:cNvSpPr>
@@ -671,6 +921,100 @@
                 <a:latin typeface="Arial"/>
               </a:rPr>
               <a:t> flow. Modern feedforward networks are trained using the backpropagation method and are colloquially referred to as the "vanilla" neural networks.</a:t>
+            </a:r>
+            <a:endParaRPr b="0" lang="en-US" sz="2000" spc="-1" strike="noStrike">
+              <a:solidFill>
+                <a:srgbClr val="000000"/>
+              </a:solidFill>
+              <a:latin typeface="Arial"/>
+            </a:endParaRPr>
+          </a:p>
+        </p:txBody>
+      </p:sp>
+    </p:spTree>
+  </p:cSld>
+</p:notes>
+</file>
+
+<file path=ppt/notesSlides/notesSlide21.xml><?xml version="1.0" encoding="utf-8"?>
+<p:notes xmlns:a="http://schemas.openxmlformats.org/drawingml/2006/main" xmlns:p="http://schemas.openxmlformats.org/presentationml/2006/main" xmlns:r="http://schemas.openxmlformats.org/officeDocument/2006/relationships" xmlns:p14="http://schemas.microsoft.com/office/powerpoint/2010/main" xmlns:p15="http://schemas.microsoft.com/office/powerpoint/2012/main" xmlns:mc="http://schemas.openxmlformats.org/markup-compatibility/2006">
+  <p:cSld>
+    <p:spTree>
+      <p:nvGrpSpPr>
+        <p:cNvPr id="1" name=""/>
+        <p:cNvGrpSpPr/>
+        <p:nvPr/>
+      </p:nvGrpSpPr>
+      <p:grpSpPr>
+        <a:xfrm>
+          <a:off x="0" y="0"/>
+          <a:ext cx="0" cy="0"/>
+          <a:chOff x="0" y="0"/>
+          <a:chExt cx="0" cy="0"/>
+        </a:xfrm>
+      </p:grpSpPr>
+      <p:sp>
+        <p:nvSpPr>
+          <p:cNvPr id="141" name="PlaceHolder 1"/>
+          <p:cNvSpPr>
+            <a:spLocks noGrp="1"/>
+          </p:cNvSpPr>
+          <p:nvPr>
+            <p:ph type="sldImg"/>
+          </p:nvPr>
+        </p:nvSpPr>
+        <p:spPr>
+          <a:xfrm>
+            <a:off x="533520" y="764280"/>
+            <a:ext cx="6704640" cy="3771360"/>
+          </a:xfrm>
+          <a:prstGeom prst="rect">
+            <a:avLst/>
+          </a:prstGeom>
+          <a:ln w="0">
+            <a:noFill/>
+          </a:ln>
+        </p:spPr>
+      </p:sp>
+      <p:sp>
+        <p:nvSpPr>
+          <p:cNvPr id="142" name="PlaceHolder 2"/>
+          <p:cNvSpPr>
+            <a:spLocks noGrp="1"/>
+          </p:cNvSpPr>
+          <p:nvPr>
+            <p:ph type="body"/>
+          </p:nvPr>
+        </p:nvSpPr>
+        <p:spPr>
+          <a:xfrm>
+            <a:off x="777240" y="4777560"/>
+            <a:ext cx="6217560" cy="4525920"/>
+          </a:xfrm>
+          <a:prstGeom prst="rect">
+            <a:avLst/>
+          </a:prstGeom>
+          <a:noFill/>
+          <a:ln w="0">
+            <a:noFill/>
+          </a:ln>
+        </p:spPr>
+        <p:txBody>
+          <a:bodyPr lIns="0" rIns="0" tIns="0" bIns="0" anchor="t">
+            <a:noAutofit/>
+          </a:bodyPr>
+          <a:p>
+            <a:pPr marL="216000" indent="0">
+              <a:buNone/>
+            </a:pPr>
+            <a:r>
+              <a:rPr b="0" lang="en-US" sz="2000" spc="-1" strike="noStrike">
+                <a:solidFill>
+                  <a:srgbClr val="000000"/>
+                </a:solidFill>
+                <a:latin typeface="Arial"/>
+              </a:rPr>
+              <a:t>The MNIST database (Modified National Institute of Standards and Technology database[1]) is a large database of handwritten digits that is commonly used for training various image processing systems.[2][3] The database is also widely used for training and testing in the field of machine learning.[4][5] It was created by "re-mixing" the samples from NIST's original datasets</a:t>
             </a:r>
             <a:endParaRPr b="0" lang="en-US" sz="2000" spc="-1" strike="noStrike">
               <a:solidFill>
@@ -705,7 +1049,7 @@
       </p:grpSpPr>
       <p:sp>
         <p:nvSpPr>
-          <p:cNvPr id="123" name="PlaceHolder 1"/>
+          <p:cNvPr id="131" name="PlaceHolder 1"/>
           <p:cNvSpPr>
             <a:spLocks noGrp="1"/>
           </p:cNvSpPr>
@@ -728,7 +1072,7 @@
       </p:sp>
       <p:sp>
         <p:nvSpPr>
-          <p:cNvPr id="124" name="PlaceHolder 2"/>
+          <p:cNvPr id="132" name="PlaceHolder 2"/>
           <p:cNvSpPr>
             <a:spLocks noGrp="1"/>
           </p:cNvSpPr>
@@ -944,7 +1288,7 @@
       </p:grpSpPr>
       <p:sp>
         <p:nvSpPr>
-          <p:cNvPr id="125" name="PlaceHolder 1"/>
+          <p:cNvPr id="133" name="PlaceHolder 1"/>
           <p:cNvSpPr>
             <a:spLocks noGrp="1"/>
           </p:cNvSpPr>
@@ -967,7 +1311,7 @@
       </p:sp>
       <p:sp>
         <p:nvSpPr>
-          <p:cNvPr id="126" name="PlaceHolder 2"/>
+          <p:cNvPr id="134" name="PlaceHolder 2"/>
           <p:cNvSpPr>
             <a:spLocks noGrp="1"/>
           </p:cNvSpPr>
@@ -1110,7 +1454,7 @@
         <p:txBody>
           <a:bodyPr/>
           <a:p>
-            <a:fld id="{D8FF8748-F054-46D4-81FE-A4334F42625C}" type="slidenum">
+            <a:fld id="{D9554186-E273-420E-A4B8-9BD402449A14}" type="slidenum">
               <a:t>&lt;#&gt;</a:t>
             </a:fld>
           </a:p>
@@ -1319,7 +1663,7 @@
         <p:txBody>
           <a:bodyPr/>
           <a:p>
-            <a:fld id="{5563D445-48BE-49C3-BBDA-E424F015B164}" type="slidenum">
+            <a:fld id="{2306ADEA-3080-49B0-91C0-F64D49455B1A}" type="slidenum">
               <a:t>&lt;#&gt;</a:t>
             </a:fld>
           </a:p>
@@ -1614,7 +1958,7 @@
         <p:txBody>
           <a:bodyPr/>
           <a:p>
-            <a:fld id="{F58AAA94-F468-4F05-A6EE-52953C39E4F6}" type="slidenum">
+            <a:fld id="{1B9E2C27-180E-4681-9AE6-FB55D97A8192}" type="slidenum">
               <a:t>&lt;#&gt;</a:t>
             </a:fld>
           </a:p>
@@ -1995,7 +2339,7 @@
         <p:txBody>
           <a:bodyPr/>
           <a:p>
-            <a:fld id="{2B5DC771-1A4D-4ED5-9A8B-9C7BAA83745C}" type="slidenum">
+            <a:fld id="{45BA15DD-53C9-4778-A28F-45625A3FF84F}" type="slidenum">
               <a:t>&lt;#&gt;</a:t>
             </a:fld>
           </a:p>
@@ -2158,7 +2502,7 @@
         <p:txBody>
           <a:bodyPr/>
           <a:p>
-            <a:fld id="{F7D3738C-EB2D-4626-88C8-AB35B2750CF3}" type="slidenum">
+            <a:fld id="{DC6300B1-0327-422E-988C-250D391F3F74}" type="slidenum">
               <a:t>&lt;#&gt;</a:t>
             </a:fld>
           </a:p>
@@ -2324,7 +2668,7 @@
         <p:txBody>
           <a:bodyPr/>
           <a:p>
-            <a:fld id="{62812092-6142-433B-A2E8-1212E7967516}" type="slidenum">
+            <a:fld id="{48627E94-A931-45F3-B527-929DE65CA4B9}" type="slidenum">
               <a:t>&lt;#&gt;</a:t>
             </a:fld>
           </a:p>
@@ -2533,7 +2877,7 @@
         <p:txBody>
           <a:bodyPr/>
           <a:p>
-            <a:fld id="{CD08AEEA-C13D-4574-817A-C889809C89E2}" type="slidenum">
+            <a:fld id="{F8D343C4-07FA-4FBF-A319-B66540A2F10B}" type="slidenum">
               <a:t>&lt;#&gt;</a:t>
             </a:fld>
           </a:p>
@@ -2656,7 +3000,7 @@
         <p:txBody>
           <a:bodyPr/>
           <a:p>
-            <a:fld id="{9C78CCA0-B986-497D-879F-9C6EB6FBE2F4}" type="slidenum">
+            <a:fld id="{F8BADE0C-008C-4A5C-AD21-B93E0C14B2E7}" type="slidenum">
               <a:t>&lt;#&gt;</a:t>
             </a:fld>
           </a:p>
@@ -2777,7 +3121,7 @@
         <p:txBody>
           <a:bodyPr/>
           <a:p>
-            <a:fld id="{DAB2DE71-7111-4E75-A3E0-E84BCC2497A4}" type="slidenum">
+            <a:fld id="{6A4CE54B-3A2A-41A0-B5CC-1B1114BE4A31}" type="slidenum">
               <a:t>&lt;#&gt;</a:t>
             </a:fld>
           </a:p>
@@ -3029,7 +3373,7 @@
         <p:txBody>
           <a:bodyPr/>
           <a:p>
-            <a:fld id="{E5A8DBEE-827F-4D41-9250-AE8007C87F55}" type="slidenum">
+            <a:fld id="{B327F0FD-3481-40E5-A4EF-EFF805D4FA95}" type="slidenum">
               <a:t>&lt;#&gt;</a:t>
             </a:fld>
           </a:p>
@@ -3281,7 +3625,7 @@
         <p:txBody>
           <a:bodyPr/>
           <a:p>
-            <a:fld id="{798E63AF-5C2A-45A6-A8B5-A630060C8403}" type="slidenum">
+            <a:fld id="{9BC61CB1-1BAE-4C92-86B1-CD2E398A4363}" type="slidenum">
               <a:t>&lt;#&gt;</a:t>
             </a:fld>
           </a:p>
@@ -3533,7 +3877,7 @@
         <p:txBody>
           <a:bodyPr/>
           <a:p>
-            <a:fld id="{A072A163-2C64-4F73-83FC-42894957980C}" type="slidenum">
+            <a:fld id="{2AFA35C4-1D17-4A30-BE53-511AB9EE4A83}" type="slidenum">
               <a:t>&lt;#&gt;</a:t>
             </a:fld>
           </a:p>
@@ -4018,7 +4362,7 @@
             <a:pPr indent="0" algn="r">
               <a:buNone/>
             </a:pPr>
-            <a:fld id="{D5D233E6-DE83-401D-B0D5-A0346FD899F9}" type="slidenum">
+            <a:fld id="{CB3DD9DB-3E2F-4B2D-B8B4-61C758C047FF}" type="slidenum">
               <a:rPr b="0" lang="en-US" sz="1400" spc="-1" strike="noStrike">
                 <a:solidFill>
                   <a:srgbClr val="000000"/>
@@ -8222,10 +8566,20 @@
                   <a:srgbClr val="000000"/>
                 </a:solidFill>
                 <a:latin typeface="Arial"/>
+                <a:ea typeface="Noto Sans CJK SC"/>
               </a:rPr>
-              <a:t>Calculate the feature map size</a:t>
-            </a:r>
-            <a:endParaRPr b="0" lang="en-US" sz="4400" spc="-1" strike="noStrike">
+              <a:t>Calculate Padding </a:t>
+            </a:r>
+            <a:r>
+              <a:rPr b="0" lang="en-US" sz="2200" spc="-1" strike="noStrike">
+                <a:solidFill>
+                  <a:srgbClr val="000000"/>
+                </a:solidFill>
+                <a:latin typeface="Arial"/>
+              </a:rPr>
+              <a:t>Convolutional layer cont..</a:t>
+            </a:r>
+            <a:endParaRPr b="0" lang="en-US" sz="2200" spc="-1" strike="noStrike">
               <a:solidFill>
                 <a:srgbClr val="000000"/>
               </a:solidFill>
@@ -8234,29 +8588,147 @@
           </a:p>
         </p:txBody>
       </p:sp>
-      <p:pic>
-        <p:nvPicPr>
-          <p:cNvPr id="100" name="" descr=""/>
-          <p:cNvPicPr/>
-          <p:nvPr/>
-        </p:nvPicPr>
-        <p:blipFill>
-          <a:blip r:embed="rId1"/>
-          <a:stretch/>
-        </p:blipFill>
-        <p:spPr>
-          <a:xfrm>
-            <a:off x="1152720" y="2057400"/>
-            <a:ext cx="7305480" cy="1999800"/>
-          </a:xfrm>
-          <a:prstGeom prst="rect">
-            <a:avLst/>
-          </a:prstGeom>
-          <a:ln w="0">
-            <a:noFill/>
-          </a:ln>
-        </p:spPr>
-      </p:pic>
+      <mc:AlternateContent>
+        <mc:Choice xmlns:a14="http://schemas.microsoft.com/office/drawing/2010/main" Requires="a14">
+          <p:sp>
+            <p:nvSpPr>
+              <p:cNvPr id="100" name=""/>
+              <p:cNvSpPr txBox="1"/>
+              <p:nvPr/>
+            </p:nvSpPr>
+            <p:spPr>
+              <a:xfrm>
+                <a:off x="2743200" y="1749600"/>
+                <a:ext cx="4356360" cy="719280"/>
+              </a:xfrm>
+              <a:prstGeom prst="rect">
+                <a:avLst/>
+              </a:prstGeom>
+            </p:spPr>
+            <p:txBody>
+              <a:bodyPr/>
+              <a:p>
+                <a14:m>
+                  <m:oMath xmlns:m="http://schemas.openxmlformats.org/officeDocument/2006/math">
+                    <m:r>
+                      <m:t xml:space="preserve">p</m:t>
+                    </m:r>
+                    <m:r>
+                      <m:t xml:space="preserve">=</m:t>
+                    </m:r>
+                    <m:f>
+                      <m:num>
+                        <m:r>
+                          <m:t xml:space="preserve">n</m:t>
+                        </m:r>
+                        <m:r>
+                          <m:t xml:space="preserve">∗</m:t>
+                        </m:r>
+                        <m:r>
+                          <m:t xml:space="preserve">s</m:t>
+                        </m:r>
+                        <m:r>
+                          <m:t xml:space="preserve">−</m:t>
+                        </m:r>
+                        <m:r>
+                          <m:t xml:space="preserve">n</m:t>
+                        </m:r>
+                        <m:r>
+                          <m:t xml:space="preserve">+</m:t>
+                        </m:r>
+                        <m:r>
+                          <m:t xml:space="preserve">f</m:t>
+                        </m:r>
+                        <m:r>
+                          <m:t xml:space="preserve">−</m:t>
+                        </m:r>
+                        <m:r>
+                          <m:t xml:space="preserve">s</m:t>
+                        </m:r>
+                      </m:num>
+                      <m:den>
+                        <m:r>
+                          <m:t xml:space="preserve">2</m:t>
+                        </m:r>
+                      </m:den>
+                    </m:f>
+                  </m:oMath>
+                </a14:m>
+              </a:p>
+            </p:txBody>
+          </p:sp>
+        </mc:Choice>
+        <mc:Fallback/>
+      </mc:AlternateContent>
+      <mc:AlternateContent>
+        <mc:Choice xmlns:a14="http://schemas.microsoft.com/office/drawing/2010/main" Requires="a14">
+          <p:sp>
+            <p:nvSpPr>
+              <p:cNvPr id="101" name=""/>
+              <p:cNvSpPr txBox="1"/>
+              <p:nvPr/>
+            </p:nvSpPr>
+            <p:spPr>
+              <a:xfrm>
+                <a:off x="2971800" y="3200400"/>
+                <a:ext cx="4229640" cy="719280"/>
+              </a:xfrm>
+              <a:prstGeom prst="rect">
+                <a:avLst/>
+              </a:prstGeom>
+            </p:spPr>
+            <p:txBody>
+              <a:bodyPr/>
+              <a:p>
+                <a14:m>
+                  <m:oMath xmlns:m="http://schemas.openxmlformats.org/officeDocument/2006/math">
+                    <m:r>
+                      <m:t xml:space="preserve">let</m:t>
+                    </m:r>
+                    <m:r>
+                      <m:t xml:space="preserve">s</m:t>
+                    </m:r>
+                    <m:r>
+                      <m:t xml:space="preserve">=</m:t>
+                    </m:r>
+                    <m:r>
+                      <m:t xml:space="preserve">1</m:t>
+                    </m:r>
+                    <m:r>
+                      <m:t xml:space="preserve">,</m:t>
+                    </m:r>
+                    <m:r>
+                      <m:t xml:space="preserve">p</m:t>
+                    </m:r>
+                    <m:r>
+                      <m:t xml:space="preserve">=</m:t>
+                    </m:r>
+                    <m:f>
+                      <m:num>
+                        <m:r>
+                          <m:t xml:space="preserve">f</m:t>
+                        </m:r>
+                        <m:r>
+                          <m:t xml:space="preserve">−</m:t>
+                        </m:r>
+                        <m:r>
+                          <m:t xml:space="preserve">1</m:t>
+                        </m:r>
+                      </m:num>
+                      <m:den>
+                        <m:r>
+                          <m:t xml:space="preserve">2</m:t>
+                        </m:r>
+                      </m:den>
+                    </m:f>
+                  </m:oMath>
+                </a14:m>
+              </a:p>
+            </p:txBody>
+          </p:sp>
+        </mc:Choice>
+        <mc:Fallback/>
+      </mc:AlternateContent>
     </p:spTree>
   </p:cSld>
   <mc:AlternateContent>
@@ -8271,59 +8743,6 @@
 </file>
 
 <file path=ppt/slides/slide13.xml><?xml version="1.0" encoding="utf-8"?>
-<p:sld xmlns:a="http://schemas.openxmlformats.org/drawingml/2006/main" xmlns:p="http://schemas.openxmlformats.org/presentationml/2006/main" xmlns:r="http://schemas.openxmlformats.org/officeDocument/2006/relationships" xmlns:p14="http://schemas.microsoft.com/office/powerpoint/2010/main" xmlns:p15="http://schemas.microsoft.com/office/powerpoint/2012/main" xmlns:mc="http://schemas.openxmlformats.org/markup-compatibility/2006">
-  <p:cSld>
-    <p:spTree>
-      <p:nvGrpSpPr>
-        <p:cNvPr id="1" name=""/>
-        <p:cNvGrpSpPr/>
-        <p:nvPr/>
-      </p:nvGrpSpPr>
-      <p:grpSpPr>
-        <a:xfrm>
-          <a:off x="0" y="0"/>
-          <a:ext cx="0" cy="0"/>
-          <a:chOff x="0" y="0"/>
-          <a:chExt cx="0" cy="0"/>
-        </a:xfrm>
-      </p:grpSpPr>
-      <p:pic>
-        <p:nvPicPr>
-          <p:cNvPr id="101" name="" descr=""/>
-          <p:cNvPicPr/>
-          <p:nvPr/>
-        </p:nvPicPr>
-        <p:blipFill>
-          <a:blip r:embed="rId1"/>
-          <a:stretch/>
-        </p:blipFill>
-        <p:spPr>
-          <a:xfrm>
-            <a:off x="963360" y="-720"/>
-            <a:ext cx="8149680" cy="5669640"/>
-          </a:xfrm>
-          <a:prstGeom prst="rect">
-            <a:avLst/>
-          </a:prstGeom>
-          <a:ln w="0">
-            <a:noFill/>
-          </a:ln>
-        </p:spPr>
-      </p:pic>
-    </p:spTree>
-  </p:cSld>
-  <mc:AlternateContent>
-    <mc:Choice Requires="p14">
-      <p:transition spd="slow" p14:dur="2000"/>
-    </mc:Choice>
-    <mc:Fallback>
-      <p:transition spd="slow"/>
-    </mc:Fallback>
-  </mc:AlternateContent>
-</p:sld>
-</file>
-
-<file path=ppt/slides/slide14.xml><?xml version="1.0" encoding="utf-8"?>
 <p:sld xmlns:a="http://schemas.openxmlformats.org/drawingml/2006/main" xmlns:p="http://schemas.openxmlformats.org/presentationml/2006/main" xmlns:r="http://schemas.openxmlformats.org/officeDocument/2006/relationships" xmlns:p14="http://schemas.microsoft.com/office/powerpoint/2010/main" xmlns:p15="http://schemas.microsoft.com/office/powerpoint/2012/main" xmlns:mc="http://schemas.openxmlformats.org/markup-compatibility/2006">
   <p:cSld>
     <p:spTree>
@@ -8378,7 +8797,7 @@
                 </a:solidFill>
                 <a:latin typeface="Arial"/>
               </a:rPr>
-              <a:t>ReLU layer</a:t>
+              <a:t>Calculate the feature map size</a:t>
             </a:r>
             <a:endParaRPr b="0" lang="en-US" sz="4400" spc="-1" strike="noStrike">
               <a:solidFill>
@@ -8389,20 +8808,88 @@
           </a:p>
         </p:txBody>
       </p:sp>
+      <mc:AlternateContent>
+        <mc:Choice xmlns:a14="http://schemas.microsoft.com/office/drawing/2010/main" Requires="a14">
+          <p:sp>
+            <p:nvSpPr>
+              <p:cNvPr id="103" name=""/>
+              <p:cNvSpPr txBox="1"/>
+              <p:nvPr/>
+            </p:nvSpPr>
+            <p:spPr>
+              <a:xfrm>
+                <a:off x="606240" y="2267280"/>
+                <a:ext cx="8739000" cy="962640"/>
+              </a:xfrm>
+              <a:prstGeom prst="rect">
+                <a:avLst/>
+              </a:prstGeom>
+            </p:spPr>
+            <p:txBody>
+              <a:bodyPr/>
+              <a:p>
+                <a14:m>
+                  <m:oMath xmlns:m="http://schemas.openxmlformats.org/officeDocument/2006/math">
+                    <m:r>
+                      <m:t xml:space="preserve">feature</m:t>
+                    </m:r>
+                    <m:r>
+                      <m:t xml:space="preserve">map</m:t>
+                    </m:r>
+                    <m:r>
+                      <m:t xml:space="preserve">=</m:t>
+                    </m:r>
+                    <m:f>
+                      <m:num>
+                        <m:r>
+                          <m:t xml:space="preserve">n</m:t>
+                        </m:r>
+                        <m:r>
+                          <m:t xml:space="preserve">−</m:t>
+                        </m:r>
+                        <m:r>
+                          <m:t xml:space="preserve">f</m:t>
+                        </m:r>
+                        <m:r>
+                          <m:t xml:space="preserve">+</m:t>
+                        </m:r>
+                        <m:r>
+                          <m:t xml:space="preserve">2</m:t>
+                        </m:r>
+                        <m:r>
+                          <m:t xml:space="preserve">p</m:t>
+                        </m:r>
+                      </m:num>
+                      <m:den>
+                        <m:r>
+                          <m:t xml:space="preserve">s</m:t>
+                        </m:r>
+                      </m:den>
+                    </m:f>
+                    <m:r>
+                      <m:t xml:space="preserve">+</m:t>
+                    </m:r>
+                    <m:r>
+                      <m:t xml:space="preserve">1</m:t>
+                    </m:r>
+                  </m:oMath>
+                </a14:m>
+              </a:p>
+            </p:txBody>
+          </p:sp>
+        </mc:Choice>
+        <mc:Fallback/>
+      </mc:AlternateContent>
       <p:sp>
         <p:nvSpPr>
-          <p:cNvPr id="103" name="PlaceHolder 2"/>
-          <p:cNvSpPr>
-            <a:spLocks noGrp="1"/>
-          </p:cNvSpPr>
-          <p:nvPr>
-            <p:ph/>
-          </p:nvPr>
+          <p:cNvPr id="104" name=""/>
+          <p:cNvSpPr txBox="1"/>
+          <p:nvPr/>
         </p:nvSpPr>
         <p:spPr>
           <a:xfrm>
-            <a:off x="504000" y="1326600"/>
-            <a:ext cx="9071640" cy="3288240"/>
+            <a:off x="1600200" y="4087800"/>
+            <a:ext cx="180720" cy="427320"/>
           </a:xfrm>
           <a:prstGeom prst="rect">
             <a:avLst/>
@@ -8413,69 +8900,143 @@
           </a:ln>
         </p:spPr>
         <p:txBody>
-          <a:bodyPr lIns="0" rIns="0" tIns="0" bIns="0" anchor="t">
-            <a:normAutofit/>
+          <a:bodyPr lIns="90000" rIns="90000" tIns="45000" bIns="45000" anchor="t">
+            <a:noAutofit/>
           </a:bodyPr>
           <a:p>
-            <a:pPr marL="432000" indent="-324000">
-              <a:spcBef>
-                <a:spcPts val="1417"/>
-              </a:spcBef>
-              <a:buClr>
-                <a:srgbClr val="000000"/>
-              </a:buClr>
-              <a:buSzPct val="45000"/>
-              <a:buFont typeface="Wingdings" charset="2"/>
-              <a:buChar char=""/>
-            </a:pPr>
-            <a:r>
-              <a:rPr b="0" lang="en-US" sz="2800" spc="-1" strike="noStrike">
-                <a:solidFill>
-                  <a:srgbClr val="000000"/>
-                </a:solidFill>
-                <a:latin typeface="Arial"/>
-                <a:ea typeface="Noto Sans CJK SC"/>
-              </a:rPr>
-              <a:t>Applying max(0, x) on the previous </a:t>
-            </a:r>
-            <a:r>
-              <a:rPr b="0" lang="en-US" sz="2800" spc="-1" strike="noStrike">
+            <a:endParaRPr b="0" lang="en-US" sz="1800" spc="-1" strike="noStrike">
+              <a:solidFill>
+                <a:srgbClr val="000000"/>
+              </a:solidFill>
+              <a:latin typeface="Arial"/>
+            </a:endParaRPr>
+          </a:p>
+        </p:txBody>
+      </p:sp>
+      <p:sp>
+        <p:nvSpPr>
+          <p:cNvPr id="105" name=""/>
+          <p:cNvSpPr txBox="1"/>
+          <p:nvPr/>
+        </p:nvSpPr>
+        <p:spPr>
+          <a:xfrm>
+            <a:off x="805320" y="3657600"/>
+            <a:ext cx="1252080" cy="1370160"/>
+          </a:xfrm>
+          <a:prstGeom prst="rect">
+            <a:avLst/>
+          </a:prstGeom>
+          <a:noFill/>
+          <a:ln w="0">
+            <a:noFill/>
+          </a:ln>
+        </p:spPr>
+        <p:txBody>
+          <a:bodyPr lIns="90000" rIns="90000" tIns="45000" bIns="45000" anchor="t">
+            <a:noAutofit/>
+          </a:bodyPr>
+          <a:p>
+            <a:r>
+              <a:rPr b="0" i="1" lang="en-US" sz="1800" spc="-1" strike="noStrike">
                 <a:solidFill>
                   <a:srgbClr val="000000"/>
                 </a:solidFill>
                 <a:latin typeface="Arial"/>
               </a:rPr>
-              <a:t>feature map layers</a:t>
-            </a:r>
-            <a:endParaRPr b="0" lang="en-US" sz="2800" spc="-1" strike="noStrike">
-              <a:solidFill>
-                <a:srgbClr val="000000"/>
-              </a:solidFill>
-              <a:latin typeface="Arial"/>
-            </a:endParaRPr>
-          </a:p>
-          <a:p>
-            <a:pPr marL="432000" indent="-324000">
-              <a:spcBef>
-                <a:spcPts val="1417"/>
-              </a:spcBef>
-              <a:buClr>
-                <a:srgbClr val="000000"/>
-              </a:buClr>
-              <a:buSzPct val="45000"/>
-              <a:buFont typeface="Wingdings" charset="2"/>
-              <a:buChar char=""/>
-            </a:pPr>
-            <a:r>
-              <a:rPr b="0" lang="en-US" sz="2800" spc="-1" strike="noStrike">
+              <a:t>n×n</a:t>
+            </a:r>
+            <a:r>
+              <a:rPr b="0" lang="en-US" sz="1800" spc="-1" strike="noStrike">
                 <a:solidFill>
                   <a:srgbClr val="000000"/>
                 </a:solidFill>
                 <a:latin typeface="Arial"/>
               </a:rPr>
-              <a:t>This one does not change size unlike the previous one</a:t>
-            </a:r>
-            <a:endParaRPr b="0" lang="en-US" sz="2800" spc="-1" strike="noStrike">
+              <a:t> image</a:t>
+            </a:r>
+            <a:br>
+              <a:rPr sz="1800"/>
+            </a:br>
+            <a:r>
+              <a:rPr b="0" i="1" lang="en-US" sz="1800" spc="-1" strike="noStrike">
+                <a:solidFill>
+                  <a:srgbClr val="000000"/>
+                </a:solidFill>
+                <a:latin typeface="Arial"/>
+              </a:rPr>
+              <a:t>f×f</a:t>
+            </a:r>
+            <a:r>
+              <a:rPr b="0" lang="en-US" sz="1800" spc="-1" strike="noStrike">
+                <a:solidFill>
+                  <a:srgbClr val="000000"/>
+                </a:solidFill>
+                <a:latin typeface="Arial"/>
+              </a:rPr>
+              <a:t>  filter</a:t>
+            </a:r>
+            <a:endParaRPr b="0" lang="en-US" sz="1800" spc="-1" strike="noStrike">
+              <a:solidFill>
+                <a:srgbClr val="000000"/>
+              </a:solidFill>
+              <a:latin typeface="Arial"/>
+            </a:endParaRPr>
+          </a:p>
+          <a:p>
+            <a:endParaRPr b="0" lang="en-US" sz="1800" spc="-1" strike="noStrike">
+              <a:solidFill>
+                <a:srgbClr val="000000"/>
+              </a:solidFill>
+              <a:latin typeface="Arial"/>
+            </a:endParaRPr>
+          </a:p>
+          <a:p>
+            <a:r>
+              <a:rPr b="0" lang="en-US" sz="1800" spc="-1" strike="noStrike">
+                <a:solidFill>
+                  <a:srgbClr val="000000"/>
+                </a:solidFill>
+                <a:latin typeface="Arial"/>
+              </a:rPr>
+              <a:t>Padding </a:t>
+            </a:r>
+            <a:r>
+              <a:rPr b="0" i="1" lang="en-US" sz="1800" spc="-1" strike="noStrike">
+                <a:solidFill>
+                  <a:srgbClr val="000000"/>
+                </a:solidFill>
+                <a:latin typeface="Arial"/>
+              </a:rPr>
+              <a:t>p</a:t>
+            </a:r>
+            <a:endParaRPr b="0" lang="en-US" sz="1800" spc="-1" strike="noStrike">
+              <a:solidFill>
+                <a:srgbClr val="000000"/>
+              </a:solidFill>
+              <a:latin typeface="Arial"/>
+            </a:endParaRPr>
+          </a:p>
+          <a:p>
+            <a:r>
+              <a:rPr b="0" lang="en-US" sz="1800" spc="-1" strike="noStrike">
+                <a:solidFill>
+                  <a:srgbClr val="000000"/>
+                </a:solidFill>
+                <a:latin typeface="Arial"/>
+              </a:rPr>
+              <a:t>Stride </a:t>
+            </a:r>
+            <a:r>
+              <a:rPr b="0" i="1" lang="en-US" sz="1800" spc="-1" strike="noStrike">
+                <a:solidFill>
+                  <a:srgbClr val="000000"/>
+                </a:solidFill>
+                <a:latin typeface="Arial"/>
+              </a:rPr>
+              <a:t>s</a:t>
+            </a:r>
+            <a:endParaRPr b="0" lang="en-US" sz="1800" spc="-1" strike="noStrike">
               <a:solidFill>
                 <a:srgbClr val="000000"/>
               </a:solidFill>
@@ -8484,9 +9045,39 @@
           </a:p>
         </p:txBody>
       </p:sp>
+    </p:spTree>
+  </p:cSld>
+  <mc:AlternateContent>
+    <mc:Choice Requires="p14">
+      <p:transition spd="slow" p14:dur="2000"/>
+    </mc:Choice>
+    <mc:Fallback>
+      <p:transition spd="slow"/>
+    </mc:Fallback>
+  </mc:AlternateContent>
+</p:sld>
+</file>
+
+<file path=ppt/slides/slide14.xml><?xml version="1.0" encoding="utf-8"?>
+<p:sld xmlns:a="http://schemas.openxmlformats.org/drawingml/2006/main" xmlns:p="http://schemas.openxmlformats.org/presentationml/2006/main" xmlns:r="http://schemas.openxmlformats.org/officeDocument/2006/relationships" xmlns:p14="http://schemas.microsoft.com/office/powerpoint/2010/main" xmlns:p15="http://schemas.microsoft.com/office/powerpoint/2012/main" xmlns:mc="http://schemas.openxmlformats.org/markup-compatibility/2006">
+  <p:cSld>
+    <p:spTree>
+      <p:nvGrpSpPr>
+        <p:cNvPr id="1" name=""/>
+        <p:cNvGrpSpPr/>
+        <p:nvPr/>
+      </p:nvGrpSpPr>
+      <p:grpSpPr>
+        <a:xfrm>
+          <a:off x="0" y="0"/>
+          <a:ext cx="0" cy="0"/>
+          <a:chOff x="0" y="0"/>
+          <a:chExt cx="0" cy="0"/>
+        </a:xfrm>
+      </p:grpSpPr>
       <p:pic>
         <p:nvPicPr>
-          <p:cNvPr id="104" name="" descr=""/>
+          <p:cNvPr id="106" name="" descr=""/>
           <p:cNvPicPr/>
           <p:nvPr/>
         </p:nvPicPr>
@@ -8496,8 +9087,8 @@
         </p:blipFill>
         <p:spPr>
           <a:xfrm>
-            <a:off x="2298240" y="2298600"/>
-            <a:ext cx="5016960" cy="3187800"/>
+            <a:off x="963360" y="-720"/>
+            <a:ext cx="8149680" cy="5669640"/>
           </a:xfrm>
           <a:prstGeom prst="rect">
             <a:avLst/>
@@ -8537,9 +9128,153 @@
           <a:chExt cx="0" cy="0"/>
         </a:xfrm>
       </p:grpSpPr>
+      <p:sp>
+        <p:nvSpPr>
+          <p:cNvPr id="107" name="PlaceHolder 1"/>
+          <p:cNvSpPr>
+            <a:spLocks noGrp="1"/>
+          </p:cNvSpPr>
+          <p:nvPr>
+            <p:ph type="title"/>
+          </p:nvPr>
+        </p:nvSpPr>
+        <p:spPr>
+          <a:xfrm>
+            <a:off x="504000" y="226080"/>
+            <a:ext cx="9071640" cy="946440"/>
+          </a:xfrm>
+          <a:prstGeom prst="rect">
+            <a:avLst/>
+          </a:prstGeom>
+          <a:noFill/>
+          <a:ln w="0">
+            <a:noFill/>
+          </a:ln>
+        </p:spPr>
+        <p:txBody>
+          <a:bodyPr lIns="0" rIns="0" tIns="0" bIns="0" anchor="ctr">
+            <a:noAutofit/>
+          </a:bodyPr>
+          <a:p>
+            <a:pPr indent="0" algn="ctr">
+              <a:buNone/>
+            </a:pPr>
+            <a:r>
+              <a:rPr b="0" lang="en-US" sz="4400" spc="-1" strike="noStrike">
+                <a:solidFill>
+                  <a:srgbClr val="000000"/>
+                </a:solidFill>
+                <a:latin typeface="Arial"/>
+              </a:rPr>
+              <a:t>ReLU layer</a:t>
+            </a:r>
+            <a:endParaRPr b="0" lang="en-US" sz="4400" spc="-1" strike="noStrike">
+              <a:solidFill>
+                <a:srgbClr val="000000"/>
+              </a:solidFill>
+              <a:latin typeface="Arial"/>
+            </a:endParaRPr>
+          </a:p>
+        </p:txBody>
+      </p:sp>
+      <p:sp>
+        <p:nvSpPr>
+          <p:cNvPr id="108" name="PlaceHolder 2"/>
+          <p:cNvSpPr>
+            <a:spLocks noGrp="1"/>
+          </p:cNvSpPr>
+          <p:nvPr>
+            <p:ph/>
+          </p:nvPr>
+        </p:nvSpPr>
+        <p:spPr>
+          <a:xfrm>
+            <a:off x="504000" y="1326600"/>
+            <a:ext cx="9071640" cy="3288240"/>
+          </a:xfrm>
+          <a:prstGeom prst="rect">
+            <a:avLst/>
+          </a:prstGeom>
+          <a:noFill/>
+          <a:ln w="0">
+            <a:noFill/>
+          </a:ln>
+        </p:spPr>
+        <p:txBody>
+          <a:bodyPr lIns="0" rIns="0" tIns="0" bIns="0" anchor="t">
+            <a:normAutofit/>
+          </a:bodyPr>
+          <a:p>
+            <a:pPr marL="432000" indent="-324000">
+              <a:spcBef>
+                <a:spcPts val="1417"/>
+              </a:spcBef>
+              <a:buClr>
+                <a:srgbClr val="000000"/>
+              </a:buClr>
+              <a:buSzPct val="45000"/>
+              <a:buFont typeface="Wingdings" charset="2"/>
+              <a:buChar char=""/>
+            </a:pPr>
+            <a:r>
+              <a:rPr b="0" lang="en-US" sz="2800" spc="-1" strike="noStrike">
+                <a:solidFill>
+                  <a:srgbClr val="000000"/>
+                </a:solidFill>
+                <a:latin typeface="Arial"/>
+                <a:ea typeface="Noto Sans CJK SC"/>
+              </a:rPr>
+              <a:t>Applying max(0, x) on the previous </a:t>
+            </a:r>
+            <a:r>
+              <a:rPr b="0" lang="en-US" sz="2800" spc="-1" strike="noStrike">
+                <a:solidFill>
+                  <a:srgbClr val="000000"/>
+                </a:solidFill>
+                <a:latin typeface="Arial"/>
+              </a:rPr>
+              <a:t>feature map layers</a:t>
+            </a:r>
+            <a:endParaRPr b="0" lang="en-US" sz="2800" spc="-1" strike="noStrike">
+              <a:solidFill>
+                <a:srgbClr val="000000"/>
+              </a:solidFill>
+              <a:latin typeface="Arial"/>
+            </a:endParaRPr>
+          </a:p>
+          <a:p>
+            <a:pPr marL="432000" indent="-324000">
+              <a:spcBef>
+                <a:spcPts val="1417"/>
+              </a:spcBef>
+              <a:buClr>
+                <a:srgbClr val="000000"/>
+              </a:buClr>
+              <a:buSzPct val="45000"/>
+              <a:buFont typeface="Wingdings" charset="2"/>
+              <a:buChar char=""/>
+            </a:pPr>
+            <a:r>
+              <a:rPr b="0" lang="en-US" sz="2800" spc="-1" strike="noStrike">
+                <a:solidFill>
+                  <a:srgbClr val="000000"/>
+                </a:solidFill>
+                <a:latin typeface="Arial"/>
+              </a:rPr>
+              <a:t>This one does not change size unlike the previous one</a:t>
+            </a:r>
+            <a:endParaRPr b="0" lang="en-US" sz="2800" spc="-1" strike="noStrike">
+              <a:solidFill>
+                <a:srgbClr val="000000"/>
+              </a:solidFill>
+              <a:latin typeface="Arial"/>
+            </a:endParaRPr>
+          </a:p>
+        </p:txBody>
+      </p:sp>
       <p:pic>
         <p:nvPicPr>
-          <p:cNvPr id="105" name="" descr=""/>
+          <p:cNvPr id="109" name="" descr=""/>
           <p:cNvPicPr/>
           <p:nvPr/>
         </p:nvPicPr>
@@ -8549,8 +9284,8 @@
         </p:blipFill>
         <p:spPr>
           <a:xfrm>
-            <a:off x="1600200" y="0"/>
-            <a:ext cx="7571880" cy="5669640"/>
+            <a:off x="2298240" y="2298600"/>
+            <a:ext cx="5016960" cy="3187800"/>
           </a:xfrm>
           <a:prstGeom prst="rect">
             <a:avLst/>
@@ -8590,140 +9325,29 @@
           <a:chExt cx="0" cy="0"/>
         </a:xfrm>
       </p:grpSpPr>
-      <p:sp>
-        <p:nvSpPr>
-          <p:cNvPr id="106" name="PlaceHolder 1"/>
-          <p:cNvSpPr>
-            <a:spLocks noGrp="1"/>
-          </p:cNvSpPr>
-          <p:nvPr>
-            <p:ph type="title"/>
-          </p:nvPr>
-        </p:nvSpPr>
+      <p:pic>
+        <p:nvPicPr>
+          <p:cNvPr id="110" name="" descr=""/>
+          <p:cNvPicPr/>
+          <p:nvPr/>
+        </p:nvPicPr>
+        <p:blipFill>
+          <a:blip r:embed="rId1"/>
+          <a:stretch/>
+        </p:blipFill>
         <p:spPr>
           <a:xfrm>
-            <a:off x="504000" y="226080"/>
-            <a:ext cx="9071640" cy="946440"/>
+            <a:off x="1600200" y="0"/>
+            <a:ext cx="7571880" cy="5669640"/>
           </a:xfrm>
           <a:prstGeom prst="rect">
             <a:avLst/>
           </a:prstGeom>
-          <a:noFill/>
           <a:ln w="0">
             <a:noFill/>
           </a:ln>
         </p:spPr>
-        <p:txBody>
-          <a:bodyPr lIns="0" rIns="0" tIns="0" bIns="0" anchor="ctr">
-            <a:noAutofit/>
-          </a:bodyPr>
-          <a:p>
-            <a:pPr indent="0" algn="ctr">
-              <a:buNone/>
-            </a:pPr>
-            <a:r>
-              <a:rPr b="0" lang="en-US" sz="4400" spc="-1" strike="noStrike">
-                <a:solidFill>
-                  <a:srgbClr val="000000"/>
-                </a:solidFill>
-                <a:latin typeface="Arial"/>
-              </a:rPr>
-              <a:t>Pooling layer</a:t>
-            </a:r>
-            <a:endParaRPr b="0" lang="en-US" sz="4400" spc="-1" strike="noStrike">
-              <a:solidFill>
-                <a:srgbClr val="000000"/>
-              </a:solidFill>
-              <a:latin typeface="Arial"/>
-            </a:endParaRPr>
-          </a:p>
-        </p:txBody>
-      </p:sp>
-      <p:sp>
-        <p:nvSpPr>
-          <p:cNvPr id="107" name="PlaceHolder 2"/>
-          <p:cNvSpPr>
-            <a:spLocks noGrp="1"/>
-          </p:cNvSpPr>
-          <p:nvPr>
-            <p:ph/>
-          </p:nvPr>
-        </p:nvSpPr>
-        <p:spPr>
-          <a:xfrm>
-            <a:off x="504000" y="1326600"/>
-            <a:ext cx="9071640" cy="3288240"/>
-          </a:xfrm>
-          <a:prstGeom prst="rect">
-            <a:avLst/>
-          </a:prstGeom>
-          <a:noFill/>
-          <a:ln w="0">
-            <a:noFill/>
-          </a:ln>
-        </p:spPr>
-        <p:txBody>
-          <a:bodyPr lIns="0" rIns="0" tIns="0" bIns="0" anchor="t">
-            <a:normAutofit/>
-          </a:bodyPr>
-          <a:p>
-            <a:pPr marL="432000" indent="-324000">
-              <a:spcBef>
-                <a:spcPts val="1417"/>
-              </a:spcBef>
-              <a:buClr>
-                <a:srgbClr val="000000"/>
-              </a:buClr>
-              <a:buSzPct val="45000"/>
-              <a:buFont typeface="Wingdings" charset="2"/>
-              <a:buChar char=""/>
-            </a:pPr>
-            <a:r>
-              <a:rPr b="0" lang="en-US" sz="3200" spc="-1" strike="noStrike">
-                <a:solidFill>
-                  <a:srgbClr val="000000"/>
-                </a:solidFill>
-                <a:latin typeface="Arial"/>
-              </a:rPr>
-              <a:t>Its purpose is to gradually shrink the representation’s spatial size to reduce the number of parameters and computations in the network.</a:t>
-            </a:r>
-            <a:endParaRPr b="0" lang="en-US" sz="3200" spc="-1" strike="noStrike">
-              <a:solidFill>
-                <a:srgbClr val="000000"/>
-              </a:solidFill>
-              <a:latin typeface="Arial"/>
-            </a:endParaRPr>
-          </a:p>
-          <a:p>
-            <a:pPr marL="432000" indent="-324000">
-              <a:spcBef>
-                <a:spcPts val="1417"/>
-              </a:spcBef>
-              <a:buClr>
-                <a:srgbClr val="000000"/>
-              </a:buClr>
-              <a:buSzPct val="45000"/>
-              <a:buFont typeface="Wingdings" charset="2"/>
-              <a:buChar char=""/>
-            </a:pPr>
-            <a:r>
-              <a:rPr b="0" lang="en-US" sz="3200" spc="-1" strike="noStrike">
-                <a:solidFill>
-                  <a:srgbClr val="000000"/>
-                </a:solidFill>
-                <a:latin typeface="Arial"/>
-              </a:rPr>
-              <a:t>The pooling layer treats each feature map separately.</a:t>
-            </a:r>
-            <a:endParaRPr b="0" lang="en-US" sz="3200" spc="-1" strike="noStrike">
-              <a:solidFill>
-                <a:srgbClr val="000000"/>
-              </a:solidFill>
-              <a:latin typeface="Arial"/>
-            </a:endParaRPr>
-          </a:p>
-        </p:txBody>
-      </p:sp>
+      </p:pic>
     </p:spTree>
   </p:cSld>
   <mc:AlternateContent>
@@ -8754,32 +9378,9 @@
           <a:chExt cx="0" cy="0"/>
         </a:xfrm>
       </p:grpSpPr>
-      <p:pic>
-        <p:nvPicPr>
-          <p:cNvPr id="108" name="" descr=""/>
-          <p:cNvPicPr/>
-          <p:nvPr/>
-        </p:nvPicPr>
-        <p:blipFill>
-          <a:blip r:embed="rId1"/>
-          <a:stretch/>
-        </p:blipFill>
-        <p:spPr>
-          <a:xfrm>
-            <a:off x="3154680" y="691560"/>
-            <a:ext cx="6622560" cy="4890240"/>
-          </a:xfrm>
-          <a:prstGeom prst="rect">
-            <a:avLst/>
-          </a:prstGeom>
-          <a:ln w="0">
-            <a:noFill/>
-          </a:ln>
-        </p:spPr>
-      </p:pic>
       <p:sp>
         <p:nvSpPr>
-          <p:cNvPr id="109" name="PlaceHolder 1"/>
+          <p:cNvPr id="111" name="PlaceHolder 1"/>
           <p:cNvSpPr>
             <a:spLocks noGrp="1"/>
           </p:cNvSpPr>
@@ -8805,6 +9406,193 @@
             <a:noAutofit/>
           </a:bodyPr>
           <a:p>
+            <a:pPr indent="0" algn="ctr">
+              <a:buNone/>
+            </a:pPr>
+            <a:r>
+              <a:rPr b="0" lang="en-US" sz="4400" spc="-1" strike="noStrike">
+                <a:solidFill>
+                  <a:srgbClr val="000000"/>
+                </a:solidFill>
+                <a:latin typeface="Arial"/>
+              </a:rPr>
+              <a:t>Pooling layer</a:t>
+            </a:r>
+            <a:endParaRPr b="0" lang="en-US" sz="4400" spc="-1" strike="noStrike">
+              <a:solidFill>
+                <a:srgbClr val="000000"/>
+              </a:solidFill>
+              <a:latin typeface="Arial"/>
+            </a:endParaRPr>
+          </a:p>
+        </p:txBody>
+      </p:sp>
+      <p:sp>
+        <p:nvSpPr>
+          <p:cNvPr id="112" name="PlaceHolder 2"/>
+          <p:cNvSpPr>
+            <a:spLocks noGrp="1"/>
+          </p:cNvSpPr>
+          <p:nvPr>
+            <p:ph/>
+          </p:nvPr>
+        </p:nvSpPr>
+        <p:spPr>
+          <a:xfrm>
+            <a:off x="504000" y="1326600"/>
+            <a:ext cx="9071640" cy="3288240"/>
+          </a:xfrm>
+          <a:prstGeom prst="rect">
+            <a:avLst/>
+          </a:prstGeom>
+          <a:noFill/>
+          <a:ln w="0">
+            <a:noFill/>
+          </a:ln>
+        </p:spPr>
+        <p:txBody>
+          <a:bodyPr lIns="0" rIns="0" tIns="0" bIns="0" anchor="t">
+            <a:normAutofit/>
+          </a:bodyPr>
+          <a:p>
+            <a:pPr marL="432000" indent="-324000">
+              <a:spcBef>
+                <a:spcPts val="1417"/>
+              </a:spcBef>
+              <a:buClr>
+                <a:srgbClr val="000000"/>
+              </a:buClr>
+              <a:buSzPct val="45000"/>
+              <a:buFont typeface="Wingdings" charset="2"/>
+              <a:buChar char=""/>
+            </a:pPr>
+            <a:r>
+              <a:rPr b="0" lang="en-US" sz="3200" spc="-1" strike="noStrike">
+                <a:solidFill>
+                  <a:srgbClr val="000000"/>
+                </a:solidFill>
+                <a:latin typeface="Arial"/>
+              </a:rPr>
+              <a:t>Its purpose is to gradually shrink the representation’s spatial size to reduce the number of parameters and computations in the network.</a:t>
+            </a:r>
+            <a:endParaRPr b="0" lang="en-US" sz="3200" spc="-1" strike="noStrike">
+              <a:solidFill>
+                <a:srgbClr val="000000"/>
+              </a:solidFill>
+              <a:latin typeface="Arial"/>
+            </a:endParaRPr>
+          </a:p>
+          <a:p>
+            <a:pPr marL="432000" indent="-324000">
+              <a:spcBef>
+                <a:spcPts val="1417"/>
+              </a:spcBef>
+              <a:buClr>
+                <a:srgbClr val="000000"/>
+              </a:buClr>
+              <a:buSzPct val="45000"/>
+              <a:buFont typeface="Wingdings" charset="2"/>
+              <a:buChar char=""/>
+            </a:pPr>
+            <a:r>
+              <a:rPr b="0" lang="en-US" sz="3200" spc="-1" strike="noStrike">
+                <a:solidFill>
+                  <a:srgbClr val="000000"/>
+                </a:solidFill>
+                <a:latin typeface="Arial"/>
+              </a:rPr>
+              <a:t>The pooling layer treats each feature map separately.</a:t>
+            </a:r>
+            <a:endParaRPr b="0" lang="en-US" sz="3200" spc="-1" strike="noStrike">
+              <a:solidFill>
+                <a:srgbClr val="000000"/>
+              </a:solidFill>
+              <a:latin typeface="Arial"/>
+            </a:endParaRPr>
+          </a:p>
+        </p:txBody>
+      </p:sp>
+    </p:spTree>
+  </p:cSld>
+  <mc:AlternateContent>
+    <mc:Choice Requires="p14">
+      <p:transition spd="slow" p14:dur="2000"/>
+    </mc:Choice>
+    <mc:Fallback>
+      <p:transition spd="slow"/>
+    </mc:Fallback>
+  </mc:AlternateContent>
+</p:sld>
+</file>
+
+<file path=ppt/slides/slide18.xml><?xml version="1.0" encoding="utf-8"?>
+<p:sld xmlns:a="http://schemas.openxmlformats.org/drawingml/2006/main" xmlns:p="http://schemas.openxmlformats.org/presentationml/2006/main" xmlns:r="http://schemas.openxmlformats.org/officeDocument/2006/relationships" xmlns:p14="http://schemas.microsoft.com/office/powerpoint/2010/main" xmlns:p15="http://schemas.microsoft.com/office/powerpoint/2012/main" xmlns:mc="http://schemas.openxmlformats.org/markup-compatibility/2006">
+  <p:cSld>
+    <p:spTree>
+      <p:nvGrpSpPr>
+        <p:cNvPr id="1" name=""/>
+        <p:cNvGrpSpPr/>
+        <p:nvPr/>
+      </p:nvGrpSpPr>
+      <p:grpSpPr>
+        <a:xfrm>
+          <a:off x="0" y="0"/>
+          <a:ext cx="0" cy="0"/>
+          <a:chOff x="0" y="0"/>
+          <a:chExt cx="0" cy="0"/>
+        </a:xfrm>
+      </p:grpSpPr>
+      <p:pic>
+        <p:nvPicPr>
+          <p:cNvPr id="113" name="" descr=""/>
+          <p:cNvPicPr/>
+          <p:nvPr/>
+        </p:nvPicPr>
+        <p:blipFill>
+          <a:blip r:embed="rId1"/>
+          <a:stretch/>
+        </p:blipFill>
+        <p:spPr>
+          <a:xfrm>
+            <a:off x="3154680" y="691560"/>
+            <a:ext cx="6622560" cy="4890240"/>
+          </a:xfrm>
+          <a:prstGeom prst="rect">
+            <a:avLst/>
+          </a:prstGeom>
+          <a:ln w="0">
+            <a:noFill/>
+          </a:ln>
+        </p:spPr>
+      </p:pic>
+      <p:sp>
+        <p:nvSpPr>
+          <p:cNvPr id="114" name="PlaceHolder 1"/>
+          <p:cNvSpPr>
+            <a:spLocks noGrp="1"/>
+          </p:cNvSpPr>
+          <p:nvPr>
+            <p:ph type="title"/>
+          </p:nvPr>
+        </p:nvSpPr>
+        <p:spPr>
+          <a:xfrm>
+            <a:off x="504000" y="226080"/>
+            <a:ext cx="9071640" cy="946440"/>
+          </a:xfrm>
+          <a:prstGeom prst="rect">
+            <a:avLst/>
+          </a:prstGeom>
+          <a:noFill/>
+          <a:ln w="0">
+            <a:noFill/>
+          </a:ln>
+        </p:spPr>
+        <p:txBody>
+          <a:bodyPr lIns="0" rIns="0" tIns="0" bIns="0" anchor="ctr">
+            <a:noAutofit/>
+          </a:bodyPr>
+          <a:p>
             <a:pPr marL="216000" indent="0">
               <a:buNone/>
             </a:pPr>
@@ -8838,7 +9626,7 @@
       </p:sp>
       <p:sp>
         <p:nvSpPr>
-          <p:cNvPr id="110" name=""/>
+          <p:cNvPr id="115" name=""/>
           <p:cNvSpPr txBox="1"/>
           <p:nvPr/>
         </p:nvSpPr>
@@ -8880,7 +9668,7 @@
       </p:sp>
       <p:sp>
         <p:nvSpPr>
-          <p:cNvPr id="111" name=""/>
+          <p:cNvPr id="116" name=""/>
           <p:cNvSpPr txBox="1"/>
           <p:nvPr/>
         </p:nvSpPr>
@@ -8981,7 +9769,7 @@
                                           </p:stCondLst>
                                         </p:cTn>
                                         <p:tgtEl>
-                                          <p:spTgt spid="108"/>
+                                          <p:spTgt spid="113"/>
                                         </p:tgtEl>
                                         <p:attrNameLst>
                                           <p:attrName>style.visibility</p:attrName>
@@ -8995,7 +9783,7 @@
                                       <p:cBhvr additive="repl">
                                         <p:cTn id="21" dur="500"/>
                                         <p:tgtEl>
-                                          <p:spTgt spid="108"/>
+                                          <p:spTgt spid="113"/>
                                         </p:tgtEl>
                                       </p:cBhvr>
                                     </p:animEffect>
@@ -9016,7 +9804,7 @@
                                           </p:stCondLst>
                                         </p:cTn>
                                         <p:tgtEl>
-                                          <p:spTgt spid="110">
+                                          <p:spTgt spid="115">
                                             <p:txEl>
                                               <p:pRg st="0" end="0"/>
                                             </p:txEl>
@@ -9034,7 +9822,7 @@
                                       <p:cBhvr additive="repl">
                                         <p:cTn id="24" dur="500"/>
                                         <p:tgtEl>
-                                          <p:spTgt spid="110">
+                                          <p:spTgt spid="115">
                                             <p:txEl>
                                               <p:pRg st="0" end="0"/>
                                             </p:txEl>
@@ -9076,7 +9864,7 @@
 </p:sld>
 </file>
 
-<file path=ppt/slides/slide18.xml><?xml version="1.0" encoding="utf-8"?>
+<file path=ppt/slides/slide19.xml><?xml version="1.0" encoding="utf-8"?>
 <p:sld xmlns:a="http://schemas.openxmlformats.org/drawingml/2006/main" xmlns:p="http://schemas.openxmlformats.org/presentationml/2006/main" xmlns:r="http://schemas.openxmlformats.org/officeDocument/2006/relationships" xmlns:p14="http://schemas.microsoft.com/office/powerpoint/2010/main" xmlns:p15="http://schemas.microsoft.com/office/powerpoint/2012/main" xmlns:mc="http://schemas.openxmlformats.org/markup-compatibility/2006">
   <p:cSld>
     <p:spTree>
@@ -9095,7 +9883,7 @@
       </p:grpSpPr>
       <p:pic>
         <p:nvPicPr>
-          <p:cNvPr id="112" name="" descr=""/>
+          <p:cNvPr id="117" name="" descr=""/>
           <p:cNvPicPr/>
           <p:nvPr/>
         </p:nvPicPr>
@@ -9118,7 +9906,7 @@
       </p:pic>
       <p:sp>
         <p:nvSpPr>
-          <p:cNvPr id="113" name="PlaceHolder 1"/>
+          <p:cNvPr id="118" name="PlaceHolder 1"/>
           <p:cNvSpPr>
             <a:spLocks noGrp="1"/>
           </p:cNvSpPr>
@@ -9167,7 +9955,7 @@
       </p:sp>
       <p:sp>
         <p:nvSpPr>
-          <p:cNvPr id="114" name="PlaceHolder 2"/>
+          <p:cNvPr id="119" name="PlaceHolder 2"/>
           <p:cNvSpPr>
             <a:spLocks noGrp="1"/>
           </p:cNvSpPr>
@@ -9233,7 +10021,7 @@
       </p:sp>
       <p:sp>
         <p:nvSpPr>
-          <p:cNvPr id="115" name=""/>
+          <p:cNvPr id="120" name=""/>
           <p:cNvSpPr txBox="1"/>
           <p:nvPr/>
         </p:nvSpPr>
@@ -9265,165 +10053,6 @@
               <a:t>image source: superdatascience.com</a:t>
             </a:r>
             <a:endParaRPr b="0" lang="en-US" sz="1200" spc="-1" strike="noStrike">
-              <a:solidFill>
-                <a:srgbClr val="000000"/>
-              </a:solidFill>
-              <a:latin typeface="Arial"/>
-            </a:endParaRPr>
-          </a:p>
-        </p:txBody>
-      </p:sp>
-    </p:spTree>
-  </p:cSld>
-  <mc:AlternateContent>
-    <mc:Choice Requires="p14">
-      <p:transition spd="slow" p14:dur="2000"/>
-    </mc:Choice>
-    <mc:Fallback>
-      <p:transition spd="slow"/>
-    </mc:Fallback>
-  </mc:AlternateContent>
-</p:sld>
-</file>
-
-<file path=ppt/slides/slide19.xml><?xml version="1.0" encoding="utf-8"?>
-<p:sld xmlns:a="http://schemas.openxmlformats.org/drawingml/2006/main" xmlns:p="http://schemas.openxmlformats.org/presentationml/2006/main" xmlns:r="http://schemas.openxmlformats.org/officeDocument/2006/relationships" xmlns:p14="http://schemas.microsoft.com/office/powerpoint/2010/main" xmlns:p15="http://schemas.microsoft.com/office/powerpoint/2012/main" xmlns:mc="http://schemas.openxmlformats.org/markup-compatibility/2006">
-  <p:cSld>
-    <p:spTree>
-      <p:nvGrpSpPr>
-        <p:cNvPr id="1" name=""/>
-        <p:cNvGrpSpPr/>
-        <p:nvPr/>
-      </p:nvGrpSpPr>
-      <p:grpSpPr>
-        <a:xfrm>
-          <a:off x="0" y="0"/>
-          <a:ext cx="0" cy="0"/>
-          <a:chOff x="0" y="0"/>
-          <a:chExt cx="0" cy="0"/>
-        </a:xfrm>
-      </p:grpSpPr>
-      <p:pic>
-        <p:nvPicPr>
-          <p:cNvPr id="116" name="" descr=""/>
-          <p:cNvPicPr/>
-          <p:nvPr/>
-        </p:nvPicPr>
-        <p:blipFill>
-          <a:blip r:embed="rId1"/>
-          <a:stretch/>
-        </p:blipFill>
-        <p:spPr>
-          <a:xfrm>
-            <a:off x="1528200" y="1247760"/>
-            <a:ext cx="7509960" cy="4422240"/>
-          </a:xfrm>
-          <a:prstGeom prst="rect">
-            <a:avLst/>
-          </a:prstGeom>
-          <a:ln w="0">
-            <a:noFill/>
-          </a:ln>
-        </p:spPr>
-      </p:pic>
-      <p:sp>
-        <p:nvSpPr>
-          <p:cNvPr id="117" name="PlaceHolder 1"/>
-          <p:cNvSpPr>
-            <a:spLocks noGrp="1"/>
-          </p:cNvSpPr>
-          <p:nvPr>
-            <p:ph type="title"/>
-          </p:nvPr>
-        </p:nvSpPr>
-        <p:spPr>
-          <a:xfrm>
-            <a:off x="504000" y="226080"/>
-            <a:ext cx="9071640" cy="946440"/>
-          </a:xfrm>
-          <a:prstGeom prst="rect">
-            <a:avLst/>
-          </a:prstGeom>
-          <a:noFill/>
-          <a:ln w="0">
-            <a:noFill/>
-          </a:ln>
-        </p:spPr>
-        <p:txBody>
-          <a:bodyPr lIns="0" rIns="0" tIns="0" bIns="0" anchor="ctr">
-            <a:noAutofit/>
-          </a:bodyPr>
-          <a:p>
-            <a:pPr indent="0" algn="ctr">
-              <a:buNone/>
-            </a:pPr>
-            <a:r>
-              <a:rPr b="0" lang="en-US" sz="4400" spc="-1" strike="noStrike">
-                <a:solidFill>
-                  <a:srgbClr val="000000"/>
-                </a:solidFill>
-                <a:latin typeface="Arial"/>
-              </a:rPr>
-              <a:t>Fully Connected layer</a:t>
-            </a:r>
-            <a:endParaRPr b="0" lang="en-US" sz="4400" spc="-1" strike="noStrike">
-              <a:solidFill>
-                <a:srgbClr val="000000"/>
-              </a:solidFill>
-              <a:latin typeface="Arial"/>
-            </a:endParaRPr>
-          </a:p>
-        </p:txBody>
-      </p:sp>
-      <p:sp>
-        <p:nvSpPr>
-          <p:cNvPr id="118" name="PlaceHolder 2"/>
-          <p:cNvSpPr>
-            <a:spLocks noGrp="1"/>
-          </p:cNvSpPr>
-          <p:nvPr>
-            <p:ph/>
-          </p:nvPr>
-        </p:nvSpPr>
-        <p:spPr>
-          <a:xfrm>
-            <a:off x="504000" y="1326600"/>
-            <a:ext cx="9071640" cy="3288240"/>
-          </a:xfrm>
-          <a:prstGeom prst="rect">
-            <a:avLst/>
-          </a:prstGeom>
-          <a:noFill/>
-          <a:ln w="0">
-            <a:noFill/>
-          </a:ln>
-        </p:spPr>
-        <p:txBody>
-          <a:bodyPr lIns="0" rIns="0" tIns="0" bIns="0" anchor="t">
-            <a:normAutofit/>
-          </a:bodyPr>
-          <a:p>
-            <a:pPr marL="432000" indent="-324000">
-              <a:spcBef>
-                <a:spcPts val="1417"/>
-              </a:spcBef>
-              <a:buClr>
-                <a:srgbClr val="000000"/>
-              </a:buClr>
-              <a:buSzPct val="45000"/>
-              <a:buFont typeface="Wingdings" charset="2"/>
-              <a:buChar char=""/>
-            </a:pPr>
-            <a:r>
-              <a:rPr b="0" lang="en-US" sz="2200" spc="-1" strike="noStrike">
-                <a:solidFill>
-                  <a:srgbClr val="000000"/>
-                </a:solidFill>
-                <a:latin typeface="Arial"/>
-              </a:rPr>
-              <a:t>Is a fully connected neural networks – the classic neural network architecture, in which all neurons connect to all neurons in the next layer.</a:t>
-            </a:r>
-            <a:endParaRPr b="0" lang="en-US" sz="2200" spc="-1" strike="noStrike">
               <a:solidFill>
                 <a:srgbClr val="000000"/>
               </a:solidFill>
@@ -9626,9 +10255,32 @@
           <a:chExt cx="0" cy="0"/>
         </a:xfrm>
       </p:grpSpPr>
+      <p:pic>
+        <p:nvPicPr>
+          <p:cNvPr id="121" name="" descr=""/>
+          <p:cNvPicPr/>
+          <p:nvPr/>
+        </p:nvPicPr>
+        <p:blipFill>
+          <a:blip r:embed="rId1"/>
+          <a:stretch/>
+        </p:blipFill>
+        <p:spPr>
+          <a:xfrm>
+            <a:off x="1528200" y="1247760"/>
+            <a:ext cx="7509960" cy="4422240"/>
+          </a:xfrm>
+          <a:prstGeom prst="rect">
+            <a:avLst/>
+          </a:prstGeom>
+          <a:ln w="0">
+            <a:noFill/>
+          </a:ln>
+        </p:spPr>
+      </p:pic>
       <p:sp>
         <p:nvSpPr>
-          <p:cNvPr id="119" name="PlaceHolder 1"/>
+          <p:cNvPr id="122" name="PlaceHolder 1"/>
           <p:cNvSpPr>
             <a:spLocks noGrp="1"/>
           </p:cNvSpPr>
@@ -9664,7 +10316,7 @@
                 </a:solidFill>
                 <a:latin typeface="Arial"/>
               </a:rPr>
-              <a:t>Resources</a:t>
+              <a:t>Fully Connected layer</a:t>
             </a:r>
             <a:endParaRPr b="0" lang="en-US" sz="4400" spc="-1" strike="noStrike">
               <a:solidFill>
@@ -9677,7 +10329,7 @@
       </p:sp>
       <p:sp>
         <p:nvSpPr>
-          <p:cNvPr id="120" name="PlaceHolder 2"/>
+          <p:cNvPr id="123" name="PlaceHolder 2"/>
           <p:cNvSpPr>
             <a:spLocks noGrp="1"/>
           </p:cNvSpPr>
@@ -9700,10 +10352,333 @@
         </p:spPr>
         <p:txBody>
           <a:bodyPr lIns="0" rIns="0" tIns="0" bIns="0" anchor="t">
-            <a:normAutofit fontScale="61000"/>
+            <a:normAutofit/>
           </a:bodyPr>
           <a:p>
-            <a:pPr marL="263520" indent="-197640">
+            <a:pPr marL="432000" indent="-324000">
+              <a:spcBef>
+                <a:spcPts val="1417"/>
+              </a:spcBef>
+              <a:buClr>
+                <a:srgbClr val="000000"/>
+              </a:buClr>
+              <a:buSzPct val="45000"/>
+              <a:buFont typeface="Wingdings" charset="2"/>
+              <a:buChar char=""/>
+            </a:pPr>
+            <a:r>
+              <a:rPr b="0" lang="en-US" sz="2200" spc="-1" strike="noStrike">
+                <a:solidFill>
+                  <a:srgbClr val="000000"/>
+                </a:solidFill>
+                <a:latin typeface="Arial"/>
+              </a:rPr>
+              <a:t>Is a fully connected neural networks – the classic neural network architecture, in which all neurons connect to all neurons in the next layer.</a:t>
+            </a:r>
+            <a:endParaRPr b="0" lang="en-US" sz="2200" spc="-1" strike="noStrike">
+              <a:solidFill>
+                <a:srgbClr val="000000"/>
+              </a:solidFill>
+              <a:latin typeface="Arial"/>
+            </a:endParaRPr>
+          </a:p>
+        </p:txBody>
+      </p:sp>
+    </p:spTree>
+  </p:cSld>
+  <mc:AlternateContent>
+    <mc:Choice Requires="p14">
+      <p:transition spd="slow" p14:dur="2000"/>
+    </mc:Choice>
+    <mc:Fallback>
+      <p:transition spd="slow"/>
+    </mc:Fallback>
+  </mc:AlternateContent>
+</p:sld>
+</file>
+
+<file path=ppt/slides/slide21.xml><?xml version="1.0" encoding="utf-8"?>
+<p:sld xmlns:a="http://schemas.openxmlformats.org/drawingml/2006/main" xmlns:p="http://schemas.openxmlformats.org/presentationml/2006/main" xmlns:r="http://schemas.openxmlformats.org/officeDocument/2006/relationships" xmlns:p14="http://schemas.microsoft.com/office/powerpoint/2010/main" xmlns:p15="http://schemas.microsoft.com/office/powerpoint/2012/main" xmlns:mc="http://schemas.openxmlformats.org/markup-compatibility/2006">
+  <p:cSld>
+    <p:spTree>
+      <p:nvGrpSpPr>
+        <p:cNvPr id="1" name=""/>
+        <p:cNvGrpSpPr/>
+        <p:nvPr/>
+      </p:nvGrpSpPr>
+      <p:grpSpPr>
+        <a:xfrm>
+          <a:off x="0" y="0"/>
+          <a:ext cx="0" cy="0"/>
+          <a:chOff x="0" y="0"/>
+          <a:chExt cx="0" cy="0"/>
+        </a:xfrm>
+      </p:grpSpPr>
+      <p:sp>
+        <p:nvSpPr>
+          <p:cNvPr id="124" name="PlaceHolder 1"/>
+          <p:cNvSpPr>
+            <a:spLocks noGrp="1"/>
+          </p:cNvSpPr>
+          <p:nvPr>
+            <p:ph type="title"/>
+          </p:nvPr>
+        </p:nvSpPr>
+        <p:spPr>
+          <a:xfrm>
+            <a:off x="504000" y="226080"/>
+            <a:ext cx="9071640" cy="946440"/>
+          </a:xfrm>
+          <a:prstGeom prst="rect">
+            <a:avLst/>
+          </a:prstGeom>
+          <a:noFill/>
+          <a:ln w="0">
+            <a:noFill/>
+          </a:ln>
+        </p:spPr>
+        <p:txBody>
+          <a:bodyPr lIns="0" rIns="0" tIns="0" bIns="0" anchor="ctr">
+            <a:noAutofit/>
+          </a:bodyPr>
+          <a:p>
+            <a:pPr indent="0" algn="ctr">
+              <a:buNone/>
+            </a:pPr>
+            <a:r>
+              <a:rPr b="0" lang="en-US" sz="4400" spc="-1" strike="noStrike">
+                <a:solidFill>
+                  <a:srgbClr val="000000"/>
+                </a:solidFill>
+                <a:latin typeface="Arial"/>
+              </a:rPr>
+              <a:t>MNIST Example</a:t>
+            </a:r>
+            <a:endParaRPr b="0" lang="en-US" sz="4400" spc="-1" strike="noStrike">
+              <a:solidFill>
+                <a:srgbClr val="000000"/>
+              </a:solidFill>
+              <a:latin typeface="Arial"/>
+            </a:endParaRPr>
+          </a:p>
+        </p:txBody>
+      </p:sp>
+      <p:sp>
+        <p:nvSpPr>
+          <p:cNvPr id="125" name="PlaceHolder 2"/>
+          <p:cNvSpPr>
+            <a:spLocks noGrp="1"/>
+          </p:cNvSpPr>
+          <p:nvPr>
+            <p:ph/>
+          </p:nvPr>
+        </p:nvSpPr>
+        <p:spPr>
+          <a:xfrm>
+            <a:off x="275400" y="1371600"/>
+            <a:ext cx="4068000" cy="3288240"/>
+          </a:xfrm>
+          <a:prstGeom prst="rect">
+            <a:avLst/>
+          </a:prstGeom>
+          <a:noFill/>
+          <a:ln w="0">
+            <a:noFill/>
+          </a:ln>
+        </p:spPr>
+        <p:txBody>
+          <a:bodyPr lIns="0" rIns="0" tIns="0" bIns="0" anchor="t">
+            <a:normAutofit/>
+          </a:bodyPr>
+          <a:p>
+            <a:pPr marL="432000" indent="-324000">
+              <a:spcBef>
+                <a:spcPts val="1417"/>
+              </a:spcBef>
+              <a:buClr>
+                <a:srgbClr val="000000"/>
+              </a:buClr>
+              <a:buSzPct val="45000"/>
+              <a:buFont typeface="Wingdings" charset="2"/>
+              <a:buChar char=""/>
+            </a:pPr>
+            <a:r>
+              <a:rPr b="0" lang="en-US" sz="1800" spc="-1" strike="noStrike">
+                <a:solidFill>
+                  <a:srgbClr val="000000"/>
+                </a:solidFill>
+                <a:latin typeface="Arial"/>
+              </a:rPr>
+              <a:t>MNIST is a subset of a larger set available from NIST (it's copied from http://yann.lecun.com/exdb/mnist/)</a:t>
+            </a:r>
+            <a:endParaRPr b="0" lang="en-US" sz="1800" spc="-1" strike="noStrike">
+              <a:solidFill>
+                <a:srgbClr val="000000"/>
+              </a:solidFill>
+              <a:latin typeface="Arial"/>
+            </a:endParaRPr>
+          </a:p>
+          <a:p>
+            <a:pPr marL="432000" indent="-324000">
+              <a:spcBef>
+                <a:spcPts val="1417"/>
+              </a:spcBef>
+              <a:buClr>
+                <a:srgbClr val="000000"/>
+              </a:buClr>
+              <a:buSzPct val="45000"/>
+              <a:buFont typeface="Wingdings" charset="2"/>
+              <a:buChar char=""/>
+            </a:pPr>
+            <a:r>
+              <a:rPr b="0" lang="en-US" sz="1800" spc="-1" strike="noStrike">
+                <a:solidFill>
+                  <a:srgbClr val="000000"/>
+                </a:solidFill>
+                <a:latin typeface="Arial"/>
+              </a:rPr>
+              <a:t>The MNIST database of handwritten digits has a training set of 60,000 examples, and a test set of 10,000 examples.</a:t>
+            </a:r>
+            <a:endParaRPr b="0" lang="en-US" sz="1800" spc="-1" strike="noStrike">
+              <a:solidFill>
+                <a:srgbClr val="000000"/>
+              </a:solidFill>
+              <a:latin typeface="Arial"/>
+            </a:endParaRPr>
+          </a:p>
+        </p:txBody>
+      </p:sp>
+      <p:pic>
+        <p:nvPicPr>
+          <p:cNvPr id="126" name="" descr=""/>
+          <p:cNvPicPr/>
+          <p:nvPr/>
+        </p:nvPicPr>
+        <p:blipFill>
+          <a:blip r:embed="rId1"/>
+          <a:stretch/>
+        </p:blipFill>
+        <p:spPr>
+          <a:xfrm>
+            <a:off x="4852440" y="1454400"/>
+            <a:ext cx="4917960" cy="2889000"/>
+          </a:xfrm>
+          <a:prstGeom prst="rect">
+            <a:avLst/>
+          </a:prstGeom>
+          <a:ln w="0">
+            <a:noFill/>
+          </a:ln>
+        </p:spPr>
+      </p:pic>
+    </p:spTree>
+  </p:cSld>
+  <mc:AlternateContent>
+    <mc:Choice Requires="p14">
+      <p:transition spd="slow" p14:dur="2000"/>
+    </mc:Choice>
+    <mc:Fallback>
+      <p:transition spd="slow"/>
+    </mc:Fallback>
+  </mc:AlternateContent>
+</p:sld>
+</file>
+
+<file path=ppt/slides/slide22.xml><?xml version="1.0" encoding="utf-8"?>
+<p:sld xmlns:a="http://schemas.openxmlformats.org/drawingml/2006/main" xmlns:p="http://schemas.openxmlformats.org/presentationml/2006/main" xmlns:r="http://schemas.openxmlformats.org/officeDocument/2006/relationships" xmlns:p14="http://schemas.microsoft.com/office/powerpoint/2010/main" xmlns:p15="http://schemas.microsoft.com/office/powerpoint/2012/main" xmlns:mc="http://schemas.openxmlformats.org/markup-compatibility/2006">
+  <p:cSld>
+    <p:spTree>
+      <p:nvGrpSpPr>
+        <p:cNvPr id="1" name=""/>
+        <p:cNvGrpSpPr/>
+        <p:nvPr/>
+      </p:nvGrpSpPr>
+      <p:grpSpPr>
+        <a:xfrm>
+          <a:off x="0" y="0"/>
+          <a:ext cx="0" cy="0"/>
+          <a:chOff x="0" y="0"/>
+          <a:chExt cx="0" cy="0"/>
+        </a:xfrm>
+      </p:grpSpPr>
+      <p:sp>
+        <p:nvSpPr>
+          <p:cNvPr id="127" name="PlaceHolder 1"/>
+          <p:cNvSpPr>
+            <a:spLocks noGrp="1"/>
+          </p:cNvSpPr>
+          <p:nvPr>
+            <p:ph type="title"/>
+          </p:nvPr>
+        </p:nvSpPr>
+        <p:spPr>
+          <a:xfrm>
+            <a:off x="504000" y="226080"/>
+            <a:ext cx="9071640" cy="946440"/>
+          </a:xfrm>
+          <a:prstGeom prst="rect">
+            <a:avLst/>
+          </a:prstGeom>
+          <a:noFill/>
+          <a:ln w="0">
+            <a:noFill/>
+          </a:ln>
+        </p:spPr>
+        <p:txBody>
+          <a:bodyPr lIns="0" rIns="0" tIns="0" bIns="0" anchor="ctr">
+            <a:noAutofit/>
+          </a:bodyPr>
+          <a:p>
+            <a:pPr indent="0" algn="ctr">
+              <a:buNone/>
+            </a:pPr>
+            <a:r>
+              <a:rPr b="0" lang="en-US" sz="4400" spc="-1" strike="noStrike">
+                <a:solidFill>
+                  <a:srgbClr val="000000"/>
+                </a:solidFill>
+                <a:latin typeface="Arial"/>
+              </a:rPr>
+              <a:t>Resources</a:t>
+            </a:r>
+            <a:endParaRPr b="0" lang="en-US" sz="4400" spc="-1" strike="noStrike">
+              <a:solidFill>
+                <a:srgbClr val="000000"/>
+              </a:solidFill>
+              <a:latin typeface="Arial"/>
+            </a:endParaRPr>
+          </a:p>
+        </p:txBody>
+      </p:sp>
+      <p:sp>
+        <p:nvSpPr>
+          <p:cNvPr id="128" name="PlaceHolder 2"/>
+          <p:cNvSpPr>
+            <a:spLocks noGrp="1"/>
+          </p:cNvSpPr>
+          <p:nvPr>
+            <p:ph/>
+          </p:nvPr>
+        </p:nvSpPr>
+        <p:spPr>
+          <a:xfrm>
+            <a:off x="504000" y="1326600"/>
+            <a:ext cx="9071640" cy="3288240"/>
+          </a:xfrm>
+          <a:prstGeom prst="rect">
+            <a:avLst/>
+          </a:prstGeom>
+          <a:noFill/>
+          <a:ln w="0">
+            <a:noFill/>
+          </a:ln>
+        </p:spPr>
+        <p:txBody>
+          <a:bodyPr lIns="0" rIns="0" tIns="0" bIns="0" anchor="t">
+            <a:normAutofit fontScale="54000"/>
+          </a:bodyPr>
+          <a:p>
+            <a:pPr marL="233280" indent="-174960">
               <a:spcBef>
                 <a:spcPts val="1417"/>
               </a:spcBef>
@@ -9732,7 +10707,7 @@
             </a:endParaRPr>
           </a:p>
           <a:p>
-            <a:pPr marL="263520" indent="-197640">
+            <a:pPr marL="233280" indent="-174960">
               <a:spcBef>
                 <a:spcPts val="1417"/>
               </a:spcBef>
@@ -9761,7 +10736,7 @@
             </a:endParaRPr>
           </a:p>
           <a:p>
-            <a:pPr marL="263520" indent="-197640">
+            <a:pPr marL="233280" indent="-174960">
               <a:spcBef>
                 <a:spcPts val="1417"/>
               </a:spcBef>
@@ -9790,7 +10765,7 @@
             </a:endParaRPr>
           </a:p>
           <a:p>
-            <a:pPr marL="263520" indent="-197640">
+            <a:pPr marL="233280" indent="-174960">
               <a:spcBef>
                 <a:spcPts val="1417"/>
               </a:spcBef>
@@ -9819,7 +10794,7 @@
             </a:endParaRPr>
           </a:p>
           <a:p>
-            <a:pPr marL="263520" indent="-197640">
+            <a:pPr marL="233280" indent="-174960">
               <a:spcBef>
                 <a:spcPts val="1417"/>
               </a:spcBef>
@@ -9848,7 +10823,7 @@
             </a:endParaRPr>
           </a:p>
           <a:p>
-            <a:pPr marL="263520" indent="-197640">
+            <a:pPr marL="233280" indent="-174960">
               <a:spcBef>
                 <a:spcPts val="1417"/>
               </a:spcBef>
@@ -9877,7 +10852,7 @@
             </a:endParaRPr>
           </a:p>
           <a:p>
-            <a:pPr marL="263520" indent="-197640">
+            <a:pPr marL="233280" indent="-174960">
               <a:spcBef>
                 <a:spcPts val="1417"/>
               </a:spcBef>
@@ -9906,7 +10881,7 @@
             </a:endParaRPr>
           </a:p>
           <a:p>
-            <a:pPr marL="263520" indent="-197640">
+            <a:pPr marL="233280" indent="-174960">
               <a:spcBef>
                 <a:spcPts val="1417"/>
               </a:spcBef>
@@ -9935,7 +10910,7 @@
             </a:endParaRPr>
           </a:p>
           <a:p>
-            <a:pPr marL="263520" indent="-197640">
+            <a:pPr marL="233280" indent="-174960">
               <a:spcBef>
                 <a:spcPts val="1417"/>
               </a:spcBef>
@@ -9964,11 +10939,16 @@
             </a:endParaRPr>
           </a:p>
           <a:p>
-            <a:pPr marL="263520" indent="0">
+            <a:pPr marL="233280" indent="-174960">
               <a:spcBef>
                 <a:spcPts val="1417"/>
               </a:spcBef>
-              <a:buNone/>
+              <a:buClr>
+                <a:srgbClr val="000000"/>
+              </a:buClr>
+              <a:buSzPct val="45000"/>
+              <a:buFont typeface="Wingdings" charset="2"/>
+              <a:buChar char=""/>
             </a:pPr>
             <a:r>
               <a:rPr b="0" lang="en-US" sz="3200" spc="-1" strike="noStrike">
@@ -9976,8 +10956,9 @@
                   <a:srgbClr val="000000"/>
                 </a:solidFill>
                 <a:latin typeface="Arial"/>
+                <a:hlinkClick r:id="rId10"/>
               </a:rPr>
-              <a:t> </a:t>
+              <a:t>Deep Neural Networks: Padding</a:t>
             </a:r>
             <a:endParaRPr b="0" lang="en-US" sz="3200" spc="-1" strike="noStrike">
               <a:solidFill>
@@ -11561,18 +12542,9 @@
                 </a:solidFill>
                 <a:latin typeface="Arial"/>
               </a:rPr>
-              <a:t>Input Image Size D</a:t>
-            </a:r>
-            <a:r>
-              <a:rPr b="0" lang="en-US" sz="2200" spc="-1" strike="noStrike">
-                <a:solidFill>
-                  <a:srgbClr val="000000"/>
-                </a:solidFill>
-                <a:latin typeface="Arial"/>
-              </a:rPr>
-              <a:t>I</a:t>
-            </a:r>
-            <a:endParaRPr b="0" lang="en-US" sz="2200" spc="-1" strike="noStrike">
+              <a:t>Input Image Size n×n</a:t>
+            </a:r>
+            <a:endParaRPr b="0" lang="en-US" sz="3200" spc="-1" strike="noStrike">
               <a:solidFill>
                 <a:srgbClr val="000000"/>
               </a:solidFill>
@@ -11598,18 +12570,9 @@
                 </a:solidFill>
                 <a:latin typeface="Arial"/>
               </a:rPr>
-              <a:t>Filter Size D</a:t>
-            </a:r>
-            <a:r>
-              <a:rPr b="0" lang="en-US" sz="2200" spc="-1" strike="noStrike">
-                <a:solidFill>
-                  <a:srgbClr val="000000"/>
-                </a:solidFill>
-                <a:latin typeface="Arial"/>
-              </a:rPr>
-              <a:t>F</a:t>
-            </a:r>
-            <a:endParaRPr b="0" lang="en-US" sz="2200" spc="-1" strike="noStrike">
+              <a:t>Filter Size f×f</a:t>
+            </a:r>
+            <a:endParaRPr b="0" lang="en-US" sz="3200" spc="-1" strike="noStrike">
               <a:solidFill>
                 <a:srgbClr val="000000"/>
               </a:solidFill>
@@ -11635,7 +12598,7 @@
                 </a:solidFill>
                 <a:latin typeface="Arial"/>
               </a:rPr>
-              <a:t>Stride S</a:t>
+              <a:t>Stride s</a:t>
             </a:r>
             <a:endParaRPr b="0" lang="en-US" sz="3200" spc="-1" strike="noStrike">
               <a:solidFill>
@@ -11663,7 +12626,7 @@
                 </a:solidFill>
                 <a:latin typeface="Arial"/>
               </a:rPr>
-              <a:t>Padding P</a:t>
+              <a:t>Padding p</a:t>
             </a:r>
             <a:endParaRPr b="0" lang="en-US" sz="3200" spc="-1" strike="noStrike">
               <a:solidFill>

</xml_diff>